<commit_message>
finished home page. defined and started about page
</commit_message>
<xml_diff>
--- a/Portfolio-Project-Personal-Portfolio-Website/Wireframes.pptx
+++ b/Portfolio-Project-Personal-Portfolio-Website/Wireframes.pptx
@@ -5,11 +5,12 @@
     <p:sldMasterId id="2147483708" r:id="rId1"/>
   </p:sldMasterIdLst>
   <p:notesMasterIdLst>
-    <p:notesMasterId r:id="rId4"/>
+    <p:notesMasterId r:id="rId5"/>
   </p:notesMasterIdLst>
   <p:sldIdLst>
     <p:sldId id="256" r:id="rId2"/>
     <p:sldId id="257" r:id="rId3"/>
+    <p:sldId id="258" r:id="rId4"/>
   </p:sldIdLst>
   <p:sldSz cx="9144000" cy="5143500" type="screen16x9"/>
   <p:notesSz cx="6858000" cy="9144000"/>
@@ -165,7 +166,7 @@
             </a:lvl1pPr>
           </a:lstStyle>
           <a:p>
-            <a:endParaRPr lang="en-GB"/>
+            <a:endParaRPr lang="en-GB" dirty="0"/>
           </a:p>
         </p:txBody>
       </p:sp>
@@ -198,9 +199,9 @@
           <a:p>
             <a:fld id="{A273ECB5-27FA-4334-B172-E40162A074CC}" type="datetimeFigureOut">
               <a:rPr lang="en-GB" smtClean="0"/>
-              <a:t>15/08/2024</a:t>
+              <a:t>16/08/2024</a:t>
             </a:fld>
-            <a:endParaRPr lang="en-GB"/>
+            <a:endParaRPr lang="en-GB" dirty="0"/>
           </a:p>
         </p:txBody>
       </p:sp>
@@ -233,7 +234,7 @@
           <a:bodyPr vert="horz" lIns="91440" tIns="45720" rIns="91440" bIns="45720" rtlCol="0" anchor="ctr"/>
           <a:lstStyle/>
           <a:p>
-            <a:endParaRPr lang="en-GB"/>
+            <a:endParaRPr lang="en-GB" dirty="0"/>
           </a:p>
         </p:txBody>
       </p:sp>
@@ -324,7 +325,7 @@
             </a:lvl1pPr>
           </a:lstStyle>
           <a:p>
-            <a:endParaRPr lang="en-GB"/>
+            <a:endParaRPr lang="en-GB" dirty="0"/>
           </a:p>
         </p:txBody>
       </p:sp>
@@ -359,7 +360,7 @@
               <a:rPr lang="en-GB" smtClean="0"/>
               <a:t>‹#›</a:t>
             </a:fld>
-            <a:endParaRPr lang="en-GB"/>
+            <a:endParaRPr lang="en-GB" dirty="0"/>
           </a:p>
         </p:txBody>
       </p:sp>
@@ -533,7 +534,7 @@
               <a:rPr lang="en-GB" smtClean="0"/>
               <a:t>2</a:t>
             </a:fld>
-            <a:endParaRPr lang="en-GB"/>
+            <a:endParaRPr lang="en-GB" dirty="0"/>
           </a:p>
         </p:txBody>
       </p:sp>
@@ -541,6 +542,90 @@
     <p:extLst>
       <p:ext uri="{BB962C8B-B14F-4D97-AF65-F5344CB8AC3E}">
         <p14:creationId xmlns:p14="http://schemas.microsoft.com/office/powerpoint/2010/main" val="3203650831"/>
+      </p:ext>
+    </p:extLst>
+  </p:cSld>
+  <p:clrMapOvr>
+    <a:masterClrMapping/>
+  </p:clrMapOvr>
+</p:notes>
+</file>
+
+<file path=ppt/notesSlides/notesSlide2.xml><?xml version="1.0" encoding="utf-8"?>
+<p:notes xmlns:a="http://schemas.openxmlformats.org/drawingml/2006/main" xmlns:r="http://schemas.openxmlformats.org/officeDocument/2006/relationships" xmlns:p="http://schemas.openxmlformats.org/presentationml/2006/main">
+  <p:cSld>
+    <p:spTree>
+      <p:nvGrpSpPr>
+        <p:cNvPr id="1" name=""/>
+        <p:cNvGrpSpPr/>
+        <p:nvPr/>
+      </p:nvGrpSpPr>
+      <p:grpSpPr>
+        <a:xfrm>
+          <a:off x="0" y="0"/>
+          <a:ext cx="0" cy="0"/>
+          <a:chOff x="0" y="0"/>
+          <a:chExt cx="0" cy="0"/>
+        </a:xfrm>
+      </p:grpSpPr>
+      <p:sp>
+        <p:nvSpPr>
+          <p:cNvPr id="2" name="Slide Image Placeholder 1"/>
+          <p:cNvSpPr>
+            <a:spLocks noGrp="1" noRot="1" noChangeAspect="1"/>
+          </p:cNvSpPr>
+          <p:nvPr>
+            <p:ph type="sldImg"/>
+          </p:nvPr>
+        </p:nvSpPr>
+        <p:spPr/>
+      </p:sp>
+      <p:sp>
+        <p:nvSpPr>
+          <p:cNvPr id="3" name="Notes Placeholder 2"/>
+          <p:cNvSpPr>
+            <a:spLocks noGrp="1"/>
+          </p:cNvSpPr>
+          <p:nvPr>
+            <p:ph type="body" idx="1"/>
+          </p:nvPr>
+        </p:nvSpPr>
+        <p:spPr/>
+        <p:txBody>
+          <a:bodyPr/>
+          <a:lstStyle/>
+          <a:p>
+            <a:endParaRPr lang="en-GB" dirty="0"/>
+          </a:p>
+        </p:txBody>
+      </p:sp>
+      <p:sp>
+        <p:nvSpPr>
+          <p:cNvPr id="4" name="Slide Number Placeholder 3"/>
+          <p:cNvSpPr>
+            <a:spLocks noGrp="1"/>
+          </p:cNvSpPr>
+          <p:nvPr>
+            <p:ph type="sldNum" sz="quarter" idx="5"/>
+          </p:nvPr>
+        </p:nvSpPr>
+        <p:spPr/>
+        <p:txBody>
+          <a:bodyPr/>
+          <a:lstStyle/>
+          <a:p>
+            <a:fld id="{EC8F3035-11B3-46F6-8FD1-FF84F47AA3E8}" type="slidenum">
+              <a:rPr lang="en-GB" smtClean="0"/>
+              <a:t>3</a:t>
+            </a:fld>
+            <a:endParaRPr lang="en-GB" dirty="0"/>
+          </a:p>
+        </p:txBody>
+      </p:sp>
+    </p:spTree>
+    <p:extLst>
+      <p:ext uri="{BB962C8B-B14F-4D97-AF65-F5344CB8AC3E}">
+        <p14:creationId xmlns:p14="http://schemas.microsoft.com/office/powerpoint/2010/main" val="812664951"/>
       </p:ext>
     </p:extLst>
   </p:cSld>
@@ -681,7 +766,7 @@
           <a:p>
             <a:fld id="{BB19518F-CAD7-4222-B826-8CD348F393C6}" type="datetimeFigureOut">
               <a:rPr lang="en-GB" smtClean="0"/>
-              <a:t>15/08/2024</a:t>
+              <a:t>16/08/2024</a:t>
             </a:fld>
             <a:endParaRPr lang="en-GB" dirty="0"/>
           </a:p>
@@ -851,7 +936,7 @@
           <a:p>
             <a:fld id="{BB19518F-CAD7-4222-B826-8CD348F393C6}" type="datetimeFigureOut">
               <a:rPr lang="en-GB" smtClean="0"/>
-              <a:t>15/08/2024</a:t>
+              <a:t>16/08/2024</a:t>
             </a:fld>
             <a:endParaRPr lang="en-GB" dirty="0"/>
           </a:p>
@@ -1031,7 +1116,7 @@
           <a:p>
             <a:fld id="{BB19518F-CAD7-4222-B826-8CD348F393C6}" type="datetimeFigureOut">
               <a:rPr lang="en-GB" smtClean="0"/>
-              <a:t>15/08/2024</a:t>
+              <a:t>16/08/2024</a:t>
             </a:fld>
             <a:endParaRPr lang="en-GB" dirty="0"/>
           </a:p>
@@ -1201,7 +1286,7 @@
           <a:p>
             <a:fld id="{BB19518F-CAD7-4222-B826-8CD348F393C6}" type="datetimeFigureOut">
               <a:rPr lang="en-GB" smtClean="0"/>
-              <a:t>15/08/2024</a:t>
+              <a:t>16/08/2024</a:t>
             </a:fld>
             <a:endParaRPr lang="en-GB" dirty="0"/>
           </a:p>
@@ -1447,7 +1532,7 @@
           <a:p>
             <a:fld id="{BB19518F-CAD7-4222-B826-8CD348F393C6}" type="datetimeFigureOut">
               <a:rPr lang="en-GB" smtClean="0"/>
-              <a:t>15/08/2024</a:t>
+              <a:t>16/08/2024</a:t>
             </a:fld>
             <a:endParaRPr lang="en-GB" dirty="0"/>
           </a:p>
@@ -1679,7 +1764,7 @@
           <a:p>
             <a:fld id="{BB19518F-CAD7-4222-B826-8CD348F393C6}" type="datetimeFigureOut">
               <a:rPr lang="en-GB" smtClean="0"/>
-              <a:t>15/08/2024</a:t>
+              <a:t>16/08/2024</a:t>
             </a:fld>
             <a:endParaRPr lang="en-GB" dirty="0"/>
           </a:p>
@@ -2046,7 +2131,7 @@
           <a:p>
             <a:fld id="{BB19518F-CAD7-4222-B826-8CD348F393C6}" type="datetimeFigureOut">
               <a:rPr lang="en-GB" smtClean="0"/>
-              <a:t>15/08/2024</a:t>
+              <a:t>16/08/2024</a:t>
             </a:fld>
             <a:endParaRPr lang="en-GB" dirty="0"/>
           </a:p>
@@ -2164,7 +2249,7 @@
           <a:p>
             <a:fld id="{BB19518F-CAD7-4222-B826-8CD348F393C6}" type="datetimeFigureOut">
               <a:rPr lang="en-GB" smtClean="0"/>
-              <a:t>15/08/2024</a:t>
+              <a:t>16/08/2024</a:t>
             </a:fld>
             <a:endParaRPr lang="en-GB" dirty="0"/>
           </a:p>
@@ -2259,7 +2344,7 @@
           <a:p>
             <a:fld id="{BB19518F-CAD7-4222-B826-8CD348F393C6}" type="datetimeFigureOut">
               <a:rPr lang="en-GB" smtClean="0"/>
-              <a:t>15/08/2024</a:t>
+              <a:t>16/08/2024</a:t>
             </a:fld>
             <a:endParaRPr lang="en-GB" dirty="0"/>
           </a:p>
@@ -2536,7 +2621,7 @@
           <a:p>
             <a:fld id="{BB19518F-CAD7-4222-B826-8CD348F393C6}" type="datetimeFigureOut">
               <a:rPr lang="en-GB" smtClean="0"/>
-              <a:t>15/08/2024</a:t>
+              <a:t>16/08/2024</a:t>
             </a:fld>
             <a:endParaRPr lang="en-GB" dirty="0"/>
           </a:p>
@@ -2792,7 +2877,7 @@
           <a:p>
             <a:fld id="{BB19518F-CAD7-4222-B826-8CD348F393C6}" type="datetimeFigureOut">
               <a:rPr lang="en-GB" smtClean="0"/>
-              <a:t>15/08/2024</a:t>
+              <a:t>16/08/2024</a:t>
             </a:fld>
             <a:endParaRPr lang="en-GB" dirty="0"/>
           </a:p>
@@ -3005,7 +3090,7 @@
           <a:p>
             <a:fld id="{BB19518F-CAD7-4222-B826-8CD348F393C6}" type="datetimeFigureOut">
               <a:rPr lang="en-GB" smtClean="0"/>
-              <a:t>15/08/2024</a:t>
+              <a:t>16/08/2024</a:t>
             </a:fld>
             <a:endParaRPr lang="en-GB" dirty="0"/>
           </a:p>
@@ -4211,6 +4296,106 @@
           </a:fontRef>
         </p:style>
       </p:cxnSp>
+      <p:pic>
+        <p:nvPicPr>
+          <p:cNvPr id="3" name="Picture 2">
+            <a:extLst>
+              <a:ext uri="{FF2B5EF4-FFF2-40B4-BE49-F238E27FC236}">
+                <a16:creationId xmlns:a16="http://schemas.microsoft.com/office/drawing/2014/main" id="{EC66DBD8-2C3B-2C01-79CC-926A5DE3543A}"/>
+              </a:ext>
+            </a:extLst>
+          </p:cNvPr>
+          <p:cNvPicPr>
+            <a:picLocks noChangeAspect="1"/>
+          </p:cNvPicPr>
+          <p:nvPr/>
+        </p:nvPicPr>
+        <p:blipFill>
+          <a:blip r:embed="rId2">
+            <a:extLst>
+              <a:ext uri="{28A0092B-C50C-407E-A947-70E740481C1C}">
+                <a14:useLocalDpi xmlns:a14="http://schemas.microsoft.com/office/drawing/2010/main" val="0"/>
+              </a:ext>
+            </a:extLst>
+          </a:blip>
+          <a:stretch>
+            <a:fillRect/>
+          </a:stretch>
+        </p:blipFill>
+        <p:spPr>
+          <a:xfrm>
+            <a:off x="5926259" y="1941743"/>
+            <a:ext cx="2892894" cy="5143500"/>
+          </a:xfrm>
+          <a:prstGeom prst="rect">
+            <a:avLst/>
+          </a:prstGeom>
+        </p:spPr>
+      </p:pic>
+      <p:sp>
+        <p:nvSpPr>
+          <p:cNvPr id="4" name="Rectangle 3">
+            <a:extLst>
+              <a:ext uri="{FF2B5EF4-FFF2-40B4-BE49-F238E27FC236}">
+                <a16:creationId xmlns:a16="http://schemas.microsoft.com/office/drawing/2014/main" id="{60874ED6-793F-328F-CE54-BFF03C9BC731}"/>
+              </a:ext>
+            </a:extLst>
+          </p:cNvPr>
+          <p:cNvSpPr>
+            <a:spLocks noChangeAspect="1"/>
+          </p:cNvSpPr>
+          <p:nvPr/>
+        </p:nvSpPr>
+        <p:spPr>
+          <a:xfrm>
+            <a:off x="5926259" y="1937857"/>
+            <a:ext cx="2892894" cy="1625036"/>
+          </a:xfrm>
+          <a:prstGeom prst="rect">
+            <a:avLst/>
+          </a:prstGeom>
+          <a:gradFill>
+            <a:gsLst>
+              <a:gs pos="0">
+                <a:srgbClr val="171D41">
+                  <a:alpha val="80000"/>
+                </a:srgbClr>
+              </a:gs>
+              <a:gs pos="100000">
+                <a:srgbClr val="171D41"/>
+              </a:gs>
+            </a:gsLst>
+            <a:lin ang="16200000" scaled="1"/>
+          </a:gradFill>
+          <a:ln>
+            <a:noFill/>
+          </a:ln>
+        </p:spPr>
+        <p:style>
+          <a:lnRef idx="2">
+            <a:schemeClr val="accent1">
+              <a:shade val="15000"/>
+            </a:schemeClr>
+          </a:lnRef>
+          <a:fillRef idx="1">
+            <a:schemeClr val="accent1"/>
+          </a:fillRef>
+          <a:effectRef idx="0">
+            <a:schemeClr val="accent1"/>
+          </a:effectRef>
+          <a:fontRef idx="minor">
+            <a:schemeClr val="lt1"/>
+          </a:fontRef>
+        </p:style>
+        <p:txBody>
+          <a:bodyPr rtlCol="0" anchor="ctr"/>
+          <a:lstStyle/>
+          <a:p>
+            <a:pPr algn="ctr"/>
+            <a:endParaRPr lang="en-GB" dirty="0"/>
+          </a:p>
+        </p:txBody>
+      </p:sp>
     </p:spTree>
     <p:extLst>
       <p:ext uri="{BB962C8B-B14F-4D97-AF65-F5344CB8AC3E}">
@@ -4230,7 +4415,10 @@
     <p:bg>
       <p:bgPr>
         <a:solidFill>
-          <a:srgbClr val="171D41"/>
+          <a:schemeClr val="tx1">
+            <a:lumMod val="75000"/>
+            <a:lumOff val="25000"/>
+          </a:schemeClr>
         </a:solidFill>
         <a:effectLst/>
       </p:bgPr>
@@ -4249,6 +4437,204 @@
           <a:chExt cx="0" cy="0"/>
         </a:xfrm>
       </p:grpSpPr>
+      <p:pic>
+        <p:nvPicPr>
+          <p:cNvPr id="17" name="Picture 16" descr="A aerial view of a football field&#10;&#10;Description automatically generated">
+            <a:extLst>
+              <a:ext uri="{FF2B5EF4-FFF2-40B4-BE49-F238E27FC236}">
+                <a16:creationId xmlns:a16="http://schemas.microsoft.com/office/drawing/2014/main" id="{E765C726-91B9-C2F7-7776-BD13DEC6FB65}"/>
+              </a:ext>
+            </a:extLst>
+          </p:cNvPr>
+          <p:cNvPicPr>
+            <a:picLocks noChangeAspect="1"/>
+          </p:cNvPicPr>
+          <p:nvPr/>
+        </p:nvPicPr>
+        <p:blipFill rotWithShape="1">
+          <a:blip r:embed="rId3">
+            <a:extLst>
+              <a:ext uri="{28A0092B-C50C-407E-A947-70E740481C1C}">
+                <a14:useLocalDpi xmlns:a14="http://schemas.microsoft.com/office/drawing/2010/main" val="0"/>
+              </a:ext>
+            </a:extLst>
+          </a:blip>
+          <a:srcRect l="132" t="95" r="-132" b="68267"/>
+          <a:stretch/>
+        </p:blipFill>
+        <p:spPr>
+          <a:xfrm>
+            <a:off x="-12101" y="-6046"/>
+            <a:ext cx="9144000" cy="5143500"/>
+          </a:xfrm>
+          <a:prstGeom prst="rect">
+            <a:avLst/>
+          </a:prstGeom>
+        </p:spPr>
+      </p:pic>
+      <p:sp>
+        <p:nvSpPr>
+          <p:cNvPr id="12" name="Rectangle 11">
+            <a:extLst>
+              <a:ext uri="{FF2B5EF4-FFF2-40B4-BE49-F238E27FC236}">
+                <a16:creationId xmlns:a16="http://schemas.microsoft.com/office/drawing/2014/main" id="{BAD760F3-3A96-2311-362E-D76774272972}"/>
+              </a:ext>
+            </a:extLst>
+          </p:cNvPr>
+          <p:cNvSpPr>
+            <a:spLocks noGrp="1" noRot="1" noMove="1" noResize="1" noEditPoints="1" noAdjustHandles="1" noChangeArrowheads="1" noChangeShapeType="1"/>
+          </p:cNvSpPr>
+          <p:nvPr/>
+        </p:nvSpPr>
+        <p:spPr>
+          <a:xfrm>
+            <a:off x="-12101" y="-1050"/>
+            <a:ext cx="9156101" cy="5167487"/>
+          </a:xfrm>
+          <a:prstGeom prst="rect">
+            <a:avLst/>
+          </a:prstGeom>
+          <a:gradFill flip="none" rotWithShape="1">
+            <a:gsLst>
+              <a:gs pos="0">
+                <a:srgbClr val="171D41">
+                  <a:alpha val="80000"/>
+                </a:srgbClr>
+              </a:gs>
+              <a:gs pos="100000">
+                <a:srgbClr val="171D41"/>
+              </a:gs>
+            </a:gsLst>
+            <a:lin ang="16200000" scaled="1"/>
+            <a:tileRect/>
+          </a:gradFill>
+          <a:ln>
+            <a:noFill/>
+          </a:ln>
+        </p:spPr>
+        <p:style>
+          <a:lnRef idx="2">
+            <a:schemeClr val="accent1">
+              <a:shade val="15000"/>
+            </a:schemeClr>
+          </a:lnRef>
+          <a:fillRef idx="1">
+            <a:schemeClr val="accent1"/>
+          </a:fillRef>
+          <a:effectRef idx="0">
+            <a:schemeClr val="accent1"/>
+          </a:effectRef>
+          <a:fontRef idx="minor">
+            <a:schemeClr val="lt1"/>
+          </a:fontRef>
+        </p:style>
+        <p:txBody>
+          <a:bodyPr rtlCol="0" anchor="ctr"/>
+          <a:lstStyle/>
+          <a:p>
+            <a:pPr algn="ctr"/>
+            <a:endParaRPr lang="en-GB" dirty="0"/>
+          </a:p>
+        </p:txBody>
+      </p:sp>
+      <p:sp>
+        <p:nvSpPr>
+          <p:cNvPr id="5" name="Rectangle: Rounded Corners 4">
+            <a:extLst>
+              <a:ext uri="{FF2B5EF4-FFF2-40B4-BE49-F238E27FC236}">
+                <a16:creationId xmlns:a16="http://schemas.microsoft.com/office/drawing/2014/main" id="{BDDEC4EB-C24C-0742-A8CE-1840265CD875}"/>
+              </a:ext>
+            </a:extLst>
+          </p:cNvPr>
+          <p:cNvSpPr/>
+          <p:nvPr/>
+        </p:nvSpPr>
+        <p:spPr>
+          <a:xfrm>
+            <a:off x="608233" y="2108917"/>
+            <a:ext cx="4315317" cy="1589034"/>
+          </a:xfrm>
+          <a:prstGeom prst="roundRect">
+            <a:avLst>
+              <a:gd name="adj" fmla="val 5844"/>
+            </a:avLst>
+          </a:prstGeom>
+          <a:noFill/>
+          <a:ln w="9525">
+            <a:solidFill>
+              <a:schemeClr val="bg1"/>
+            </a:solidFill>
+          </a:ln>
+        </p:spPr>
+        <p:style>
+          <a:lnRef idx="2">
+            <a:schemeClr val="accent1">
+              <a:shade val="15000"/>
+            </a:schemeClr>
+          </a:lnRef>
+          <a:fillRef idx="1">
+            <a:schemeClr val="accent1"/>
+          </a:fillRef>
+          <a:effectRef idx="0">
+            <a:schemeClr val="accent1"/>
+          </a:effectRef>
+          <a:fontRef idx="minor">
+            <a:schemeClr val="lt1"/>
+          </a:fontRef>
+        </p:style>
+        <p:txBody>
+          <a:bodyPr rtlCol="0" anchor="t"/>
+          <a:lstStyle/>
+          <a:p>
+            <a:r>
+              <a:rPr lang="en-GB" sz="1600" dirty="0">
+                <a:latin typeface="Aptos Mono" panose="020B0009020202020204" pitchFamily="49" charset="0"/>
+              </a:rPr>
+              <a:t>passionate-about</a:t>
+            </a:r>
+          </a:p>
+          <a:p>
+            <a:r>
+              <a:rPr lang="en-GB" sz="1600" dirty="0">
+                <a:latin typeface="Aptos Mono" panose="020B0009020202020204" pitchFamily="49" charset="0"/>
+              </a:rPr>
+              <a:t>{</a:t>
+            </a:r>
+          </a:p>
+          <a:p>
+            <a:r>
+              <a:rPr lang="en-GB" sz="1600" dirty="0">
+                <a:latin typeface="Aptos Mono" panose="020B0009020202020204" pitchFamily="49" charset="0"/>
+              </a:rPr>
+              <a:t>	coding,</a:t>
+            </a:r>
+          </a:p>
+          <a:p>
+            <a:r>
+              <a:rPr lang="en-GB" sz="1600" dirty="0">
+                <a:latin typeface="Aptos Mono" panose="020B0009020202020204" pitchFamily="49" charset="0"/>
+              </a:rPr>
+              <a:t>	problem-solving,</a:t>
+            </a:r>
+          </a:p>
+          <a:p>
+            <a:r>
+              <a:rPr lang="en-GB" sz="1600" dirty="0">
+                <a:latin typeface="Aptos Mono" panose="020B0009020202020204" pitchFamily="49" charset="0"/>
+              </a:rPr>
+              <a:t>	continuous learning,</a:t>
+            </a:r>
+          </a:p>
+          <a:p>
+            <a:r>
+              <a:rPr lang="en-GB" sz="1600" dirty="0">
+                <a:latin typeface="Aptos Mono" panose="020B0009020202020204" pitchFamily="49" charset="0"/>
+              </a:rPr>
+              <a:t>}</a:t>
+            </a:r>
+          </a:p>
+        </p:txBody>
+      </p:sp>
       <p:sp>
         <p:nvSpPr>
           <p:cNvPr id="15" name="TextBox 14">
@@ -4436,20 +4822,12 @@
           <a:lstStyle/>
           <a:p>
             <a:r>
-              <a:rPr lang="en-GB" sz="634" dirty="0" err="1">
-                <a:solidFill>
-                  <a:schemeClr val="bg1"/>
-                </a:solidFill>
-              </a:rPr>
-              <a:t>Linkedin</a:t>
-            </a:r>
-            <a:r>
               <a:rPr lang="en-GB" sz="634" dirty="0">
                 <a:solidFill>
                   <a:schemeClr val="bg1"/>
                 </a:solidFill>
               </a:rPr>
-              <a:t> logo</a:t>
+              <a:t>Linkedin logo</a:t>
             </a:r>
           </a:p>
           <a:p>
@@ -4466,55 +4844,7 @@
                   <a:schemeClr val="bg1"/>
                 </a:solidFill>
               </a:rPr>
-              <a:t>&lt;a target="_blank" </a:t>
-            </a:r>
-            <a:r>
-              <a:rPr lang="en-GB" sz="634" dirty="0" err="1">
-                <a:solidFill>
-                  <a:schemeClr val="bg1"/>
-                </a:solidFill>
-              </a:rPr>
-              <a:t>href</a:t>
-            </a:r>
-            <a:r>
-              <a:rPr lang="en-GB" sz="634" dirty="0">
-                <a:solidFill>
-                  <a:schemeClr val="bg1"/>
-                </a:solidFill>
-              </a:rPr>
-              <a:t>="https://icons8.com/icon/85348/</a:t>
-            </a:r>
-            <a:r>
-              <a:rPr lang="en-GB" sz="634" dirty="0" err="1">
-                <a:solidFill>
-                  <a:schemeClr val="bg1"/>
-                </a:solidFill>
-              </a:rPr>
-              <a:t>linkedin</a:t>
-            </a:r>
-            <a:r>
-              <a:rPr lang="en-GB" sz="634" dirty="0">
-                <a:solidFill>
-                  <a:schemeClr val="bg1"/>
-                </a:solidFill>
-              </a:rPr>
-              <a:t>"&gt;LinkedIn&lt;/a&gt; icon by &lt;a target="_blank" </a:t>
-            </a:r>
-            <a:r>
-              <a:rPr lang="en-GB" sz="634" dirty="0" err="1">
-                <a:solidFill>
-                  <a:schemeClr val="bg1"/>
-                </a:solidFill>
-              </a:rPr>
-              <a:t>href</a:t>
-            </a:r>
-            <a:r>
-              <a:rPr lang="en-GB" sz="634" dirty="0">
-                <a:solidFill>
-                  <a:schemeClr val="bg1"/>
-                </a:solidFill>
-              </a:rPr>
-              <a:t>="https://icons8.com"&gt;Icons8&lt;/a&gt;</a:t>
+              <a:t>&lt;a target="_blank" href="https://icons8.com/icon/85348/linkedin"&gt;LinkedIn&lt;/a&gt; icon by &lt;a target="_blank" href="https://icons8.com"&gt;Icons8&lt;/a&gt;</a:t>
             </a:r>
           </a:p>
         </p:txBody>
@@ -4533,7 +4863,7 @@
         </p:nvSpPr>
         <p:spPr>
           <a:xfrm>
-            <a:off x="3311986" y="-1210331"/>
+            <a:off x="3309621" y="-1355873"/>
             <a:ext cx="1440015" cy="1149289"/>
           </a:xfrm>
           <a:prstGeom prst="rect">
@@ -4553,20 +4883,12 @@
           <a:lstStyle/>
           <a:p>
             <a:r>
-              <a:rPr lang="en-GB" sz="634" dirty="0" err="1">
-                <a:solidFill>
-                  <a:schemeClr val="bg1"/>
-                </a:solidFill>
-              </a:rPr>
-              <a:t>github</a:t>
-            </a:r>
-            <a:r>
               <a:rPr lang="en-GB" sz="634" dirty="0">
                 <a:solidFill>
                   <a:schemeClr val="bg1"/>
                 </a:solidFill>
               </a:rPr>
-              <a:t> logo</a:t>
+              <a:t>github logo</a:t>
             </a:r>
           </a:p>
           <a:p>
@@ -4583,55 +4905,7 @@
                   <a:srgbClr val="E3E9ED"/>
                 </a:solidFill>
               </a:rPr>
-              <a:t>&lt;a target="_blank" </a:t>
-            </a:r>
-            <a:r>
-              <a:rPr lang="en-GB" sz="800" dirty="0" err="1">
-                <a:solidFill>
-                  <a:srgbClr val="E3E9ED"/>
-                </a:solidFill>
-              </a:rPr>
-              <a:t>href</a:t>
-            </a:r>
-            <a:r>
-              <a:rPr lang="en-GB" sz="800" dirty="0">
-                <a:solidFill>
-                  <a:srgbClr val="E3E9ED"/>
-                </a:solidFill>
-              </a:rPr>
-              <a:t>="https://icons8.com/icon/RHLuYrY4GjUv/</a:t>
-            </a:r>
-            <a:r>
-              <a:rPr lang="en-GB" sz="800" dirty="0" err="1">
-                <a:solidFill>
-                  <a:srgbClr val="E3E9ED"/>
-                </a:solidFill>
-              </a:rPr>
-              <a:t>github</a:t>
-            </a:r>
-            <a:r>
-              <a:rPr lang="en-GB" sz="800" dirty="0">
-                <a:solidFill>
-                  <a:srgbClr val="E3E9ED"/>
-                </a:solidFill>
-              </a:rPr>
-              <a:t>"&gt;GitHub&lt;/a&gt; icon by &lt;a target="_blank" </a:t>
-            </a:r>
-            <a:r>
-              <a:rPr lang="en-GB" sz="800" dirty="0" err="1">
-                <a:solidFill>
-                  <a:srgbClr val="E3E9ED"/>
-                </a:solidFill>
-              </a:rPr>
-              <a:t>href</a:t>
-            </a:r>
-            <a:r>
-              <a:rPr lang="en-GB" sz="800" dirty="0">
-                <a:solidFill>
-                  <a:srgbClr val="E3E9ED"/>
-                </a:solidFill>
-              </a:rPr>
-              <a:t>="https://icons8.com"&gt;Icons8&lt;/a&gt;</a:t>
+              <a:t>&lt;a target="_blank" href="https://icons8.com/icon/RHLuYrY4GjUv/github"&gt;GitHub&lt;/a&gt; icon by &lt;a target="_blank" href="https://icons8.com"&gt;Icons8&lt;/a&gt;</a:t>
             </a:r>
           </a:p>
         </p:txBody>
@@ -4692,39 +4966,7 @@
                   <a:srgbClr val="E3E9ED"/>
                 </a:solidFill>
               </a:rPr>
-              <a:t>&lt;a target="_blank" </a:t>
-            </a:r>
-            <a:r>
-              <a:rPr lang="en-GB" sz="800" dirty="0" err="1">
-                <a:solidFill>
-                  <a:srgbClr val="E3E9ED"/>
-                </a:solidFill>
-              </a:rPr>
-              <a:t>href</a:t>
-            </a:r>
-            <a:r>
-              <a:rPr lang="en-GB" sz="800" dirty="0">
-                <a:solidFill>
-                  <a:srgbClr val="E3E9ED"/>
-                </a:solidFill>
-              </a:rPr>
-              <a:t>="https://icons8.com/icon/12623/email"&gt;Email&lt;/a&gt; icon by &lt;a target="_blank" </a:t>
-            </a:r>
-            <a:r>
-              <a:rPr lang="en-GB" sz="800" dirty="0" err="1">
-                <a:solidFill>
-                  <a:srgbClr val="E3E9ED"/>
-                </a:solidFill>
-              </a:rPr>
-              <a:t>href</a:t>
-            </a:r>
-            <a:r>
-              <a:rPr lang="en-GB" sz="800" dirty="0">
-                <a:solidFill>
-                  <a:srgbClr val="E3E9ED"/>
-                </a:solidFill>
-              </a:rPr>
-              <a:t>="https://icons8.com"&gt;Icons8&lt;/a&gt;</a:t>
+              <a:t>&lt;a target="_blank" href="https://icons8.com/icon/12623/email"&gt;Email&lt;/a&gt; icon by &lt;a target="_blank" href="https://icons8.com"&gt;Icons8&lt;/a&gt;</a:t>
             </a:r>
           </a:p>
         </p:txBody>
@@ -4797,7 +5039,7 @@
             <a:lstStyle/>
             <a:p>
               <a:pPr algn="ctr"/>
-              <a:endParaRPr lang="en-GB"/>
+              <a:endParaRPr lang="en-GB" dirty="0"/>
             </a:p>
           </p:txBody>
         </p:sp>
@@ -4816,7 +5058,7 @@
             <p:nvPr/>
           </p:nvPicPr>
           <p:blipFill>
-            <a:blip r:embed="rId3">
+            <a:blip r:embed="rId4">
               <a:extLst>
                 <a:ext uri="{28A0092B-C50C-407E-A947-70E740481C1C}">
                   <a14:useLocalDpi xmlns:a14="http://schemas.microsoft.com/office/drawing/2010/main" val="0"/>
@@ -4855,7 +5097,7 @@
             <p:nvPr/>
           </p:nvPicPr>
           <p:blipFill>
-            <a:blip r:embed="rId4">
+            <a:blip r:embed="rId5">
               <a:extLst>
                 <a:ext uri="{28A0092B-C50C-407E-A947-70E740481C1C}">
                   <a14:useLocalDpi xmlns:a14="http://schemas.microsoft.com/office/drawing/2010/main" val="0"/>
@@ -4894,7 +5136,7 @@
             <p:nvPr/>
           </p:nvPicPr>
           <p:blipFill rotWithShape="1">
-            <a:blip r:embed="rId5">
+            <a:blip r:embed="rId6">
               <a:extLst>
                 <a:ext uri="{28A0092B-C50C-407E-A947-70E740481C1C}">
                   <a14:useLocalDpi xmlns:a14="http://schemas.microsoft.com/office/drawing/2010/main" val="0"/>
@@ -4962,107 +5204,6 @@
           </a:p>
         </p:txBody>
       </p:sp>
-      <p:sp>
-        <p:nvSpPr>
-          <p:cNvPr id="26" name="TextBox 25">
-            <a:extLst>
-              <a:ext uri="{FF2B5EF4-FFF2-40B4-BE49-F238E27FC236}">
-                <a16:creationId xmlns:a16="http://schemas.microsoft.com/office/drawing/2014/main" id="{652B90D1-5DB7-3A08-90C5-7A002ABF6EDF}"/>
-              </a:ext>
-            </a:extLst>
-          </p:cNvPr>
-          <p:cNvSpPr txBox="1"/>
-          <p:nvPr/>
-        </p:nvSpPr>
-        <p:spPr>
-          <a:xfrm>
-            <a:off x="613064" y="2126539"/>
-            <a:ext cx="4320047" cy="1569660"/>
-          </a:xfrm>
-          <a:prstGeom prst="rect">
-            <a:avLst/>
-          </a:prstGeom>
-          <a:noFill/>
-          <a:ln cap="flat">
-            <a:solidFill>
-              <a:srgbClr val="E3E9ED"/>
-            </a:solidFill>
-            <a:round/>
-          </a:ln>
-        </p:spPr>
-        <p:txBody>
-          <a:bodyPr wrap="square" rtlCol="0">
-            <a:spAutoFit/>
-          </a:bodyPr>
-          <a:lstStyle/>
-          <a:p>
-            <a:r>
-              <a:rPr lang="en-GB" sz="1600" dirty="0">
-                <a:solidFill>
-                  <a:srgbClr val="E3E9ED"/>
-                </a:solidFill>
-                <a:latin typeface="Aptos Mono" panose="020F0502020204030204" pitchFamily="49" charset="0"/>
-              </a:rPr>
-              <a:t>passionate-about</a:t>
-            </a:r>
-          </a:p>
-          <a:p>
-            <a:r>
-              <a:rPr lang="en-GB" sz="1600" dirty="0">
-                <a:solidFill>
-                  <a:srgbClr val="E3E9ED"/>
-                </a:solidFill>
-                <a:latin typeface="Aptos Mono" panose="020F0502020204030204" pitchFamily="49" charset="0"/>
-              </a:rPr>
-              <a:t>{</a:t>
-            </a:r>
-          </a:p>
-          <a:p>
-            <a:r>
-              <a:rPr lang="en-GB" sz="1600" dirty="0">
-                <a:solidFill>
-                  <a:srgbClr val="E3E9ED"/>
-                </a:solidFill>
-                <a:latin typeface="Aptos Mono" panose="020F0502020204030204" pitchFamily="49" charset="0"/>
-              </a:rPr>
-              <a:t>	coding,</a:t>
-            </a:r>
-          </a:p>
-          <a:p>
-            <a:r>
-              <a:rPr lang="en-GB" sz="1600" dirty="0">
-                <a:solidFill>
-                  <a:srgbClr val="E3E9ED"/>
-                </a:solidFill>
-                <a:latin typeface="Aptos Mono" panose="020F0502020204030204" pitchFamily="49" charset="0"/>
-              </a:rPr>
-              <a:t>	problem-solving,</a:t>
-            </a:r>
-          </a:p>
-          <a:p>
-            <a:r>
-              <a:rPr lang="en-GB" sz="1600" dirty="0">
-                <a:solidFill>
-                  <a:srgbClr val="E3E9ED"/>
-                </a:solidFill>
-                <a:latin typeface="Aptos Mono" panose="020F0502020204030204" pitchFamily="49" charset="0"/>
-              </a:rPr>
-              <a:t>	continuous learning</a:t>
-            </a:r>
-          </a:p>
-          <a:p>
-            <a:r>
-              <a:rPr lang="en-GB" sz="1600" dirty="0">
-                <a:solidFill>
-                  <a:srgbClr val="E3E9ED"/>
-                </a:solidFill>
-                <a:latin typeface="Aptos Mono" panose="020F0502020204030204" pitchFamily="49" charset="0"/>
-              </a:rPr>
-              <a:t>}</a:t>
-            </a:r>
-          </a:p>
-        </p:txBody>
-      </p:sp>
       <p:cxnSp>
         <p:nvCxnSpPr>
           <p:cNvPr id="32" name="Connector: Elbow 31">
@@ -5074,7 +5215,6 @@
           </p:cNvPr>
           <p:cNvCxnSpPr>
             <a:cxnSpLocks/>
-            <a:stCxn id="26" idx="3"/>
             <a:endCxn id="33" idx="0"/>
           </p:cNvCxnSpPr>
           <p:nvPr/>
@@ -5244,7 +5384,7 @@
         </p:nvSpPr>
         <p:spPr>
           <a:xfrm>
-            <a:off x="7812036" y="6621795"/>
+            <a:off x="5815792" y="3961810"/>
             <a:ext cx="1130507" cy="189924"/>
           </a:xfrm>
           <a:prstGeom prst="rect">
@@ -5321,33 +5461,560 @@
           </a:p>
         </p:txBody>
       </p:sp>
-      <p:sp>
-        <p:nvSpPr>
-          <p:cNvPr id="41" name="Rectangle: Rounded Corners 40">
+      <p:cxnSp>
+        <p:nvCxnSpPr>
+          <p:cNvPr id="43" name="Connector: Elbow 42">
             <a:extLst>
               <a:ext uri="{FF2B5EF4-FFF2-40B4-BE49-F238E27FC236}">
-                <a16:creationId xmlns:a16="http://schemas.microsoft.com/office/drawing/2014/main" id="{A8A2B4A5-15D6-861A-F4E7-97C776944337}"/>
+                <a16:creationId xmlns:a16="http://schemas.microsoft.com/office/drawing/2014/main" id="{130392D7-2212-A10D-06BF-20C1C1D33EDE}"/>
               </a:ext>
             </a:extLst>
           </p:cNvPr>
-          <p:cNvSpPr/>
+          <p:cNvCxnSpPr>
+            <a:cxnSpLocks/>
+            <a:stCxn id="42" idx="2"/>
+            <a:endCxn id="28" idx="0"/>
+          </p:cNvCxnSpPr>
           <p:nvPr/>
-        </p:nvSpPr>
-        <p:spPr>
-          <a:xfrm>
-            <a:off x="5740905" y="2121745"/>
-            <a:ext cx="2790031" cy="400110"/>
-          </a:xfrm>
-          <a:prstGeom prst="roundRect">
+        </p:nvCxnSpPr>
+        <p:spPr>
+          <a:xfrm rot="16200000" flipH="1">
+            <a:off x="7378034" y="3026168"/>
+            <a:ext cx="1766906" cy="2251134"/>
+          </a:xfrm>
+          <a:prstGeom prst="bentConnector3">
             <a:avLst>
-              <a:gd name="adj" fmla="val 16667"/>
+              <a:gd name="adj1" fmla="val 50000"/>
             </a:avLst>
           </a:prstGeom>
+          <a:ln w="25400">
+            <a:solidFill>
+              <a:srgbClr val="FFC000"/>
+            </a:solidFill>
+            <a:tailEnd type="triangle"/>
+          </a:ln>
+        </p:spPr>
+        <p:style>
+          <a:lnRef idx="2">
+            <a:schemeClr val="accent1"/>
+          </a:lnRef>
+          <a:fillRef idx="0">
+            <a:schemeClr val="accent1"/>
+          </a:fillRef>
+          <a:effectRef idx="1">
+            <a:schemeClr val="accent1"/>
+          </a:effectRef>
+          <a:fontRef idx="minor">
+            <a:schemeClr val="tx1"/>
+          </a:fontRef>
+        </p:style>
+      </p:cxnSp>
+      <p:sp>
+        <p:nvSpPr>
+          <p:cNvPr id="18" name="Rectangle 1">
+            <a:extLst>
+              <a:ext uri="{FF2B5EF4-FFF2-40B4-BE49-F238E27FC236}">
+                <a16:creationId xmlns:a16="http://schemas.microsoft.com/office/drawing/2014/main" id="{6D49A4D0-FECD-80DA-7C59-778750869A1A}"/>
+              </a:ext>
+            </a:extLst>
+          </p:cNvPr>
+          <p:cNvSpPr>
+            <a:spLocks noChangeArrowheads="1"/>
+          </p:cNvSpPr>
+          <p:nvPr/>
+        </p:nvSpPr>
+        <p:spPr bwMode="auto">
+          <a:xfrm>
+            <a:off x="6701872" y="-842248"/>
+            <a:ext cx="2369896" cy="200055"/>
+          </a:xfrm>
+          <a:prstGeom prst="rect">
+            <a:avLst/>
+          </a:prstGeom>
           <a:noFill/>
-          <a:ln w="9525">
+          <a:ln w="38100">
+            <a:solidFill>
+              <a:srgbClr val="FFC000"/>
+            </a:solidFill>
+            <a:miter lim="800000"/>
+            <a:headEnd/>
+            <a:tailEnd/>
+          </a:ln>
+          <a:effectLst/>
+          <a:extLst>
+            <a:ext uri="{909E8E84-426E-40DD-AFC4-6F175D3DCCD1}">
+              <a14:hiddenFill xmlns:a14="http://schemas.microsoft.com/office/drawing/2010/main">
+                <a:solidFill>
+                  <a:schemeClr val="accent1"/>
+                </a:solidFill>
+              </a14:hiddenFill>
+            </a:ext>
+            <a:ext uri="{AF507438-7753-43E0-B8FC-AC1667EBCBE1}">
+              <a14:hiddenEffects xmlns:a14="http://schemas.microsoft.com/office/drawing/2010/main">
+                <a:effectLst>
+                  <a:outerShdw dist="35921" dir="2700000" algn="ctr" rotWithShape="0">
+                    <a:schemeClr val="bg2"/>
+                  </a:outerShdw>
+                </a:effectLst>
+              </a14:hiddenEffects>
+            </a:ext>
+          </a:extLst>
+        </p:spPr>
+        <p:txBody>
+          <a:bodyPr vert="horz" wrap="square" lIns="91440" tIns="45720" rIns="91440" bIns="45720" numCol="1" anchor="ctr" anchorCtr="0" compatLnSpc="1">
+            <a:prstTxWarp prst="textNoShape">
+              <a:avLst/>
+            </a:prstTxWarp>
+            <a:spAutoFit/>
+          </a:bodyPr>
+          <a:lstStyle/>
+          <a:p>
+            <a:pPr marL="0" marR="0" lvl="0" indent="0" algn="l" defTabSz="914400" rtl="0" eaLnBrk="0" fontAlgn="base" latinLnBrk="0" hangingPunct="0">
+              <a:lnSpc>
+                <a:spcPct val="100000"/>
+              </a:lnSpc>
+              <a:spcBef>
+                <a:spcPct val="0"/>
+              </a:spcBef>
+              <a:spcAft>
+                <a:spcPct val="0"/>
+              </a:spcAft>
+              <a:buClrTx/>
+              <a:buSzTx/>
+              <a:buFontTx/>
+              <a:buNone/>
+              <a:tabLst/>
+            </a:pPr>
+            <a:r>
+              <a:rPr kumimoji="0" lang="en-US" altLang="en-US" sz="700" b="0" i="0" u="none" strike="noStrike" cap="none" normalizeH="0" baseline="0" dirty="0">
+                <a:ln>
+                  <a:noFill/>
+                </a:ln>
+                <a:solidFill>
+                  <a:schemeClr val="bg1"/>
+                </a:solidFill>
+                <a:effectLst/>
+                <a:latin typeface="Arial" panose="020B0604020202020204" pitchFamily="34" charset="0"/>
+              </a:rPr>
+              <a:t>Photo by </a:t>
+            </a:r>
+            <a:r>
+              <a:rPr kumimoji="0" lang="en-US" altLang="en-US" sz="700" b="0" i="0" u="none" strike="noStrike" cap="none" normalizeH="0" baseline="0" dirty="0">
+                <a:ln>
+                  <a:noFill/>
+                </a:ln>
+                <a:solidFill>
+                  <a:schemeClr val="bg1"/>
+                </a:solidFill>
+                <a:effectLst/>
+                <a:latin typeface="Arial" panose="020B0604020202020204" pitchFamily="34" charset="0"/>
+                <a:hlinkClick r:id="rId7">
+                  <a:extLst>
+                    <a:ext uri="{A12FA001-AC4F-418D-AE19-62706E023703}">
+                      <ahyp:hlinkClr xmlns:ahyp="http://schemas.microsoft.com/office/drawing/2018/hyperlinkcolor" val="tx"/>
+                    </a:ext>
+                  </a:extLst>
+                </a:hlinkClick>
+              </a:rPr>
+              <a:t>Izuddin Helmi Adnan</a:t>
+            </a:r>
+            <a:r>
+              <a:rPr kumimoji="0" lang="en-US" altLang="en-US" sz="700" b="0" i="0" u="none" strike="noStrike" cap="none" normalizeH="0" baseline="0" dirty="0">
+                <a:ln>
+                  <a:noFill/>
+                </a:ln>
+                <a:solidFill>
+                  <a:schemeClr val="bg1"/>
+                </a:solidFill>
+                <a:effectLst/>
+                <a:latin typeface="Arial" panose="020B0604020202020204" pitchFamily="34" charset="0"/>
+              </a:rPr>
+              <a:t> on </a:t>
+            </a:r>
+            <a:r>
+              <a:rPr kumimoji="0" lang="en-US" altLang="en-US" sz="700" b="0" i="0" u="none" strike="noStrike" cap="none" normalizeH="0" baseline="0" dirty="0">
+                <a:ln>
+                  <a:noFill/>
+                </a:ln>
+                <a:solidFill>
+                  <a:schemeClr val="bg1"/>
+                </a:solidFill>
+                <a:effectLst/>
+                <a:latin typeface="Arial" panose="020B0604020202020204" pitchFamily="34" charset="0"/>
+                <a:hlinkClick r:id="rId8">
+                  <a:extLst>
+                    <a:ext uri="{A12FA001-AC4F-418D-AE19-62706E023703}">
+                      <ahyp:hlinkClr xmlns:ahyp="http://schemas.microsoft.com/office/drawing/2018/hyperlinkcolor" val="tx"/>
+                    </a:ext>
+                  </a:extLst>
+                </a:hlinkClick>
+              </a:rPr>
+              <a:t>Unsplash</a:t>
+            </a:r>
+            <a:r>
+              <a:rPr kumimoji="0" lang="en-US" altLang="en-US" sz="700" b="0" i="0" u="none" strike="noStrike" cap="none" normalizeH="0" baseline="0" dirty="0">
+                <a:ln>
+                  <a:noFill/>
+                </a:ln>
+                <a:solidFill>
+                  <a:schemeClr val="bg1"/>
+                </a:solidFill>
+                <a:effectLst/>
+                <a:latin typeface="Arial" panose="020B0604020202020204" pitchFamily="34" charset="0"/>
+              </a:rPr>
+              <a:t> </a:t>
+            </a:r>
+          </a:p>
+        </p:txBody>
+      </p:sp>
+      <p:grpSp>
+        <p:nvGrpSpPr>
+          <p:cNvPr id="24" name="Group 23">
+            <a:extLst>
+              <a:ext uri="{FF2B5EF4-FFF2-40B4-BE49-F238E27FC236}">
+                <a16:creationId xmlns:a16="http://schemas.microsoft.com/office/drawing/2014/main" id="{ADF0683E-A4A7-0B36-E8AF-3C3B4E34C4EF}"/>
+              </a:ext>
+            </a:extLst>
+          </p:cNvPr>
+          <p:cNvGrpSpPr/>
+          <p:nvPr/>
+        </p:nvGrpSpPr>
+        <p:grpSpPr>
+          <a:xfrm>
+            <a:off x="5739796" y="1863125"/>
+            <a:ext cx="2791139" cy="1405157"/>
+            <a:chOff x="5740905" y="1616598"/>
+            <a:chExt cx="2791139" cy="1405157"/>
+          </a:xfrm>
+        </p:grpSpPr>
+        <p:sp>
+          <p:nvSpPr>
+            <p:cNvPr id="41" name="Rectangle: Rounded Corners 40">
+              <a:extLst>
+                <a:ext uri="{FF2B5EF4-FFF2-40B4-BE49-F238E27FC236}">
+                  <a16:creationId xmlns:a16="http://schemas.microsoft.com/office/drawing/2014/main" id="{A8A2B4A5-15D6-861A-F4E7-97C776944337}"/>
+                </a:ext>
+              </a:extLst>
+            </p:cNvPr>
+            <p:cNvSpPr/>
+            <p:nvPr/>
+          </p:nvSpPr>
+          <p:spPr>
+            <a:xfrm>
+              <a:off x="5740905" y="2121745"/>
+              <a:ext cx="2790031" cy="400110"/>
+            </a:xfrm>
+            <a:prstGeom prst="roundRect">
+              <a:avLst>
+                <a:gd name="adj" fmla="val 16667"/>
+              </a:avLst>
+            </a:prstGeom>
+            <a:noFill/>
+            <a:ln w="9525">
+              <a:solidFill>
+                <a:srgbClr val="E3E9ED"/>
+              </a:solidFill>
+            </a:ln>
+          </p:spPr>
+          <p:style>
+            <a:lnRef idx="2">
+              <a:schemeClr val="accent1">
+                <a:shade val="15000"/>
+              </a:schemeClr>
+            </a:lnRef>
+            <a:fillRef idx="1">
+              <a:schemeClr val="accent1"/>
+            </a:fillRef>
+            <a:effectRef idx="0">
+              <a:schemeClr val="accent1"/>
+            </a:effectRef>
+            <a:fontRef idx="minor">
+              <a:schemeClr val="lt1"/>
+            </a:fontRef>
+          </p:style>
+          <p:txBody>
+            <a:bodyPr rtlCol="0" anchor="ctr"/>
+            <a:lstStyle/>
+            <a:p>
+              <a:pPr algn="ctr"/>
+              <a:r>
+                <a:rPr lang="en-GB" dirty="0">
+                  <a:latin typeface="Aptos Mono" panose="020B0009020202020204" pitchFamily="49" charset="0"/>
+                </a:rPr>
+                <a:t>personal projects</a:t>
+              </a:r>
+            </a:p>
+          </p:txBody>
+        </p:sp>
+        <p:sp>
+          <p:nvSpPr>
+            <p:cNvPr id="42" name="Rectangle: Rounded Corners 41">
+              <a:extLst>
+                <a:ext uri="{FF2B5EF4-FFF2-40B4-BE49-F238E27FC236}">
+                  <a16:creationId xmlns:a16="http://schemas.microsoft.com/office/drawing/2014/main" id="{4042C9F3-2CD4-D97B-776D-1D6AC6B1DFD9}"/>
+                </a:ext>
+              </a:extLst>
+            </p:cNvPr>
+            <p:cNvSpPr/>
+            <p:nvPr/>
+          </p:nvSpPr>
+          <p:spPr>
+            <a:xfrm>
+              <a:off x="5742013" y="2621645"/>
+              <a:ext cx="2790031" cy="400110"/>
+            </a:xfrm>
+            <a:prstGeom prst="roundRect">
+              <a:avLst/>
+            </a:prstGeom>
+            <a:noFill/>
+            <a:ln w="9525">
+              <a:solidFill>
+                <a:srgbClr val="E3E9ED"/>
+              </a:solidFill>
+            </a:ln>
+          </p:spPr>
+          <p:style>
+            <a:lnRef idx="2">
+              <a:schemeClr val="accent1">
+                <a:shade val="15000"/>
+              </a:schemeClr>
+            </a:lnRef>
+            <a:fillRef idx="1">
+              <a:schemeClr val="accent1"/>
+            </a:fillRef>
+            <a:effectRef idx="0">
+              <a:schemeClr val="accent1"/>
+            </a:effectRef>
+            <a:fontRef idx="minor">
+              <a:schemeClr val="lt1"/>
+            </a:fontRef>
+          </p:style>
+          <p:txBody>
+            <a:bodyPr rtlCol="0" anchor="ctr"/>
+            <a:lstStyle/>
+            <a:p>
+              <a:pPr algn="ctr"/>
+              <a:r>
+                <a:rPr lang="en-GB" dirty="0">
+                  <a:latin typeface="Aptos Mono" panose="020B0009020202020204" pitchFamily="49" charset="0"/>
+                </a:rPr>
+                <a:t>academic projects</a:t>
+              </a:r>
+            </a:p>
+          </p:txBody>
+        </p:sp>
+        <p:sp>
+          <p:nvSpPr>
+            <p:cNvPr id="20" name="Rectangle: Rounded Corners 19">
+              <a:extLst>
+                <a:ext uri="{FF2B5EF4-FFF2-40B4-BE49-F238E27FC236}">
+                  <a16:creationId xmlns:a16="http://schemas.microsoft.com/office/drawing/2014/main" id="{8C5257D3-3806-AC3C-59CF-83B368CCAF8C}"/>
+                </a:ext>
+              </a:extLst>
+            </p:cNvPr>
+            <p:cNvSpPr/>
+            <p:nvPr/>
+          </p:nvSpPr>
+          <p:spPr>
+            <a:xfrm>
+              <a:off x="5740905" y="1616598"/>
+              <a:ext cx="2790031" cy="400110"/>
+            </a:xfrm>
+            <a:prstGeom prst="roundRect">
+              <a:avLst>
+                <a:gd name="adj" fmla="val 16667"/>
+              </a:avLst>
+            </a:prstGeom>
+            <a:noFill/>
+            <a:ln w="9525">
+              <a:solidFill>
+                <a:srgbClr val="E3E9ED"/>
+              </a:solidFill>
+            </a:ln>
+          </p:spPr>
+          <p:style>
+            <a:lnRef idx="2">
+              <a:schemeClr val="accent1">
+                <a:shade val="15000"/>
+              </a:schemeClr>
+            </a:lnRef>
+            <a:fillRef idx="1">
+              <a:schemeClr val="accent1"/>
+            </a:fillRef>
+            <a:effectRef idx="0">
+              <a:schemeClr val="accent1"/>
+            </a:effectRef>
+            <a:fontRef idx="minor">
+              <a:schemeClr val="lt1"/>
+            </a:fontRef>
+          </p:style>
+          <p:txBody>
+            <a:bodyPr rtlCol="0" anchor="ctr"/>
+            <a:lstStyle/>
+            <a:p>
+              <a:pPr algn="ctr"/>
+              <a:r>
+                <a:rPr lang="en-GB" dirty="0">
+                  <a:latin typeface="Aptos Mono" panose="020B0009020202020204" pitchFamily="49" charset="0"/>
+                </a:rPr>
+                <a:t>about</a:t>
+              </a:r>
+            </a:p>
+          </p:txBody>
+        </p:sp>
+      </p:grpSp>
+      <p:sp>
+        <p:nvSpPr>
+          <p:cNvPr id="28" name="TextBox 27">
+            <a:extLst>
+              <a:ext uri="{FF2B5EF4-FFF2-40B4-BE49-F238E27FC236}">
+                <a16:creationId xmlns:a16="http://schemas.microsoft.com/office/drawing/2014/main" id="{CE957DFC-5B9F-ABCB-EC32-7482A639D6EB}"/>
+              </a:ext>
+            </a:extLst>
+          </p:cNvPr>
+          <p:cNvSpPr txBox="1"/>
+          <p:nvPr/>
+        </p:nvSpPr>
+        <p:spPr>
+          <a:xfrm>
+            <a:off x="7992038" y="5035188"/>
+            <a:ext cx="2790031" cy="400110"/>
+          </a:xfrm>
+          <a:prstGeom prst="rect">
+            <a:avLst/>
+          </a:prstGeom>
+          <a:noFill/>
+          <a:ln cap="flat">
             <a:solidFill>
               <a:srgbClr val="E3E9ED"/>
             </a:solidFill>
+            <a:round/>
+          </a:ln>
+        </p:spPr>
+        <p:txBody>
+          <a:bodyPr wrap="square" rtlCol="0">
+            <a:spAutoFit/>
+          </a:bodyPr>
+          <a:lstStyle/>
+          <a:p>
+            <a:pPr algn="ctr"/>
+            <a:r>
+              <a:rPr lang="en-GB" sz="2000" dirty="0">
+                <a:solidFill>
+                  <a:srgbClr val="E3E9ED"/>
+                </a:solidFill>
+                <a:latin typeface="Aptos Mono" panose="020F0502020204030204" pitchFamily="49" charset="0"/>
+              </a:rPr>
+              <a:t>about</a:t>
+            </a:r>
+          </a:p>
+        </p:txBody>
+      </p:sp>
+    </p:spTree>
+    <p:extLst>
+      <p:ext uri="{BB962C8B-B14F-4D97-AF65-F5344CB8AC3E}">
+        <p14:creationId xmlns:p14="http://schemas.microsoft.com/office/powerpoint/2010/main" val="1122932674"/>
+      </p:ext>
+    </p:extLst>
+  </p:cSld>
+  <p:clrMapOvr>
+    <a:masterClrMapping/>
+  </p:clrMapOvr>
+</p:sld>
+</file>
+
+<file path=ppt/slides/slide3.xml><?xml version="1.0" encoding="utf-8"?>
+<p:sld xmlns:a="http://schemas.openxmlformats.org/drawingml/2006/main" xmlns:r="http://schemas.openxmlformats.org/officeDocument/2006/relationships" xmlns:p="http://schemas.openxmlformats.org/presentationml/2006/main">
+  <p:cSld>
+    <p:spTree>
+      <p:nvGrpSpPr>
+        <p:cNvPr id="1" name=""/>
+        <p:cNvGrpSpPr/>
+        <p:nvPr/>
+      </p:nvGrpSpPr>
+      <p:grpSpPr>
+        <a:xfrm>
+          <a:off x="0" y="0"/>
+          <a:ext cx="0" cy="0"/>
+          <a:chOff x="0" y="0"/>
+          <a:chExt cx="0" cy="0"/>
+        </a:xfrm>
+      </p:grpSpPr>
+      <p:pic>
+        <p:nvPicPr>
+          <p:cNvPr id="17" name="Picture 16" descr="A aerial view of a football field&#10;&#10;Description automatically generated">
+            <a:extLst>
+              <a:ext uri="{FF2B5EF4-FFF2-40B4-BE49-F238E27FC236}">
+                <a16:creationId xmlns:a16="http://schemas.microsoft.com/office/drawing/2014/main" id="{E765C726-91B9-C2F7-7776-BD13DEC6FB65}"/>
+              </a:ext>
+            </a:extLst>
+          </p:cNvPr>
+          <p:cNvPicPr>
+            <a:picLocks noChangeAspect="1"/>
+          </p:cNvPicPr>
+          <p:nvPr/>
+        </p:nvPicPr>
+        <p:blipFill rotWithShape="1">
+          <a:blip r:embed="rId3">
+            <a:extLst>
+              <a:ext uri="{28A0092B-C50C-407E-A947-70E740481C1C}">
+                <a14:useLocalDpi xmlns:a14="http://schemas.microsoft.com/office/drawing/2010/main" val="0"/>
+              </a:ext>
+            </a:extLst>
+          </a:blip>
+          <a:srcRect l="-30" t="34181" r="30" b="34181"/>
+          <a:stretch/>
+        </p:blipFill>
+        <p:spPr>
+          <a:xfrm>
+            <a:off x="0" y="0"/>
+            <a:ext cx="9156100" cy="5143500"/>
+          </a:xfrm>
+          <a:prstGeom prst="rect">
+            <a:avLst/>
+          </a:prstGeom>
+        </p:spPr>
+      </p:pic>
+      <p:sp>
+        <p:nvSpPr>
+          <p:cNvPr id="12" name="Rectangle 11">
+            <a:extLst>
+              <a:ext uri="{FF2B5EF4-FFF2-40B4-BE49-F238E27FC236}">
+                <a16:creationId xmlns:a16="http://schemas.microsoft.com/office/drawing/2014/main" id="{BAD760F3-3A96-2311-362E-D76774272972}"/>
+              </a:ext>
+            </a:extLst>
+          </p:cNvPr>
+          <p:cNvSpPr>
+            <a:spLocks noGrp="1" noRot="1" noMove="1" noResize="1" noEditPoints="1" noAdjustHandles="1" noChangeArrowheads="1" noChangeShapeType="1"/>
+          </p:cNvSpPr>
+          <p:nvPr/>
+        </p:nvSpPr>
+        <p:spPr>
+          <a:xfrm>
+            <a:off x="0" y="-24601"/>
+            <a:ext cx="9156101" cy="5167487"/>
+          </a:xfrm>
+          <a:prstGeom prst="rect">
+            <a:avLst/>
+          </a:prstGeom>
+          <a:gradFill flip="none" rotWithShape="1">
+            <a:gsLst>
+              <a:gs pos="0">
+                <a:srgbClr val="171D41">
+                  <a:alpha val="80000"/>
+                </a:srgbClr>
+              </a:gs>
+              <a:gs pos="100000">
+                <a:srgbClr val="171D41">
+                  <a:alpha val="80000"/>
+                </a:srgbClr>
+              </a:gs>
+            </a:gsLst>
+            <a:lin ang="16200000" scaled="1"/>
+            <a:tileRect/>
+          </a:gradFill>
+          <a:ln>
+            <a:noFill/>
           </a:ln>
         </p:spPr>
         <p:style>
@@ -5371,19 +6038,63 @@
           <a:lstStyle/>
           <a:p>
             <a:pPr algn="ctr"/>
-            <a:r>
-              <a:rPr lang="en-GB" dirty="0"/>
-              <a:t>personal projects</a:t>
-            </a:r>
-          </a:p>
-        </p:txBody>
-      </p:sp>
-      <p:sp>
-        <p:nvSpPr>
-          <p:cNvPr id="42" name="Rectangle: Rounded Corners 41">
+            <a:endParaRPr lang="en-GB" dirty="0"/>
+          </a:p>
+        </p:txBody>
+      </p:sp>
+      <p:sp>
+        <p:nvSpPr>
+          <p:cNvPr id="9" name="TextBox 8">
             <a:extLst>
               <a:ext uri="{FF2B5EF4-FFF2-40B4-BE49-F238E27FC236}">
-                <a16:creationId xmlns:a16="http://schemas.microsoft.com/office/drawing/2014/main" id="{4042C9F3-2CD4-D97B-776D-1D6AC6B1DFD9}"/>
+                <a16:creationId xmlns:a16="http://schemas.microsoft.com/office/drawing/2014/main" id="{D006667C-51B5-3E00-39A8-0E5964F39C85}"/>
+              </a:ext>
+            </a:extLst>
+          </p:cNvPr>
+          <p:cNvSpPr txBox="1"/>
+          <p:nvPr/>
+        </p:nvSpPr>
+        <p:spPr>
+          <a:xfrm>
+            <a:off x="4932004" y="-938289"/>
+            <a:ext cx="990011" cy="400110"/>
+          </a:xfrm>
+          <a:prstGeom prst="rect">
+            <a:avLst/>
+          </a:prstGeom>
+          <a:noFill/>
+          <a:ln cap="flat">
+            <a:solidFill>
+              <a:srgbClr val="E3E9ED"/>
+            </a:solidFill>
+            <a:round/>
+          </a:ln>
+        </p:spPr>
+        <p:txBody>
+          <a:bodyPr wrap="square" rtlCol="0">
+            <a:spAutoFit/>
+          </a:bodyPr>
+          <a:lstStyle/>
+          <a:p>
+            <a:pPr algn="ctr"/>
+            <a:r>
+              <a:rPr lang="en-GB" sz="2000" dirty="0">
+                <a:solidFill>
+                  <a:srgbClr val="E3E9ED"/>
+                </a:solidFill>
+                <a:latin typeface="Aptos Mono" panose="020F0502020204030204" pitchFamily="49" charset="0"/>
+              </a:rPr>
+              <a:t>home</a:t>
+            </a:r>
+          </a:p>
+        </p:txBody>
+      </p:sp>
+      <p:sp>
+        <p:nvSpPr>
+          <p:cNvPr id="11" name="Rectangle: Rounded Corners 10">
+            <a:extLst>
+              <a:ext uri="{FF2B5EF4-FFF2-40B4-BE49-F238E27FC236}">
+                <a16:creationId xmlns:a16="http://schemas.microsoft.com/office/drawing/2014/main" id="{B0354E3A-B5B8-B2CD-9561-457CC7AF49DA}"/>
               </a:ext>
             </a:extLst>
           </p:cNvPr>
@@ -5392,8 +6103,8 @@
         </p:nvSpPr>
         <p:spPr>
           <a:xfrm>
-            <a:off x="5742013" y="2621645"/>
-            <a:ext cx="2790031" cy="400110"/>
+            <a:off x="4076993" y="141723"/>
+            <a:ext cx="990012" cy="400110"/>
           </a:xfrm>
           <a:prstGeom prst="roundRect">
             <a:avLst/>
@@ -5427,37 +6138,37 @@
           <a:p>
             <a:pPr algn="ctr"/>
             <a:r>
-              <a:rPr lang="en-GB" dirty="0"/>
-              <a:t>academic projects</a:t>
+              <a:rPr lang="en-GB" sz="1600" dirty="0">
+                <a:latin typeface="Aptos Mono" panose="020B0009020202020204" pitchFamily="49" charset="0"/>
+              </a:rPr>
+              <a:t>home</a:t>
             </a:r>
           </a:p>
         </p:txBody>
       </p:sp>
       <p:cxnSp>
         <p:nvCxnSpPr>
-          <p:cNvPr id="43" name="Connector: Elbow 42">
+          <p:cNvPr id="14" name="Connector: Elbow 13">
             <a:extLst>
               <a:ext uri="{FF2B5EF4-FFF2-40B4-BE49-F238E27FC236}">
-                <a16:creationId xmlns:a16="http://schemas.microsoft.com/office/drawing/2014/main" id="{130392D7-2212-A10D-06BF-20C1C1D33EDE}"/>
+                <a16:creationId xmlns:a16="http://schemas.microsoft.com/office/drawing/2014/main" id="{CFB8B575-0C84-E320-F6BE-804B2DB51851}"/>
               </a:ext>
             </a:extLst>
           </p:cNvPr>
           <p:cNvCxnSpPr>
             <a:cxnSpLocks/>
-            <a:stCxn id="42" idx="2"/>
-            <a:endCxn id="25" idx="0"/>
+            <a:stCxn id="11" idx="3"/>
+            <a:endCxn id="9" idx="2"/>
           </p:cNvCxnSpPr>
           <p:nvPr/>
         </p:nvCxnSpPr>
         <p:spPr>
-          <a:xfrm rot="16200000" flipH="1">
-            <a:off x="7002027" y="3156756"/>
-            <a:ext cx="2520028" cy="2250025"/>
-          </a:xfrm>
-          <a:prstGeom prst="bentConnector3">
-            <a:avLst>
-              <a:gd name="adj1" fmla="val 50000"/>
-            </a:avLst>
+          <a:xfrm flipV="1">
+            <a:off x="5067005" y="-538179"/>
+            <a:ext cx="360005" cy="879957"/>
+          </a:xfrm>
+          <a:prstGeom prst="bentConnector2">
+            <a:avLst/>
           </a:prstGeom>
           <a:ln w="25400">
             <a:solidFill>
@@ -5483,10 +6194,10 @@
       </p:cxnSp>
       <p:sp>
         <p:nvSpPr>
-          <p:cNvPr id="46" name="TextBox 45">
+          <p:cNvPr id="29" name="TextBox 28">
             <a:extLst>
               <a:ext uri="{FF2B5EF4-FFF2-40B4-BE49-F238E27FC236}">
-                <a16:creationId xmlns:a16="http://schemas.microsoft.com/office/drawing/2014/main" id="{F950FE46-8B14-239D-7B74-C2025367AF87}"/>
+                <a16:creationId xmlns:a16="http://schemas.microsoft.com/office/drawing/2014/main" id="{5CD68176-74AD-C22F-3695-0D55AE085A2E}"/>
               </a:ext>
             </a:extLst>
           </p:cNvPr>
@@ -5495,8 +6206,190 @@
         </p:nvSpPr>
         <p:spPr>
           <a:xfrm>
-            <a:off x="3653431" y="2601422"/>
-            <a:ext cx="1130507" cy="189924"/>
+            <a:off x="2411975" y="1131734"/>
+            <a:ext cx="4320048" cy="646331"/>
+          </a:xfrm>
+          <a:prstGeom prst="rect">
+            <a:avLst/>
+          </a:prstGeom>
+          <a:noFill/>
+          <a:ln cap="flat">
+            <a:solidFill>
+              <a:srgbClr val="E3E9ED"/>
+            </a:solidFill>
+            <a:round/>
+          </a:ln>
+        </p:spPr>
+        <p:txBody>
+          <a:bodyPr wrap="square" rtlCol="0">
+            <a:spAutoFit/>
+          </a:bodyPr>
+          <a:lstStyle/>
+          <a:p>
+            <a:r>
+              <a:rPr lang="en-GB" sz="3600" dirty="0">
+                <a:solidFill>
+                  <a:srgbClr val="E3E9ED"/>
+                </a:solidFill>
+                <a:latin typeface="Aptos Mono" panose="020F0502020204030204" pitchFamily="49" charset="0"/>
+              </a:rPr>
+              <a:t>hi, i’m tayyab</a:t>
+            </a:r>
+          </a:p>
+        </p:txBody>
+      </p:sp>
+      <p:sp>
+        <p:nvSpPr>
+          <p:cNvPr id="30" name="TextBox 29">
+            <a:extLst>
+              <a:ext uri="{FF2B5EF4-FFF2-40B4-BE49-F238E27FC236}">
+                <a16:creationId xmlns:a16="http://schemas.microsoft.com/office/drawing/2014/main" id="{51686545-F180-6D5F-B3ED-726DCA27EF97}"/>
+              </a:ext>
+            </a:extLst>
+          </p:cNvPr>
+          <p:cNvSpPr txBox="1"/>
+          <p:nvPr/>
+        </p:nvSpPr>
+        <p:spPr>
+          <a:xfrm>
+            <a:off x="2411976" y="1954180"/>
+            <a:ext cx="4320047" cy="584775"/>
+          </a:xfrm>
+          <a:prstGeom prst="rect">
+            <a:avLst/>
+          </a:prstGeom>
+          <a:noFill/>
+          <a:ln cap="flat">
+            <a:solidFill>
+              <a:srgbClr val="E3E9ED"/>
+            </a:solidFill>
+            <a:round/>
+          </a:ln>
+        </p:spPr>
+        <p:txBody>
+          <a:bodyPr wrap="square" rtlCol="0">
+            <a:spAutoFit/>
+          </a:bodyPr>
+          <a:lstStyle/>
+          <a:p>
+            <a:r>
+              <a:rPr lang="en-GB" sz="1600" dirty="0">
+                <a:solidFill>
+                  <a:srgbClr val="E3E9ED"/>
+                </a:solidFill>
+                <a:latin typeface="Aptos Mono" panose="020F0502020204030204" pitchFamily="49" charset="0"/>
+              </a:rPr>
+              <a:t>i`m a software engineer currently working at the access group uk</a:t>
+            </a:r>
+          </a:p>
+        </p:txBody>
+      </p:sp>
+      <p:cxnSp>
+        <p:nvCxnSpPr>
+          <p:cNvPr id="34" name="Straight Connector 33">
+            <a:extLst>
+              <a:ext uri="{FF2B5EF4-FFF2-40B4-BE49-F238E27FC236}">
+                <a16:creationId xmlns:a16="http://schemas.microsoft.com/office/drawing/2014/main" id="{068DC2B6-015A-A649-E9D6-D6855DB91090}"/>
+              </a:ext>
+            </a:extLst>
+          </p:cNvPr>
+          <p:cNvCxnSpPr>
+            <a:cxnSpLocks/>
+          </p:cNvCxnSpPr>
+          <p:nvPr/>
+        </p:nvCxnSpPr>
+        <p:spPr>
+          <a:xfrm>
+            <a:off x="3851992" y="2481749"/>
+            <a:ext cx="2340026" cy="0"/>
+          </a:xfrm>
+          <a:prstGeom prst="line">
+            <a:avLst/>
+          </a:prstGeom>
+          <a:ln>
+            <a:solidFill>
+              <a:srgbClr val="E3E9ED"/>
+            </a:solidFill>
+          </a:ln>
+        </p:spPr>
+        <p:style>
+          <a:lnRef idx="2">
+            <a:schemeClr val="accent1"/>
+          </a:lnRef>
+          <a:fillRef idx="0">
+            <a:schemeClr val="accent1"/>
+          </a:fillRef>
+          <a:effectRef idx="1">
+            <a:schemeClr val="accent1"/>
+          </a:effectRef>
+          <a:fontRef idx="minor">
+            <a:schemeClr val="tx1"/>
+          </a:fontRef>
+        </p:style>
+      </p:cxnSp>
+      <p:cxnSp>
+        <p:nvCxnSpPr>
+          <p:cNvPr id="38" name="Connector: Elbow 37">
+            <a:extLst>
+              <a:ext uri="{FF2B5EF4-FFF2-40B4-BE49-F238E27FC236}">
+                <a16:creationId xmlns:a16="http://schemas.microsoft.com/office/drawing/2014/main" id="{74E0F9A9-68C5-4384-A2A6-763DC4E02043}"/>
+              </a:ext>
+            </a:extLst>
+          </p:cNvPr>
+          <p:cNvCxnSpPr>
+            <a:cxnSpLocks/>
+            <a:endCxn id="45" idx="2"/>
+          </p:cNvCxnSpPr>
+          <p:nvPr/>
+        </p:nvCxnSpPr>
+        <p:spPr>
+          <a:xfrm rot="5400000" flipH="1" flipV="1">
+            <a:off x="4993363" y="370111"/>
+            <a:ext cx="3301810" cy="895520"/>
+          </a:xfrm>
+          <a:prstGeom prst="bentConnector3">
+            <a:avLst>
+              <a:gd name="adj1" fmla="val -464"/>
+            </a:avLst>
+          </a:prstGeom>
+          <a:ln w="25400">
+            <a:solidFill>
+              <a:srgbClr val="FFC000"/>
+            </a:solidFill>
+            <a:tailEnd type="triangle"/>
+          </a:ln>
+        </p:spPr>
+        <p:style>
+          <a:lnRef idx="2">
+            <a:schemeClr val="accent1"/>
+          </a:lnRef>
+          <a:fillRef idx="0">
+            <a:schemeClr val="accent1"/>
+          </a:fillRef>
+          <a:effectRef idx="1">
+            <a:schemeClr val="accent1"/>
+          </a:effectRef>
+          <a:fontRef idx="minor">
+            <a:schemeClr val="tx1"/>
+          </a:fontRef>
+        </p:style>
+      </p:cxnSp>
+      <p:sp>
+        <p:nvSpPr>
+          <p:cNvPr id="45" name="TextBox 44">
+            <a:extLst>
+              <a:ext uri="{FF2B5EF4-FFF2-40B4-BE49-F238E27FC236}">
+                <a16:creationId xmlns:a16="http://schemas.microsoft.com/office/drawing/2014/main" id="{61987082-362D-4BA4-E4CA-659492AE6F3F}"/>
+              </a:ext>
+            </a:extLst>
+          </p:cNvPr>
+          <p:cNvSpPr txBox="1"/>
+          <p:nvPr/>
+        </p:nvSpPr>
+        <p:spPr>
+          <a:xfrm>
+            <a:off x="6372020" y="-1171588"/>
+            <a:ext cx="1440015" cy="338554"/>
           </a:xfrm>
           <a:prstGeom prst="rect">
             <a:avLst/>
@@ -5515,12 +6408,225 @@
           <a:lstStyle/>
           <a:p>
             <a:r>
-              <a:rPr lang="en-GB" sz="634" dirty="0">
+              <a:rPr lang="en-GB" sz="800" dirty="0">
                 <a:solidFill>
-                  <a:schemeClr val="bg1"/>
+                  <a:srgbClr val="E3E9ED"/>
                 </a:solidFill>
               </a:rPr>
-              <a:t>Rounded box?</a:t>
+              <a:t>Link to access group about page</a:t>
+            </a:r>
+          </a:p>
+        </p:txBody>
+      </p:sp>
+      <p:sp>
+        <p:nvSpPr>
+          <p:cNvPr id="48" name="TextBox 47">
+            <a:extLst>
+              <a:ext uri="{FF2B5EF4-FFF2-40B4-BE49-F238E27FC236}">
+                <a16:creationId xmlns:a16="http://schemas.microsoft.com/office/drawing/2014/main" id="{C420CB70-AFA4-CD54-5C10-F5DF94C8630B}"/>
+              </a:ext>
+            </a:extLst>
+          </p:cNvPr>
+          <p:cNvSpPr txBox="1"/>
+          <p:nvPr/>
+        </p:nvSpPr>
+        <p:spPr>
+          <a:xfrm>
+            <a:off x="2411975" y="2715679"/>
+            <a:ext cx="4320047" cy="1323439"/>
+          </a:xfrm>
+          <a:prstGeom prst="rect">
+            <a:avLst/>
+          </a:prstGeom>
+          <a:noFill/>
+          <a:ln cap="flat">
+            <a:solidFill>
+              <a:srgbClr val="E3E9ED"/>
+            </a:solidFill>
+            <a:round/>
+          </a:ln>
+        </p:spPr>
+        <p:txBody>
+          <a:bodyPr wrap="square" rtlCol="0">
+            <a:spAutoFit/>
+          </a:bodyPr>
+          <a:lstStyle/>
+          <a:p>
+            <a:r>
+              <a:rPr lang="en-GB" sz="1600" dirty="0" err="1">
+                <a:solidFill>
+                  <a:srgbClr val="E3E9ED"/>
+                </a:solidFill>
+                <a:latin typeface="Aptos Mono" panose="020F0502020204030204" pitchFamily="49" charset="0"/>
+              </a:rPr>
+              <a:t>i</a:t>
+            </a:r>
+            <a:r>
+              <a:rPr lang="en-GB" sz="1600" dirty="0">
+                <a:solidFill>
+                  <a:srgbClr val="E3E9ED"/>
+                </a:solidFill>
+                <a:latin typeface="Aptos Mono" panose="020F0502020204030204" pitchFamily="49" charset="0"/>
+              </a:rPr>
+              <a:t> have been programming for roughly 10 years</a:t>
+            </a:r>
+          </a:p>
+          <a:p>
+            <a:endParaRPr lang="en-GB" sz="1600" dirty="0">
+              <a:solidFill>
+                <a:srgbClr val="E3E9ED"/>
+              </a:solidFill>
+              <a:latin typeface="Aptos Mono" panose="020F0502020204030204" pitchFamily="49" charset="0"/>
+            </a:endParaRPr>
+          </a:p>
+          <a:p>
+            <a:r>
+              <a:rPr lang="en-GB" sz="1600" dirty="0">
+                <a:solidFill>
+                  <a:srgbClr val="E3E9ED"/>
+                </a:solidFill>
+                <a:latin typeface="Aptos Mono" panose="020F0502020204030204" pitchFamily="49" charset="0"/>
+              </a:rPr>
+              <a:t>my ability to learn and pick up new skills is what sets me apart</a:t>
+            </a:r>
+          </a:p>
+        </p:txBody>
+      </p:sp>
+      <p:sp>
+        <p:nvSpPr>
+          <p:cNvPr id="49" name="Rectangle 48">
+            <a:extLst>
+              <a:ext uri="{FF2B5EF4-FFF2-40B4-BE49-F238E27FC236}">
+                <a16:creationId xmlns:a16="http://schemas.microsoft.com/office/drawing/2014/main" id="{B32ADD89-4C72-3752-4392-1D2734DAF995}"/>
+              </a:ext>
+            </a:extLst>
+          </p:cNvPr>
+          <p:cNvSpPr/>
+          <p:nvPr/>
+        </p:nvSpPr>
+        <p:spPr>
+          <a:xfrm>
+            <a:off x="8982049" y="51722"/>
+            <a:ext cx="90001" cy="1440016"/>
+          </a:xfrm>
+          <a:prstGeom prst="rect">
+            <a:avLst/>
+          </a:prstGeom>
+          <a:solidFill>
+            <a:srgbClr val="E3E9ED"/>
+          </a:solidFill>
+        </p:spPr>
+        <p:style>
+          <a:lnRef idx="2">
+            <a:schemeClr val="accent1">
+              <a:shade val="15000"/>
+            </a:schemeClr>
+          </a:lnRef>
+          <a:fillRef idx="1">
+            <a:schemeClr val="accent1"/>
+          </a:fillRef>
+          <a:effectRef idx="0">
+            <a:schemeClr val="accent1"/>
+          </a:effectRef>
+          <a:fontRef idx="minor">
+            <a:schemeClr val="lt1"/>
+          </a:fontRef>
+        </p:style>
+        <p:txBody>
+          <a:bodyPr rtlCol="0" anchor="ctr"/>
+          <a:lstStyle/>
+          <a:p>
+            <a:pPr algn="ctr"/>
+            <a:endParaRPr lang="en-GB"/>
+          </a:p>
+        </p:txBody>
+      </p:sp>
+      <p:cxnSp>
+        <p:nvCxnSpPr>
+          <p:cNvPr id="50" name="Connector: Elbow 49">
+            <a:extLst>
+              <a:ext uri="{FF2B5EF4-FFF2-40B4-BE49-F238E27FC236}">
+                <a16:creationId xmlns:a16="http://schemas.microsoft.com/office/drawing/2014/main" id="{A06DC60A-1540-45AB-BD92-FA504C543658}"/>
+              </a:ext>
+            </a:extLst>
+          </p:cNvPr>
+          <p:cNvCxnSpPr>
+            <a:cxnSpLocks/>
+            <a:stCxn id="49" idx="1"/>
+            <a:endCxn id="53" idx="2"/>
+          </p:cNvCxnSpPr>
+          <p:nvPr/>
+        </p:nvCxnSpPr>
+        <p:spPr>
+          <a:xfrm rot="10800000">
+            <a:off x="8221533" y="-382650"/>
+            <a:ext cx="760517" cy="1154381"/>
+          </a:xfrm>
+          <a:prstGeom prst="bentConnector2">
+            <a:avLst/>
+          </a:prstGeom>
+          <a:ln w="25400">
+            <a:solidFill>
+              <a:srgbClr val="FFC000"/>
+            </a:solidFill>
+            <a:tailEnd type="triangle"/>
+          </a:ln>
+        </p:spPr>
+        <p:style>
+          <a:lnRef idx="2">
+            <a:schemeClr val="accent1"/>
+          </a:lnRef>
+          <a:fillRef idx="0">
+            <a:schemeClr val="accent1"/>
+          </a:fillRef>
+          <a:effectRef idx="1">
+            <a:schemeClr val="accent1"/>
+          </a:effectRef>
+          <a:fontRef idx="minor">
+            <a:schemeClr val="tx1"/>
+          </a:fontRef>
+        </p:style>
+      </p:cxnSp>
+      <p:sp>
+        <p:nvSpPr>
+          <p:cNvPr id="53" name="TextBox 52">
+            <a:extLst>
+              <a:ext uri="{FF2B5EF4-FFF2-40B4-BE49-F238E27FC236}">
+                <a16:creationId xmlns:a16="http://schemas.microsoft.com/office/drawing/2014/main" id="{16488D30-9E6E-AB54-01AB-9CE982AE612F}"/>
+              </a:ext>
+            </a:extLst>
+          </p:cNvPr>
+          <p:cNvSpPr txBox="1"/>
+          <p:nvPr/>
+        </p:nvSpPr>
+        <p:spPr>
+          <a:xfrm>
+            <a:off x="7501524" y="-598095"/>
+            <a:ext cx="1440015" cy="215444"/>
+          </a:xfrm>
+          <a:prstGeom prst="rect">
+            <a:avLst/>
+          </a:prstGeom>
+          <a:noFill/>
+          <a:ln w="38100">
+            <a:solidFill>
+              <a:srgbClr val="FFC000"/>
+            </a:solidFill>
+          </a:ln>
+        </p:spPr>
+        <p:txBody>
+          <a:bodyPr wrap="square" rtlCol="0">
+            <a:spAutoFit/>
+          </a:bodyPr>
+          <a:lstStyle/>
+          <a:p>
+            <a:r>
+              <a:rPr lang="en-GB" sz="800" dirty="0">
+                <a:solidFill>
+                  <a:srgbClr val="E3E9ED"/>
+                </a:solidFill>
+              </a:rPr>
+              <a:t>Scroll wheel</a:t>
             </a:r>
           </a:p>
         </p:txBody>
@@ -5528,7 +6634,7 @@
     </p:spTree>
     <p:extLst>
       <p:ext uri="{BB962C8B-B14F-4D97-AF65-F5344CB8AC3E}">
-        <p14:creationId xmlns:p14="http://schemas.microsoft.com/office/powerpoint/2010/main" val="1122932674"/>
+        <p14:creationId xmlns:p14="http://schemas.microsoft.com/office/powerpoint/2010/main" val="2259331862"/>
       </p:ext>
     </p:extLst>
   </p:cSld>

</xml_diff>

<commit_message>
finished first about page graphic. started second about page graphic.
</commit_message>
<xml_diff>
--- a/Portfolio-Project-Personal-Portfolio-Website/Wireframes.pptx
+++ b/Portfolio-Project-Personal-Portfolio-Website/Wireframes.pptx
@@ -5,12 +5,14 @@
     <p:sldMasterId id="2147483708" r:id="rId1"/>
   </p:sldMasterIdLst>
   <p:notesMasterIdLst>
-    <p:notesMasterId r:id="rId5"/>
+    <p:notesMasterId r:id="rId7"/>
   </p:notesMasterIdLst>
   <p:sldIdLst>
     <p:sldId id="256" r:id="rId2"/>
     <p:sldId id="257" r:id="rId3"/>
     <p:sldId id="258" r:id="rId4"/>
+    <p:sldId id="259" r:id="rId5"/>
+    <p:sldId id="260" r:id="rId6"/>
   </p:sldIdLst>
   <p:sldSz cx="9144000" cy="5143500" type="screen16x9"/>
   <p:notesSz cx="6858000" cy="9144000"/>
@@ -199,7 +201,7 @@
           <a:p>
             <a:fld id="{A273ECB5-27FA-4334-B172-E40162A074CC}" type="datetimeFigureOut">
               <a:rPr lang="en-GB" smtClean="0"/>
-              <a:t>16/08/2024</a:t>
+              <a:t>19/08/2024</a:t>
             </a:fld>
             <a:endParaRPr lang="en-GB" dirty="0"/>
           </a:p>
@@ -635,6 +637,174 @@
 </p:notes>
 </file>
 
+<file path=ppt/notesSlides/notesSlide3.xml><?xml version="1.0" encoding="utf-8"?>
+<p:notes xmlns:a="http://schemas.openxmlformats.org/drawingml/2006/main" xmlns:r="http://schemas.openxmlformats.org/officeDocument/2006/relationships" xmlns:p="http://schemas.openxmlformats.org/presentationml/2006/main">
+  <p:cSld>
+    <p:spTree>
+      <p:nvGrpSpPr>
+        <p:cNvPr id="1" name=""/>
+        <p:cNvGrpSpPr/>
+        <p:nvPr/>
+      </p:nvGrpSpPr>
+      <p:grpSpPr>
+        <a:xfrm>
+          <a:off x="0" y="0"/>
+          <a:ext cx="0" cy="0"/>
+          <a:chOff x="0" y="0"/>
+          <a:chExt cx="0" cy="0"/>
+        </a:xfrm>
+      </p:grpSpPr>
+      <p:sp>
+        <p:nvSpPr>
+          <p:cNvPr id="2" name="Slide Image Placeholder 1"/>
+          <p:cNvSpPr>
+            <a:spLocks noGrp="1" noRot="1" noChangeAspect="1"/>
+          </p:cNvSpPr>
+          <p:nvPr>
+            <p:ph type="sldImg"/>
+          </p:nvPr>
+        </p:nvSpPr>
+        <p:spPr/>
+      </p:sp>
+      <p:sp>
+        <p:nvSpPr>
+          <p:cNvPr id="3" name="Notes Placeholder 2"/>
+          <p:cNvSpPr>
+            <a:spLocks noGrp="1"/>
+          </p:cNvSpPr>
+          <p:nvPr>
+            <p:ph type="body" idx="1"/>
+          </p:nvPr>
+        </p:nvSpPr>
+        <p:spPr/>
+        <p:txBody>
+          <a:bodyPr/>
+          <a:lstStyle/>
+          <a:p>
+            <a:endParaRPr lang="en-GB" dirty="0"/>
+          </a:p>
+        </p:txBody>
+      </p:sp>
+      <p:sp>
+        <p:nvSpPr>
+          <p:cNvPr id="4" name="Slide Number Placeholder 3"/>
+          <p:cNvSpPr>
+            <a:spLocks noGrp="1"/>
+          </p:cNvSpPr>
+          <p:nvPr>
+            <p:ph type="sldNum" sz="quarter" idx="5"/>
+          </p:nvPr>
+        </p:nvSpPr>
+        <p:spPr/>
+        <p:txBody>
+          <a:bodyPr/>
+          <a:lstStyle/>
+          <a:p>
+            <a:fld id="{EC8F3035-11B3-46F6-8FD1-FF84F47AA3E8}" type="slidenum">
+              <a:rPr lang="en-GB" smtClean="0"/>
+              <a:t>4</a:t>
+            </a:fld>
+            <a:endParaRPr lang="en-GB" dirty="0"/>
+          </a:p>
+        </p:txBody>
+      </p:sp>
+    </p:spTree>
+    <p:extLst>
+      <p:ext uri="{BB962C8B-B14F-4D97-AF65-F5344CB8AC3E}">
+        <p14:creationId xmlns:p14="http://schemas.microsoft.com/office/powerpoint/2010/main" val="3587513846"/>
+      </p:ext>
+    </p:extLst>
+  </p:cSld>
+  <p:clrMapOvr>
+    <a:masterClrMapping/>
+  </p:clrMapOvr>
+</p:notes>
+</file>
+
+<file path=ppt/notesSlides/notesSlide4.xml><?xml version="1.0" encoding="utf-8"?>
+<p:notes xmlns:a="http://schemas.openxmlformats.org/drawingml/2006/main" xmlns:r="http://schemas.openxmlformats.org/officeDocument/2006/relationships" xmlns:p="http://schemas.openxmlformats.org/presentationml/2006/main">
+  <p:cSld>
+    <p:spTree>
+      <p:nvGrpSpPr>
+        <p:cNvPr id="1" name=""/>
+        <p:cNvGrpSpPr/>
+        <p:nvPr/>
+      </p:nvGrpSpPr>
+      <p:grpSpPr>
+        <a:xfrm>
+          <a:off x="0" y="0"/>
+          <a:ext cx="0" cy="0"/>
+          <a:chOff x="0" y="0"/>
+          <a:chExt cx="0" cy="0"/>
+        </a:xfrm>
+      </p:grpSpPr>
+      <p:sp>
+        <p:nvSpPr>
+          <p:cNvPr id="2" name="Slide Image Placeholder 1"/>
+          <p:cNvSpPr>
+            <a:spLocks noGrp="1" noRot="1" noChangeAspect="1"/>
+          </p:cNvSpPr>
+          <p:nvPr>
+            <p:ph type="sldImg"/>
+          </p:nvPr>
+        </p:nvSpPr>
+        <p:spPr/>
+      </p:sp>
+      <p:sp>
+        <p:nvSpPr>
+          <p:cNvPr id="3" name="Notes Placeholder 2"/>
+          <p:cNvSpPr>
+            <a:spLocks noGrp="1"/>
+          </p:cNvSpPr>
+          <p:nvPr>
+            <p:ph type="body" idx="1"/>
+          </p:nvPr>
+        </p:nvSpPr>
+        <p:spPr/>
+        <p:txBody>
+          <a:bodyPr/>
+          <a:lstStyle/>
+          <a:p>
+            <a:endParaRPr lang="en-GB" dirty="0"/>
+          </a:p>
+        </p:txBody>
+      </p:sp>
+      <p:sp>
+        <p:nvSpPr>
+          <p:cNvPr id="4" name="Slide Number Placeholder 3"/>
+          <p:cNvSpPr>
+            <a:spLocks noGrp="1"/>
+          </p:cNvSpPr>
+          <p:nvPr>
+            <p:ph type="sldNum" sz="quarter" idx="5"/>
+          </p:nvPr>
+        </p:nvSpPr>
+        <p:spPr/>
+        <p:txBody>
+          <a:bodyPr/>
+          <a:lstStyle/>
+          <a:p>
+            <a:fld id="{EC8F3035-11B3-46F6-8FD1-FF84F47AA3E8}" type="slidenum">
+              <a:rPr lang="en-GB" smtClean="0"/>
+              <a:t>5</a:t>
+            </a:fld>
+            <a:endParaRPr lang="en-GB" dirty="0"/>
+          </a:p>
+        </p:txBody>
+      </p:sp>
+    </p:spTree>
+    <p:extLst>
+      <p:ext uri="{BB962C8B-B14F-4D97-AF65-F5344CB8AC3E}">
+        <p14:creationId xmlns:p14="http://schemas.microsoft.com/office/powerpoint/2010/main" val="466335066"/>
+      </p:ext>
+    </p:extLst>
+  </p:cSld>
+  <p:clrMapOvr>
+    <a:masterClrMapping/>
+  </p:clrMapOvr>
+</p:notes>
+</file>
+
 <file path=ppt/slideLayouts/slideLayout1.xml><?xml version="1.0" encoding="utf-8"?>
 <p:sldLayout xmlns:a="http://schemas.openxmlformats.org/drawingml/2006/main" xmlns:r="http://schemas.openxmlformats.org/officeDocument/2006/relationships" xmlns:p="http://schemas.openxmlformats.org/presentationml/2006/main" type="title" preserve="1">
   <p:cSld name="Title Slide">
@@ -766,7 +936,7 @@
           <a:p>
             <a:fld id="{BB19518F-CAD7-4222-B826-8CD348F393C6}" type="datetimeFigureOut">
               <a:rPr lang="en-GB" smtClean="0"/>
-              <a:t>16/08/2024</a:t>
+              <a:t>19/08/2024</a:t>
             </a:fld>
             <a:endParaRPr lang="en-GB" dirty="0"/>
           </a:p>
@@ -936,7 +1106,7 @@
           <a:p>
             <a:fld id="{BB19518F-CAD7-4222-B826-8CD348F393C6}" type="datetimeFigureOut">
               <a:rPr lang="en-GB" smtClean="0"/>
-              <a:t>16/08/2024</a:t>
+              <a:t>19/08/2024</a:t>
             </a:fld>
             <a:endParaRPr lang="en-GB" dirty="0"/>
           </a:p>
@@ -1116,7 +1286,7 @@
           <a:p>
             <a:fld id="{BB19518F-CAD7-4222-B826-8CD348F393C6}" type="datetimeFigureOut">
               <a:rPr lang="en-GB" smtClean="0"/>
-              <a:t>16/08/2024</a:t>
+              <a:t>19/08/2024</a:t>
             </a:fld>
             <a:endParaRPr lang="en-GB" dirty="0"/>
           </a:p>
@@ -1286,7 +1456,7 @@
           <a:p>
             <a:fld id="{BB19518F-CAD7-4222-B826-8CD348F393C6}" type="datetimeFigureOut">
               <a:rPr lang="en-GB" smtClean="0"/>
-              <a:t>16/08/2024</a:t>
+              <a:t>19/08/2024</a:t>
             </a:fld>
             <a:endParaRPr lang="en-GB" dirty="0"/>
           </a:p>
@@ -1532,7 +1702,7 @@
           <a:p>
             <a:fld id="{BB19518F-CAD7-4222-B826-8CD348F393C6}" type="datetimeFigureOut">
               <a:rPr lang="en-GB" smtClean="0"/>
-              <a:t>16/08/2024</a:t>
+              <a:t>19/08/2024</a:t>
             </a:fld>
             <a:endParaRPr lang="en-GB" dirty="0"/>
           </a:p>
@@ -1764,7 +1934,7 @@
           <a:p>
             <a:fld id="{BB19518F-CAD7-4222-B826-8CD348F393C6}" type="datetimeFigureOut">
               <a:rPr lang="en-GB" smtClean="0"/>
-              <a:t>16/08/2024</a:t>
+              <a:t>19/08/2024</a:t>
             </a:fld>
             <a:endParaRPr lang="en-GB" dirty="0"/>
           </a:p>
@@ -2131,7 +2301,7 @@
           <a:p>
             <a:fld id="{BB19518F-CAD7-4222-B826-8CD348F393C6}" type="datetimeFigureOut">
               <a:rPr lang="en-GB" smtClean="0"/>
-              <a:t>16/08/2024</a:t>
+              <a:t>19/08/2024</a:t>
             </a:fld>
             <a:endParaRPr lang="en-GB" dirty="0"/>
           </a:p>
@@ -2249,7 +2419,7 @@
           <a:p>
             <a:fld id="{BB19518F-CAD7-4222-B826-8CD348F393C6}" type="datetimeFigureOut">
               <a:rPr lang="en-GB" smtClean="0"/>
-              <a:t>16/08/2024</a:t>
+              <a:t>19/08/2024</a:t>
             </a:fld>
             <a:endParaRPr lang="en-GB" dirty="0"/>
           </a:p>
@@ -2344,7 +2514,7 @@
           <a:p>
             <a:fld id="{BB19518F-CAD7-4222-B826-8CD348F393C6}" type="datetimeFigureOut">
               <a:rPr lang="en-GB" smtClean="0"/>
-              <a:t>16/08/2024</a:t>
+              <a:t>19/08/2024</a:t>
             </a:fld>
             <a:endParaRPr lang="en-GB" dirty="0"/>
           </a:p>
@@ -2621,7 +2791,7 @@
           <a:p>
             <a:fld id="{BB19518F-CAD7-4222-B826-8CD348F393C6}" type="datetimeFigureOut">
               <a:rPr lang="en-GB" smtClean="0"/>
-              <a:t>16/08/2024</a:t>
+              <a:t>19/08/2024</a:t>
             </a:fld>
             <a:endParaRPr lang="en-GB" dirty="0"/>
           </a:p>
@@ -2877,7 +3047,7 @@
           <a:p>
             <a:fld id="{BB19518F-CAD7-4222-B826-8CD348F393C6}" type="datetimeFigureOut">
               <a:rPr lang="en-GB" smtClean="0"/>
-              <a:t>16/08/2024</a:t>
+              <a:t>19/08/2024</a:t>
             </a:fld>
             <a:endParaRPr lang="en-GB" dirty="0"/>
           </a:p>
@@ -3090,7 +3260,7 @@
           <a:p>
             <a:fld id="{BB19518F-CAD7-4222-B826-8CD348F393C6}" type="datetimeFigureOut">
               <a:rPr lang="en-GB" smtClean="0"/>
-              <a:t>16/08/2024</a:t>
+              <a:t>19/08/2024</a:t>
             </a:fld>
             <a:endParaRPr lang="en-GB" dirty="0"/>
           </a:p>
@@ -4691,7 +4861,7 @@
                   <a:schemeClr val="bg1"/>
                 </a:solidFill>
               </a:rPr>
-              <a:t>Contains about me and contact</a:t>
+              <a:t>Contains  home and contact</a:t>
             </a:r>
           </a:p>
         </p:txBody>
@@ -6631,10 +6801,2242 @@
           </a:p>
         </p:txBody>
       </p:sp>
+      <p:sp>
+        <p:nvSpPr>
+          <p:cNvPr id="2" name="TextBox 1">
+            <a:extLst>
+              <a:ext uri="{FF2B5EF4-FFF2-40B4-BE49-F238E27FC236}">
+                <a16:creationId xmlns:a16="http://schemas.microsoft.com/office/drawing/2014/main" id="{78E9BE3F-A99C-B7D1-3797-857235E8A3FD}"/>
+              </a:ext>
+            </a:extLst>
+          </p:cNvPr>
+          <p:cNvSpPr txBox="1"/>
+          <p:nvPr/>
+        </p:nvSpPr>
+        <p:spPr>
+          <a:xfrm>
+            <a:off x="72232" y="-629879"/>
+            <a:ext cx="1130507" cy="189924"/>
+          </a:xfrm>
+          <a:prstGeom prst="rect">
+            <a:avLst/>
+          </a:prstGeom>
+          <a:noFill/>
+          <a:ln w="38100">
+            <a:solidFill>
+              <a:srgbClr val="FFC000"/>
+            </a:solidFill>
+          </a:ln>
+        </p:spPr>
+        <p:txBody>
+          <a:bodyPr wrap="square" rtlCol="0">
+            <a:spAutoFit/>
+          </a:bodyPr>
+          <a:lstStyle/>
+          <a:p>
+            <a:r>
+              <a:rPr lang="en-GB" sz="634" dirty="0">
+                <a:solidFill>
+                  <a:schemeClr val="bg1"/>
+                </a:solidFill>
+              </a:rPr>
+              <a:t>About Page</a:t>
+            </a:r>
+          </a:p>
+        </p:txBody>
+      </p:sp>
     </p:spTree>
     <p:extLst>
       <p:ext uri="{BB962C8B-B14F-4D97-AF65-F5344CB8AC3E}">
         <p14:creationId xmlns:p14="http://schemas.microsoft.com/office/powerpoint/2010/main" val="2259331862"/>
+      </p:ext>
+    </p:extLst>
+  </p:cSld>
+  <p:clrMapOvr>
+    <a:masterClrMapping/>
+  </p:clrMapOvr>
+</p:sld>
+</file>
+
+<file path=ppt/slides/slide4.xml><?xml version="1.0" encoding="utf-8"?>
+<p:sld xmlns:a="http://schemas.openxmlformats.org/drawingml/2006/main" xmlns:r="http://schemas.openxmlformats.org/officeDocument/2006/relationships" xmlns:p="http://schemas.openxmlformats.org/presentationml/2006/main">
+  <p:cSld>
+    <p:spTree>
+      <p:nvGrpSpPr>
+        <p:cNvPr id="1" name=""/>
+        <p:cNvGrpSpPr/>
+        <p:nvPr/>
+      </p:nvGrpSpPr>
+      <p:grpSpPr>
+        <a:xfrm>
+          <a:off x="0" y="0"/>
+          <a:ext cx="0" cy="0"/>
+          <a:chOff x="0" y="0"/>
+          <a:chExt cx="0" cy="0"/>
+        </a:xfrm>
+      </p:grpSpPr>
+      <p:pic>
+        <p:nvPicPr>
+          <p:cNvPr id="17" name="Picture 16" descr="A aerial view of a football field&#10;&#10;Description automatically generated">
+            <a:extLst>
+              <a:ext uri="{FF2B5EF4-FFF2-40B4-BE49-F238E27FC236}">
+                <a16:creationId xmlns:a16="http://schemas.microsoft.com/office/drawing/2014/main" id="{E765C726-91B9-C2F7-7776-BD13DEC6FB65}"/>
+              </a:ext>
+            </a:extLst>
+          </p:cNvPr>
+          <p:cNvPicPr>
+            <a:picLocks noChangeAspect="1"/>
+          </p:cNvPicPr>
+          <p:nvPr/>
+        </p:nvPicPr>
+        <p:blipFill rotWithShape="1">
+          <a:blip r:embed="rId3">
+            <a:extLst>
+              <a:ext uri="{28A0092B-C50C-407E-A947-70E740481C1C}">
+                <a14:useLocalDpi xmlns:a14="http://schemas.microsoft.com/office/drawing/2010/main" val="0"/>
+              </a:ext>
+            </a:extLst>
+          </a:blip>
+          <a:srcRect l="-30" t="34181" r="30" b="34181"/>
+          <a:stretch/>
+        </p:blipFill>
+        <p:spPr>
+          <a:xfrm>
+            <a:off x="0" y="0"/>
+            <a:ext cx="9156100" cy="5143500"/>
+          </a:xfrm>
+          <a:prstGeom prst="rect">
+            <a:avLst/>
+          </a:prstGeom>
+        </p:spPr>
+      </p:pic>
+      <p:sp>
+        <p:nvSpPr>
+          <p:cNvPr id="12" name="Rectangle 11">
+            <a:extLst>
+              <a:ext uri="{FF2B5EF4-FFF2-40B4-BE49-F238E27FC236}">
+                <a16:creationId xmlns:a16="http://schemas.microsoft.com/office/drawing/2014/main" id="{BAD760F3-3A96-2311-362E-D76774272972}"/>
+              </a:ext>
+            </a:extLst>
+          </p:cNvPr>
+          <p:cNvSpPr>
+            <a:spLocks noGrp="1" noRot="1" noMove="1" noResize="1" noEditPoints="1" noAdjustHandles="1" noChangeArrowheads="1" noChangeShapeType="1"/>
+          </p:cNvSpPr>
+          <p:nvPr/>
+        </p:nvSpPr>
+        <p:spPr>
+          <a:xfrm>
+            <a:off x="0" y="-24601"/>
+            <a:ext cx="9156101" cy="5167487"/>
+          </a:xfrm>
+          <a:prstGeom prst="rect">
+            <a:avLst/>
+          </a:prstGeom>
+          <a:gradFill flip="none" rotWithShape="1">
+            <a:gsLst>
+              <a:gs pos="0">
+                <a:srgbClr val="171D41">
+                  <a:alpha val="80000"/>
+                </a:srgbClr>
+              </a:gs>
+              <a:gs pos="100000">
+                <a:srgbClr val="171D41">
+                  <a:alpha val="80000"/>
+                </a:srgbClr>
+              </a:gs>
+            </a:gsLst>
+            <a:lin ang="16200000" scaled="1"/>
+            <a:tileRect/>
+          </a:gradFill>
+          <a:ln>
+            <a:noFill/>
+          </a:ln>
+        </p:spPr>
+        <p:style>
+          <a:lnRef idx="2">
+            <a:schemeClr val="accent1">
+              <a:shade val="15000"/>
+            </a:schemeClr>
+          </a:lnRef>
+          <a:fillRef idx="1">
+            <a:schemeClr val="accent1"/>
+          </a:fillRef>
+          <a:effectRef idx="0">
+            <a:schemeClr val="accent1"/>
+          </a:effectRef>
+          <a:fontRef idx="minor">
+            <a:schemeClr val="lt1"/>
+          </a:fontRef>
+        </p:style>
+        <p:txBody>
+          <a:bodyPr rtlCol="0" anchor="ctr"/>
+          <a:lstStyle/>
+          <a:p>
+            <a:pPr algn="ctr"/>
+            <a:endParaRPr lang="en-GB" dirty="0"/>
+          </a:p>
+        </p:txBody>
+      </p:sp>
+      <p:sp>
+        <p:nvSpPr>
+          <p:cNvPr id="11" name="Rectangle: Rounded Corners 10">
+            <a:extLst>
+              <a:ext uri="{FF2B5EF4-FFF2-40B4-BE49-F238E27FC236}">
+                <a16:creationId xmlns:a16="http://schemas.microsoft.com/office/drawing/2014/main" id="{B0354E3A-B5B8-B2CD-9561-457CC7AF49DA}"/>
+              </a:ext>
+            </a:extLst>
+          </p:cNvPr>
+          <p:cNvSpPr/>
+          <p:nvPr/>
+        </p:nvSpPr>
+        <p:spPr>
+          <a:xfrm>
+            <a:off x="4076993" y="141723"/>
+            <a:ext cx="990012" cy="400110"/>
+          </a:xfrm>
+          <a:prstGeom prst="roundRect">
+            <a:avLst/>
+          </a:prstGeom>
+          <a:noFill/>
+          <a:ln w="9525">
+            <a:solidFill>
+              <a:srgbClr val="E3E9ED"/>
+            </a:solidFill>
+          </a:ln>
+        </p:spPr>
+        <p:style>
+          <a:lnRef idx="2">
+            <a:schemeClr val="accent1">
+              <a:shade val="15000"/>
+            </a:schemeClr>
+          </a:lnRef>
+          <a:fillRef idx="1">
+            <a:schemeClr val="accent1"/>
+          </a:fillRef>
+          <a:effectRef idx="0">
+            <a:schemeClr val="accent1"/>
+          </a:effectRef>
+          <a:fontRef idx="minor">
+            <a:schemeClr val="lt1"/>
+          </a:fontRef>
+        </p:style>
+        <p:txBody>
+          <a:bodyPr rtlCol="0" anchor="ctr"/>
+          <a:lstStyle/>
+          <a:p>
+            <a:pPr algn="ctr"/>
+            <a:r>
+              <a:rPr lang="en-GB" sz="1600" dirty="0">
+                <a:latin typeface="Aptos Mono" panose="020B0009020202020204" pitchFamily="49" charset="0"/>
+              </a:rPr>
+              <a:t>home</a:t>
+            </a:r>
+          </a:p>
+        </p:txBody>
+      </p:sp>
+      <p:sp>
+        <p:nvSpPr>
+          <p:cNvPr id="49" name="Rectangle 48">
+            <a:extLst>
+              <a:ext uri="{FF2B5EF4-FFF2-40B4-BE49-F238E27FC236}">
+                <a16:creationId xmlns:a16="http://schemas.microsoft.com/office/drawing/2014/main" id="{B32ADD89-4C72-3752-4392-1D2734DAF995}"/>
+              </a:ext>
+            </a:extLst>
+          </p:cNvPr>
+          <p:cNvSpPr/>
+          <p:nvPr/>
+        </p:nvSpPr>
+        <p:spPr>
+          <a:xfrm>
+            <a:off x="8982049" y="1851742"/>
+            <a:ext cx="90001" cy="1440016"/>
+          </a:xfrm>
+          <a:prstGeom prst="rect">
+            <a:avLst/>
+          </a:prstGeom>
+          <a:solidFill>
+            <a:srgbClr val="E3E9ED"/>
+          </a:solidFill>
+        </p:spPr>
+        <p:style>
+          <a:lnRef idx="2">
+            <a:schemeClr val="accent1">
+              <a:shade val="15000"/>
+            </a:schemeClr>
+          </a:lnRef>
+          <a:fillRef idx="1">
+            <a:schemeClr val="accent1"/>
+          </a:fillRef>
+          <a:effectRef idx="0">
+            <a:schemeClr val="accent1"/>
+          </a:effectRef>
+          <a:fontRef idx="minor">
+            <a:schemeClr val="lt1"/>
+          </a:fontRef>
+        </p:style>
+        <p:txBody>
+          <a:bodyPr rtlCol="0" anchor="ctr"/>
+          <a:lstStyle/>
+          <a:p>
+            <a:pPr algn="ctr"/>
+            <a:endParaRPr lang="en-GB"/>
+          </a:p>
+        </p:txBody>
+      </p:sp>
+      <p:cxnSp>
+        <p:nvCxnSpPr>
+          <p:cNvPr id="2" name="Connector: Elbow 1">
+            <a:extLst>
+              <a:ext uri="{FF2B5EF4-FFF2-40B4-BE49-F238E27FC236}">
+                <a16:creationId xmlns:a16="http://schemas.microsoft.com/office/drawing/2014/main" id="{006EC30A-60F4-50C8-94AE-C3D3069EC356}"/>
+              </a:ext>
+            </a:extLst>
+          </p:cNvPr>
+          <p:cNvCxnSpPr>
+            <a:cxnSpLocks/>
+            <a:stCxn id="11" idx="3"/>
+            <a:endCxn id="6" idx="2"/>
+          </p:cNvCxnSpPr>
+          <p:nvPr/>
+        </p:nvCxnSpPr>
+        <p:spPr>
+          <a:xfrm flipV="1">
+            <a:off x="5067005" y="-956144"/>
+            <a:ext cx="2025023" cy="1297922"/>
+          </a:xfrm>
+          <a:prstGeom prst="bentConnector2">
+            <a:avLst/>
+          </a:prstGeom>
+          <a:ln w="25400">
+            <a:solidFill>
+              <a:srgbClr val="FFC000"/>
+            </a:solidFill>
+            <a:tailEnd type="triangle"/>
+          </a:ln>
+        </p:spPr>
+        <p:style>
+          <a:lnRef idx="2">
+            <a:schemeClr val="accent1"/>
+          </a:lnRef>
+          <a:fillRef idx="0">
+            <a:schemeClr val="accent1"/>
+          </a:fillRef>
+          <a:effectRef idx="1">
+            <a:schemeClr val="accent1"/>
+          </a:effectRef>
+          <a:fontRef idx="minor">
+            <a:schemeClr val="tx1"/>
+          </a:fontRef>
+        </p:style>
+      </p:cxnSp>
+      <p:sp>
+        <p:nvSpPr>
+          <p:cNvPr id="6" name="TextBox 5">
+            <a:extLst>
+              <a:ext uri="{FF2B5EF4-FFF2-40B4-BE49-F238E27FC236}">
+                <a16:creationId xmlns:a16="http://schemas.microsoft.com/office/drawing/2014/main" id="{00F5DB05-4BA1-681F-6D7E-4E98B7E94019}"/>
+              </a:ext>
+            </a:extLst>
+          </p:cNvPr>
+          <p:cNvSpPr txBox="1"/>
+          <p:nvPr/>
+        </p:nvSpPr>
+        <p:spPr>
+          <a:xfrm>
+            <a:off x="6372020" y="-1171588"/>
+            <a:ext cx="1440015" cy="215444"/>
+          </a:xfrm>
+          <a:prstGeom prst="rect">
+            <a:avLst/>
+          </a:prstGeom>
+          <a:noFill/>
+          <a:ln w="38100">
+            <a:solidFill>
+              <a:srgbClr val="FFC000"/>
+            </a:solidFill>
+          </a:ln>
+        </p:spPr>
+        <p:txBody>
+          <a:bodyPr wrap="square" rtlCol="0">
+            <a:spAutoFit/>
+          </a:bodyPr>
+          <a:lstStyle/>
+          <a:p>
+            <a:r>
+              <a:rPr lang="en-GB" sz="800" dirty="0">
+                <a:solidFill>
+                  <a:srgbClr val="E3E9ED"/>
+                </a:solidFill>
+              </a:rPr>
+              <a:t>Pin to the top of the page. </a:t>
+            </a:r>
+          </a:p>
+        </p:txBody>
+      </p:sp>
+      <p:sp>
+        <p:nvSpPr>
+          <p:cNvPr id="8" name="Rectangle: Rounded Corners 7">
+            <a:extLst>
+              <a:ext uri="{FF2B5EF4-FFF2-40B4-BE49-F238E27FC236}">
+                <a16:creationId xmlns:a16="http://schemas.microsoft.com/office/drawing/2014/main" id="{F0BC98F4-FF8E-90F4-3A5A-892F4A6F892A}"/>
+              </a:ext>
+            </a:extLst>
+          </p:cNvPr>
+          <p:cNvSpPr/>
+          <p:nvPr/>
+        </p:nvSpPr>
+        <p:spPr>
+          <a:xfrm>
+            <a:off x="251952" y="3291758"/>
+            <a:ext cx="2880032" cy="720008"/>
+          </a:xfrm>
+          <a:prstGeom prst="roundRect">
+            <a:avLst/>
+          </a:prstGeom>
+          <a:gradFill flip="none" rotWithShape="1">
+            <a:gsLst>
+              <a:gs pos="0">
+                <a:srgbClr val="171D41"/>
+              </a:gs>
+              <a:gs pos="100000">
+                <a:srgbClr val="21295C"/>
+              </a:gs>
+            </a:gsLst>
+            <a:lin ang="0" scaled="0"/>
+            <a:tileRect/>
+          </a:gradFill>
+          <a:ln>
+            <a:noFill/>
+          </a:ln>
+        </p:spPr>
+        <p:style>
+          <a:lnRef idx="2">
+            <a:schemeClr val="accent1">
+              <a:shade val="15000"/>
+            </a:schemeClr>
+          </a:lnRef>
+          <a:fillRef idx="1">
+            <a:schemeClr val="accent1"/>
+          </a:fillRef>
+          <a:effectRef idx="0">
+            <a:schemeClr val="accent1"/>
+          </a:effectRef>
+          <a:fontRef idx="minor">
+            <a:schemeClr val="lt1"/>
+          </a:fontRef>
+        </p:style>
+        <p:txBody>
+          <a:bodyPr lIns="36000" tIns="36000" rIns="36000" bIns="36000" rtlCol="0" anchor="ctr"/>
+          <a:lstStyle/>
+          <a:p>
+            <a:r>
+              <a:rPr lang="en-GB" sz="1100" dirty="0">
+                <a:solidFill>
+                  <a:srgbClr val="E3E9ED"/>
+                </a:solidFill>
+                <a:latin typeface="Aptos Mono" panose="020B0009020202020204" pitchFamily="49" charset="0"/>
+              </a:rPr>
+              <a:t>GCSE`s                      2017</a:t>
+            </a:r>
+          </a:p>
+          <a:p>
+            <a:r>
+              <a:rPr lang="en-GB" sz="1100" dirty="0">
+                <a:solidFill>
+                  <a:srgbClr val="E3E9ED"/>
+                </a:solidFill>
+                <a:latin typeface="Aptos Mono" panose="020B0009020202020204" pitchFamily="49" charset="0"/>
+              </a:rPr>
+              <a:t>A*A*A*A*AAAAAABB</a:t>
+            </a:r>
+          </a:p>
+        </p:txBody>
+      </p:sp>
+      <p:sp>
+        <p:nvSpPr>
+          <p:cNvPr id="10" name="Rectangle: Rounded Corners 9">
+            <a:extLst>
+              <a:ext uri="{FF2B5EF4-FFF2-40B4-BE49-F238E27FC236}">
+                <a16:creationId xmlns:a16="http://schemas.microsoft.com/office/drawing/2014/main" id="{DBC3D879-E3AC-DC1A-3D6A-DF48434D98A2}"/>
+              </a:ext>
+            </a:extLst>
+          </p:cNvPr>
+          <p:cNvSpPr/>
+          <p:nvPr/>
+        </p:nvSpPr>
+        <p:spPr>
+          <a:xfrm>
+            <a:off x="3131984" y="2548137"/>
+            <a:ext cx="1440016" cy="720008"/>
+          </a:xfrm>
+          <a:prstGeom prst="roundRect">
+            <a:avLst/>
+          </a:prstGeom>
+          <a:gradFill flip="none" rotWithShape="1">
+            <a:gsLst>
+              <a:gs pos="0">
+                <a:srgbClr val="21295C"/>
+              </a:gs>
+              <a:gs pos="100000">
+                <a:srgbClr val="1B3B6F"/>
+              </a:gs>
+            </a:gsLst>
+            <a:lin ang="0" scaled="0"/>
+            <a:tileRect/>
+          </a:gradFill>
+          <a:ln>
+            <a:noFill/>
+          </a:ln>
+        </p:spPr>
+        <p:style>
+          <a:lnRef idx="2">
+            <a:schemeClr val="accent1">
+              <a:shade val="15000"/>
+            </a:schemeClr>
+          </a:lnRef>
+          <a:fillRef idx="1">
+            <a:schemeClr val="accent1"/>
+          </a:fillRef>
+          <a:effectRef idx="0">
+            <a:schemeClr val="accent1"/>
+          </a:effectRef>
+          <a:fontRef idx="minor">
+            <a:schemeClr val="lt1"/>
+          </a:fontRef>
+        </p:style>
+        <p:txBody>
+          <a:bodyPr lIns="36000" tIns="36000" rIns="36000" bIns="36000" rtlCol="0" anchor="ctr"/>
+          <a:lstStyle/>
+          <a:p>
+            <a:r>
+              <a:rPr lang="en-GB" sz="1100" dirty="0">
+                <a:solidFill>
+                  <a:srgbClr val="E3E9ED"/>
+                </a:solidFill>
+                <a:latin typeface="Aptos Mono" panose="020B0009020202020204" pitchFamily="49" charset="0"/>
+              </a:rPr>
+              <a:t>A-Levels   2019</a:t>
+            </a:r>
+          </a:p>
+          <a:p>
+            <a:r>
+              <a:rPr lang="en-GB" sz="1100" dirty="0">
+                <a:solidFill>
+                  <a:srgbClr val="E3E9ED"/>
+                </a:solidFill>
+                <a:latin typeface="Aptos Mono" panose="020B0009020202020204" pitchFamily="49" charset="0"/>
+              </a:rPr>
+              <a:t>AAB</a:t>
+            </a:r>
+          </a:p>
+        </p:txBody>
+      </p:sp>
+      <p:sp>
+        <p:nvSpPr>
+          <p:cNvPr id="13" name="Rectangle: Rounded Corners 12">
+            <a:extLst>
+              <a:ext uri="{FF2B5EF4-FFF2-40B4-BE49-F238E27FC236}">
+                <a16:creationId xmlns:a16="http://schemas.microsoft.com/office/drawing/2014/main" id="{4F902D21-698F-C4A1-1648-562ECBFB8BC2}"/>
+              </a:ext>
+            </a:extLst>
+          </p:cNvPr>
+          <p:cNvSpPr/>
+          <p:nvPr/>
+        </p:nvSpPr>
+        <p:spPr>
+          <a:xfrm>
+            <a:off x="4571998" y="1857526"/>
+            <a:ext cx="2610029" cy="720008"/>
+          </a:xfrm>
+          <a:prstGeom prst="roundRect">
+            <a:avLst/>
+          </a:prstGeom>
+          <a:gradFill flip="none" rotWithShape="1">
+            <a:gsLst>
+              <a:gs pos="35000">
+                <a:srgbClr val="1B3B6F"/>
+              </a:gs>
+              <a:gs pos="100000">
+                <a:srgbClr val="065A82"/>
+              </a:gs>
+            </a:gsLst>
+            <a:lin ang="0" scaled="0"/>
+            <a:tileRect/>
+          </a:gradFill>
+          <a:ln>
+            <a:noFill/>
+          </a:ln>
+        </p:spPr>
+        <p:style>
+          <a:lnRef idx="2">
+            <a:schemeClr val="accent1">
+              <a:shade val="15000"/>
+            </a:schemeClr>
+          </a:lnRef>
+          <a:fillRef idx="1">
+            <a:schemeClr val="accent1"/>
+          </a:fillRef>
+          <a:effectRef idx="0">
+            <a:schemeClr val="accent1"/>
+          </a:effectRef>
+          <a:fontRef idx="minor">
+            <a:schemeClr val="lt1"/>
+          </a:fontRef>
+        </p:style>
+        <p:txBody>
+          <a:bodyPr lIns="36000" tIns="36000" rIns="36000" bIns="36000" rtlCol="0" anchor="ctr"/>
+          <a:lstStyle/>
+          <a:p>
+            <a:r>
+              <a:rPr lang="en-GB" sz="1100" dirty="0">
+                <a:solidFill>
+                  <a:srgbClr val="E3E9ED"/>
+                </a:solidFill>
+                <a:latin typeface="Aptos Mono" panose="020B0009020202020204" pitchFamily="49" charset="0"/>
+              </a:rPr>
+              <a:t>BSc Computer Science     2023</a:t>
+            </a:r>
+          </a:p>
+          <a:p>
+            <a:r>
+              <a:rPr lang="en-GB" sz="1100" dirty="0">
+                <a:solidFill>
+                  <a:srgbClr val="E3E9ED"/>
+                </a:solidFill>
+                <a:latin typeface="Aptos Mono" panose="020B0009020202020204" pitchFamily="49" charset="0"/>
+              </a:rPr>
+              <a:t>2:1</a:t>
+            </a:r>
+          </a:p>
+        </p:txBody>
+      </p:sp>
+      <p:sp>
+        <p:nvSpPr>
+          <p:cNvPr id="15" name="Rectangle: Rounded Corners 14">
+            <a:extLst>
+              <a:ext uri="{FF2B5EF4-FFF2-40B4-BE49-F238E27FC236}">
+                <a16:creationId xmlns:a16="http://schemas.microsoft.com/office/drawing/2014/main" id="{B39C8942-424B-AA60-3577-830266FF311D}"/>
+              </a:ext>
+            </a:extLst>
+          </p:cNvPr>
+          <p:cNvSpPr/>
+          <p:nvPr/>
+        </p:nvSpPr>
+        <p:spPr>
+          <a:xfrm>
+            <a:off x="7182028" y="1116300"/>
+            <a:ext cx="1961971" cy="720008"/>
+          </a:xfrm>
+          <a:prstGeom prst="roundRect">
+            <a:avLst/>
+          </a:prstGeom>
+          <a:gradFill flip="none" rotWithShape="1">
+            <a:gsLst>
+              <a:gs pos="0">
+                <a:srgbClr val="065A82"/>
+              </a:gs>
+              <a:gs pos="100000">
+                <a:srgbClr val="1C7293"/>
+              </a:gs>
+            </a:gsLst>
+            <a:lin ang="0" scaled="0"/>
+            <a:tileRect/>
+          </a:gradFill>
+          <a:ln>
+            <a:noFill/>
+          </a:ln>
+        </p:spPr>
+        <p:style>
+          <a:lnRef idx="2">
+            <a:schemeClr val="accent1">
+              <a:shade val="15000"/>
+            </a:schemeClr>
+          </a:lnRef>
+          <a:fillRef idx="1">
+            <a:schemeClr val="accent1"/>
+          </a:fillRef>
+          <a:effectRef idx="0">
+            <a:schemeClr val="accent1"/>
+          </a:effectRef>
+          <a:fontRef idx="minor">
+            <a:schemeClr val="lt1"/>
+          </a:fontRef>
+        </p:style>
+        <p:txBody>
+          <a:bodyPr lIns="36000" tIns="36000" rIns="36000" bIns="36000" rtlCol="0" anchor="ctr"/>
+          <a:lstStyle/>
+          <a:p>
+            <a:r>
+              <a:rPr lang="en-GB" sz="1100" dirty="0">
+                <a:solidFill>
+                  <a:srgbClr val="E3E9ED"/>
+                </a:solidFill>
+                <a:latin typeface="Aptos Mono" panose="020B0009020202020204" pitchFamily="49" charset="0"/>
+              </a:rPr>
+              <a:t>Access Group UK  2024</a:t>
+            </a:r>
+          </a:p>
+          <a:p>
+            <a:r>
+              <a:rPr lang="en-GB" sz="1100" dirty="0">
+                <a:solidFill>
+                  <a:srgbClr val="E3E9ED"/>
+                </a:solidFill>
+                <a:latin typeface="Aptos Mono" panose="020B0009020202020204" pitchFamily="49" charset="0"/>
+              </a:rPr>
+              <a:t>Software Engineer</a:t>
+            </a:r>
+          </a:p>
+        </p:txBody>
+      </p:sp>
+      <p:sp>
+        <p:nvSpPr>
+          <p:cNvPr id="18" name="TextBox 17">
+            <a:extLst>
+              <a:ext uri="{FF2B5EF4-FFF2-40B4-BE49-F238E27FC236}">
+                <a16:creationId xmlns:a16="http://schemas.microsoft.com/office/drawing/2014/main" id="{1BC50215-B2ED-2BAB-4266-34CC23B915EA}"/>
+              </a:ext>
+            </a:extLst>
+          </p:cNvPr>
+          <p:cNvSpPr txBox="1"/>
+          <p:nvPr/>
+        </p:nvSpPr>
+        <p:spPr>
+          <a:xfrm>
+            <a:off x="72232" y="-629879"/>
+            <a:ext cx="1130507" cy="189924"/>
+          </a:xfrm>
+          <a:prstGeom prst="rect">
+            <a:avLst/>
+          </a:prstGeom>
+          <a:noFill/>
+          <a:ln w="38100">
+            <a:solidFill>
+              <a:srgbClr val="FFC000"/>
+            </a:solidFill>
+          </a:ln>
+        </p:spPr>
+        <p:txBody>
+          <a:bodyPr wrap="square" rtlCol="0">
+            <a:spAutoFit/>
+          </a:bodyPr>
+          <a:lstStyle/>
+          <a:p>
+            <a:r>
+              <a:rPr lang="en-GB" sz="634" dirty="0">
+                <a:solidFill>
+                  <a:schemeClr val="bg1"/>
+                </a:solidFill>
+              </a:rPr>
+              <a:t>About Page</a:t>
+            </a:r>
+          </a:p>
+        </p:txBody>
+      </p:sp>
+    </p:spTree>
+    <p:extLst>
+      <p:ext uri="{BB962C8B-B14F-4D97-AF65-F5344CB8AC3E}">
+        <p14:creationId xmlns:p14="http://schemas.microsoft.com/office/powerpoint/2010/main" val="3293976800"/>
+      </p:ext>
+    </p:extLst>
+  </p:cSld>
+  <p:clrMapOvr>
+    <a:masterClrMapping/>
+  </p:clrMapOvr>
+</p:sld>
+</file>
+
+<file path=ppt/slides/slide5.xml><?xml version="1.0" encoding="utf-8"?>
+<p:sld xmlns:a="http://schemas.openxmlformats.org/drawingml/2006/main" xmlns:r="http://schemas.openxmlformats.org/officeDocument/2006/relationships" xmlns:p="http://schemas.openxmlformats.org/presentationml/2006/main">
+  <p:cSld>
+    <p:spTree>
+      <p:nvGrpSpPr>
+        <p:cNvPr id="1" name=""/>
+        <p:cNvGrpSpPr/>
+        <p:nvPr/>
+      </p:nvGrpSpPr>
+      <p:grpSpPr>
+        <a:xfrm>
+          <a:off x="0" y="0"/>
+          <a:ext cx="0" cy="0"/>
+          <a:chOff x="0" y="0"/>
+          <a:chExt cx="0" cy="0"/>
+        </a:xfrm>
+      </p:grpSpPr>
+      <p:pic>
+        <p:nvPicPr>
+          <p:cNvPr id="17" name="Picture 16" descr="A aerial view of a football field&#10;&#10;Description automatically generated">
+            <a:extLst>
+              <a:ext uri="{FF2B5EF4-FFF2-40B4-BE49-F238E27FC236}">
+                <a16:creationId xmlns:a16="http://schemas.microsoft.com/office/drawing/2014/main" id="{E765C726-91B9-C2F7-7776-BD13DEC6FB65}"/>
+              </a:ext>
+            </a:extLst>
+          </p:cNvPr>
+          <p:cNvPicPr>
+            <a:picLocks noChangeAspect="1"/>
+          </p:cNvPicPr>
+          <p:nvPr/>
+        </p:nvPicPr>
+        <p:blipFill rotWithShape="1">
+          <a:blip r:embed="rId3">
+            <a:extLst>
+              <a:ext uri="{28A0092B-C50C-407E-A947-70E740481C1C}">
+                <a14:useLocalDpi xmlns:a14="http://schemas.microsoft.com/office/drawing/2010/main" val="0"/>
+              </a:ext>
+            </a:extLst>
+          </a:blip>
+          <a:srcRect l="-30" t="34181" r="30" b="34181"/>
+          <a:stretch/>
+        </p:blipFill>
+        <p:spPr>
+          <a:xfrm>
+            <a:off x="0" y="0"/>
+            <a:ext cx="9156100" cy="5143500"/>
+          </a:xfrm>
+          <a:prstGeom prst="rect">
+            <a:avLst/>
+          </a:prstGeom>
+        </p:spPr>
+      </p:pic>
+      <p:sp>
+        <p:nvSpPr>
+          <p:cNvPr id="12" name="Rectangle 11">
+            <a:extLst>
+              <a:ext uri="{FF2B5EF4-FFF2-40B4-BE49-F238E27FC236}">
+                <a16:creationId xmlns:a16="http://schemas.microsoft.com/office/drawing/2014/main" id="{BAD760F3-3A96-2311-362E-D76774272972}"/>
+              </a:ext>
+            </a:extLst>
+          </p:cNvPr>
+          <p:cNvSpPr>
+            <a:spLocks noGrp="1" noRot="1" noMove="1" noResize="1" noEditPoints="1" noAdjustHandles="1" noChangeArrowheads="1" noChangeShapeType="1"/>
+          </p:cNvSpPr>
+          <p:nvPr/>
+        </p:nvSpPr>
+        <p:spPr>
+          <a:xfrm>
+            <a:off x="0" y="-24601"/>
+            <a:ext cx="9156101" cy="5167487"/>
+          </a:xfrm>
+          <a:prstGeom prst="rect">
+            <a:avLst/>
+          </a:prstGeom>
+          <a:gradFill flip="none" rotWithShape="1">
+            <a:gsLst>
+              <a:gs pos="0">
+                <a:srgbClr val="171D41">
+                  <a:alpha val="80000"/>
+                </a:srgbClr>
+              </a:gs>
+              <a:gs pos="100000">
+                <a:srgbClr val="171D41">
+                  <a:alpha val="80000"/>
+                </a:srgbClr>
+              </a:gs>
+            </a:gsLst>
+            <a:lin ang="16200000" scaled="1"/>
+            <a:tileRect/>
+          </a:gradFill>
+          <a:ln>
+            <a:noFill/>
+          </a:ln>
+        </p:spPr>
+        <p:style>
+          <a:lnRef idx="2">
+            <a:schemeClr val="accent1">
+              <a:shade val="15000"/>
+            </a:schemeClr>
+          </a:lnRef>
+          <a:fillRef idx="1">
+            <a:schemeClr val="accent1"/>
+          </a:fillRef>
+          <a:effectRef idx="0">
+            <a:schemeClr val="accent1"/>
+          </a:effectRef>
+          <a:fontRef idx="minor">
+            <a:schemeClr val="lt1"/>
+          </a:fontRef>
+        </p:style>
+        <p:txBody>
+          <a:bodyPr rtlCol="0" anchor="ctr"/>
+          <a:lstStyle/>
+          <a:p>
+            <a:pPr algn="ctr"/>
+            <a:endParaRPr lang="en-GB" dirty="0"/>
+          </a:p>
+        </p:txBody>
+      </p:sp>
+      <p:sp>
+        <p:nvSpPr>
+          <p:cNvPr id="11" name="Rectangle: Rounded Corners 10">
+            <a:extLst>
+              <a:ext uri="{FF2B5EF4-FFF2-40B4-BE49-F238E27FC236}">
+                <a16:creationId xmlns:a16="http://schemas.microsoft.com/office/drawing/2014/main" id="{B0354E3A-B5B8-B2CD-9561-457CC7AF49DA}"/>
+              </a:ext>
+            </a:extLst>
+          </p:cNvPr>
+          <p:cNvSpPr/>
+          <p:nvPr/>
+        </p:nvSpPr>
+        <p:spPr>
+          <a:xfrm>
+            <a:off x="4076993" y="141723"/>
+            <a:ext cx="990012" cy="400110"/>
+          </a:xfrm>
+          <a:prstGeom prst="roundRect">
+            <a:avLst/>
+          </a:prstGeom>
+          <a:noFill/>
+          <a:ln w="9525">
+            <a:solidFill>
+              <a:srgbClr val="E3E9ED"/>
+            </a:solidFill>
+          </a:ln>
+        </p:spPr>
+        <p:style>
+          <a:lnRef idx="2">
+            <a:schemeClr val="accent1">
+              <a:shade val="15000"/>
+            </a:schemeClr>
+          </a:lnRef>
+          <a:fillRef idx="1">
+            <a:schemeClr val="accent1"/>
+          </a:fillRef>
+          <a:effectRef idx="0">
+            <a:schemeClr val="accent1"/>
+          </a:effectRef>
+          <a:fontRef idx="minor">
+            <a:schemeClr val="lt1"/>
+          </a:fontRef>
+        </p:style>
+        <p:txBody>
+          <a:bodyPr rtlCol="0" anchor="ctr"/>
+          <a:lstStyle/>
+          <a:p>
+            <a:pPr algn="ctr"/>
+            <a:r>
+              <a:rPr lang="en-GB" sz="1600" dirty="0">
+                <a:latin typeface="Aptos Mono" panose="020B0009020202020204" pitchFamily="49" charset="0"/>
+              </a:rPr>
+              <a:t>home</a:t>
+            </a:r>
+          </a:p>
+        </p:txBody>
+      </p:sp>
+      <p:sp>
+        <p:nvSpPr>
+          <p:cNvPr id="49" name="Rectangle 48">
+            <a:extLst>
+              <a:ext uri="{FF2B5EF4-FFF2-40B4-BE49-F238E27FC236}">
+                <a16:creationId xmlns:a16="http://schemas.microsoft.com/office/drawing/2014/main" id="{B32ADD89-4C72-3752-4392-1D2734DAF995}"/>
+              </a:ext>
+            </a:extLst>
+          </p:cNvPr>
+          <p:cNvSpPr/>
+          <p:nvPr/>
+        </p:nvSpPr>
+        <p:spPr>
+          <a:xfrm>
+            <a:off x="8982049" y="3291758"/>
+            <a:ext cx="90001" cy="1440016"/>
+          </a:xfrm>
+          <a:prstGeom prst="rect">
+            <a:avLst/>
+          </a:prstGeom>
+          <a:solidFill>
+            <a:srgbClr val="E3E9ED"/>
+          </a:solidFill>
+        </p:spPr>
+        <p:style>
+          <a:lnRef idx="2">
+            <a:schemeClr val="accent1">
+              <a:shade val="15000"/>
+            </a:schemeClr>
+          </a:lnRef>
+          <a:fillRef idx="1">
+            <a:schemeClr val="accent1"/>
+          </a:fillRef>
+          <a:effectRef idx="0">
+            <a:schemeClr val="accent1"/>
+          </a:effectRef>
+          <a:fontRef idx="minor">
+            <a:schemeClr val="lt1"/>
+          </a:fontRef>
+        </p:style>
+        <p:txBody>
+          <a:bodyPr rtlCol="0" anchor="ctr"/>
+          <a:lstStyle/>
+          <a:p>
+            <a:pPr algn="ctr"/>
+            <a:endParaRPr lang="en-GB"/>
+          </a:p>
+        </p:txBody>
+      </p:sp>
+      <p:sp>
+        <p:nvSpPr>
+          <p:cNvPr id="3" name="TextBox 2">
+            <a:extLst>
+              <a:ext uri="{FF2B5EF4-FFF2-40B4-BE49-F238E27FC236}">
+                <a16:creationId xmlns:a16="http://schemas.microsoft.com/office/drawing/2014/main" id="{557EC46A-9295-8909-B599-F1CE80DEC281}"/>
+              </a:ext>
+            </a:extLst>
+          </p:cNvPr>
+          <p:cNvSpPr txBox="1"/>
+          <p:nvPr/>
+        </p:nvSpPr>
+        <p:spPr>
+          <a:xfrm>
+            <a:off x="72232" y="-629879"/>
+            <a:ext cx="1130507" cy="189924"/>
+          </a:xfrm>
+          <a:prstGeom prst="rect">
+            <a:avLst/>
+          </a:prstGeom>
+          <a:noFill/>
+          <a:ln w="38100">
+            <a:solidFill>
+              <a:srgbClr val="FFC000"/>
+            </a:solidFill>
+          </a:ln>
+        </p:spPr>
+        <p:txBody>
+          <a:bodyPr wrap="square" rtlCol="0">
+            <a:spAutoFit/>
+          </a:bodyPr>
+          <a:lstStyle/>
+          <a:p>
+            <a:r>
+              <a:rPr lang="en-GB" sz="634" dirty="0">
+                <a:solidFill>
+                  <a:schemeClr val="bg1"/>
+                </a:solidFill>
+              </a:rPr>
+              <a:t>About Page</a:t>
+            </a:r>
+          </a:p>
+        </p:txBody>
+      </p:sp>
+      <p:cxnSp>
+        <p:nvCxnSpPr>
+          <p:cNvPr id="5" name="Straight Connector 4">
+            <a:extLst>
+              <a:ext uri="{FF2B5EF4-FFF2-40B4-BE49-F238E27FC236}">
+                <a16:creationId xmlns:a16="http://schemas.microsoft.com/office/drawing/2014/main" id="{E8E46A0F-2BDE-3276-BC64-10A7CD5122C7}"/>
+              </a:ext>
+            </a:extLst>
+          </p:cNvPr>
+          <p:cNvCxnSpPr>
+            <a:cxnSpLocks/>
+          </p:cNvCxnSpPr>
+          <p:nvPr/>
+        </p:nvCxnSpPr>
+        <p:spPr>
+          <a:xfrm flipV="1">
+            <a:off x="4301996" y="3497176"/>
+            <a:ext cx="1" cy="1324599"/>
+          </a:xfrm>
+          <a:prstGeom prst="line">
+            <a:avLst/>
+          </a:prstGeom>
+          <a:ln>
+            <a:solidFill>
+              <a:srgbClr val="E3E9ED"/>
+            </a:solidFill>
+          </a:ln>
+        </p:spPr>
+        <p:style>
+          <a:lnRef idx="2">
+            <a:schemeClr val="accent1"/>
+          </a:lnRef>
+          <a:fillRef idx="0">
+            <a:schemeClr val="accent1"/>
+          </a:fillRef>
+          <a:effectRef idx="1">
+            <a:schemeClr val="accent1"/>
+          </a:effectRef>
+          <a:fontRef idx="minor">
+            <a:schemeClr val="tx1"/>
+          </a:fontRef>
+        </p:style>
+      </p:cxnSp>
+      <p:cxnSp>
+        <p:nvCxnSpPr>
+          <p:cNvPr id="7" name="Straight Connector 6">
+            <a:extLst>
+              <a:ext uri="{FF2B5EF4-FFF2-40B4-BE49-F238E27FC236}">
+                <a16:creationId xmlns:a16="http://schemas.microsoft.com/office/drawing/2014/main" id="{EE73E7BD-B5BF-B956-24AA-4C647CC72915}"/>
+              </a:ext>
+            </a:extLst>
+          </p:cNvPr>
+          <p:cNvCxnSpPr>
+            <a:cxnSpLocks/>
+          </p:cNvCxnSpPr>
+          <p:nvPr/>
+        </p:nvCxnSpPr>
+        <p:spPr>
+          <a:xfrm flipV="1">
+            <a:off x="4842003" y="3497176"/>
+            <a:ext cx="0" cy="1324599"/>
+          </a:xfrm>
+          <a:prstGeom prst="line">
+            <a:avLst/>
+          </a:prstGeom>
+          <a:ln>
+            <a:solidFill>
+              <a:srgbClr val="E3E9ED"/>
+            </a:solidFill>
+          </a:ln>
+        </p:spPr>
+        <p:style>
+          <a:lnRef idx="2">
+            <a:schemeClr val="accent1"/>
+          </a:lnRef>
+          <a:fillRef idx="0">
+            <a:schemeClr val="accent1"/>
+          </a:fillRef>
+          <a:effectRef idx="1">
+            <a:schemeClr val="accent1"/>
+          </a:effectRef>
+          <a:fontRef idx="minor">
+            <a:schemeClr val="tx1"/>
+          </a:fontRef>
+        </p:style>
+      </p:cxnSp>
+      <p:cxnSp>
+        <p:nvCxnSpPr>
+          <p:cNvPr id="16" name="Straight Connector 15">
+            <a:extLst>
+              <a:ext uri="{FF2B5EF4-FFF2-40B4-BE49-F238E27FC236}">
+                <a16:creationId xmlns:a16="http://schemas.microsoft.com/office/drawing/2014/main" id="{698FA849-C165-F511-829E-A5EFCF040AAF}"/>
+              </a:ext>
+            </a:extLst>
+          </p:cNvPr>
+          <p:cNvCxnSpPr>
+            <a:cxnSpLocks/>
+          </p:cNvCxnSpPr>
+          <p:nvPr/>
+        </p:nvCxnSpPr>
+        <p:spPr>
+          <a:xfrm flipV="1">
+            <a:off x="4571998" y="2798487"/>
+            <a:ext cx="0" cy="2023288"/>
+          </a:xfrm>
+          <a:prstGeom prst="line">
+            <a:avLst/>
+          </a:prstGeom>
+          <a:ln>
+            <a:solidFill>
+              <a:srgbClr val="E3E9ED"/>
+            </a:solidFill>
+          </a:ln>
+        </p:spPr>
+        <p:style>
+          <a:lnRef idx="2">
+            <a:schemeClr val="accent1"/>
+          </a:lnRef>
+          <a:fillRef idx="0">
+            <a:schemeClr val="accent1"/>
+          </a:fillRef>
+          <a:effectRef idx="1">
+            <a:schemeClr val="accent1"/>
+          </a:effectRef>
+          <a:fontRef idx="minor">
+            <a:schemeClr val="tx1"/>
+          </a:fontRef>
+        </p:style>
+      </p:cxnSp>
+      <p:cxnSp>
+        <p:nvCxnSpPr>
+          <p:cNvPr id="18" name="Straight Connector 17">
+            <a:extLst>
+              <a:ext uri="{FF2B5EF4-FFF2-40B4-BE49-F238E27FC236}">
+                <a16:creationId xmlns:a16="http://schemas.microsoft.com/office/drawing/2014/main" id="{ADB65646-CA47-84D7-B81F-6D81D1D1760C}"/>
+              </a:ext>
+            </a:extLst>
+          </p:cNvPr>
+          <p:cNvCxnSpPr>
+            <a:cxnSpLocks/>
+          </p:cNvCxnSpPr>
+          <p:nvPr/>
+        </p:nvCxnSpPr>
+        <p:spPr>
+          <a:xfrm flipV="1">
+            <a:off x="4842003" y="2777168"/>
+            <a:ext cx="180002" cy="720008"/>
+          </a:xfrm>
+          <a:prstGeom prst="line">
+            <a:avLst/>
+          </a:prstGeom>
+          <a:ln>
+            <a:solidFill>
+              <a:srgbClr val="E3E9ED"/>
+            </a:solidFill>
+          </a:ln>
+        </p:spPr>
+        <p:style>
+          <a:lnRef idx="2">
+            <a:schemeClr val="accent1"/>
+          </a:lnRef>
+          <a:fillRef idx="0">
+            <a:schemeClr val="accent1"/>
+          </a:fillRef>
+          <a:effectRef idx="1">
+            <a:schemeClr val="accent1"/>
+          </a:effectRef>
+          <a:fontRef idx="minor">
+            <a:schemeClr val="tx1"/>
+          </a:fontRef>
+        </p:style>
+      </p:cxnSp>
+      <p:cxnSp>
+        <p:nvCxnSpPr>
+          <p:cNvPr id="21" name="Straight Connector 20">
+            <a:extLst>
+              <a:ext uri="{FF2B5EF4-FFF2-40B4-BE49-F238E27FC236}">
+                <a16:creationId xmlns:a16="http://schemas.microsoft.com/office/drawing/2014/main" id="{F1970616-A804-FC3D-03E2-3A4AD30B2D2B}"/>
+              </a:ext>
+            </a:extLst>
+          </p:cNvPr>
+          <p:cNvCxnSpPr>
+            <a:cxnSpLocks/>
+          </p:cNvCxnSpPr>
+          <p:nvPr/>
+        </p:nvCxnSpPr>
+        <p:spPr>
+          <a:xfrm flipH="1" flipV="1">
+            <a:off x="4121996" y="2777168"/>
+            <a:ext cx="180000" cy="720008"/>
+          </a:xfrm>
+          <a:prstGeom prst="line">
+            <a:avLst/>
+          </a:prstGeom>
+          <a:ln>
+            <a:solidFill>
+              <a:srgbClr val="E3E9ED"/>
+            </a:solidFill>
+          </a:ln>
+        </p:spPr>
+        <p:style>
+          <a:lnRef idx="2">
+            <a:schemeClr val="accent1"/>
+          </a:lnRef>
+          <a:fillRef idx="0">
+            <a:schemeClr val="accent1"/>
+          </a:fillRef>
+          <a:effectRef idx="1">
+            <a:schemeClr val="accent1"/>
+          </a:effectRef>
+          <a:fontRef idx="minor">
+            <a:schemeClr val="tx1"/>
+          </a:fontRef>
+        </p:style>
+      </p:cxnSp>
+      <p:cxnSp>
+        <p:nvCxnSpPr>
+          <p:cNvPr id="23" name="Straight Connector 22">
+            <a:extLst>
+              <a:ext uri="{FF2B5EF4-FFF2-40B4-BE49-F238E27FC236}">
+                <a16:creationId xmlns:a16="http://schemas.microsoft.com/office/drawing/2014/main" id="{C43E7188-23AD-7295-69B2-37525B81439E}"/>
+              </a:ext>
+            </a:extLst>
+          </p:cNvPr>
+          <p:cNvCxnSpPr>
+            <a:cxnSpLocks/>
+          </p:cNvCxnSpPr>
+          <p:nvPr/>
+        </p:nvCxnSpPr>
+        <p:spPr>
+          <a:xfrm flipH="1">
+            <a:off x="5022005" y="2417164"/>
+            <a:ext cx="450005" cy="359390"/>
+          </a:xfrm>
+          <a:prstGeom prst="line">
+            <a:avLst/>
+          </a:prstGeom>
+          <a:ln>
+            <a:solidFill>
+              <a:srgbClr val="E3E9ED"/>
+            </a:solidFill>
+          </a:ln>
+        </p:spPr>
+        <p:style>
+          <a:lnRef idx="2">
+            <a:schemeClr val="accent1"/>
+          </a:lnRef>
+          <a:fillRef idx="0">
+            <a:schemeClr val="accent1"/>
+          </a:fillRef>
+          <a:effectRef idx="1">
+            <a:schemeClr val="accent1"/>
+          </a:effectRef>
+          <a:fontRef idx="minor">
+            <a:schemeClr val="tx1"/>
+          </a:fontRef>
+        </p:style>
+      </p:cxnSp>
+      <p:cxnSp>
+        <p:nvCxnSpPr>
+          <p:cNvPr id="27" name="Straight Connector 26">
+            <a:extLst>
+              <a:ext uri="{FF2B5EF4-FFF2-40B4-BE49-F238E27FC236}">
+                <a16:creationId xmlns:a16="http://schemas.microsoft.com/office/drawing/2014/main" id="{99BE48CD-2F2A-F6BB-65F0-E2C813F54D16}"/>
+              </a:ext>
+            </a:extLst>
+          </p:cNvPr>
+          <p:cNvCxnSpPr>
+            <a:cxnSpLocks/>
+            <a:stCxn id="31" idx="1"/>
+          </p:cNvCxnSpPr>
+          <p:nvPr/>
+        </p:nvCxnSpPr>
+        <p:spPr>
+          <a:xfrm flipH="1">
+            <a:off x="5489191" y="2289227"/>
+            <a:ext cx="903145" cy="127323"/>
+          </a:xfrm>
+          <a:prstGeom prst="line">
+            <a:avLst/>
+          </a:prstGeom>
+          <a:ln>
+            <a:solidFill>
+              <a:srgbClr val="E3E9ED"/>
+            </a:solidFill>
+          </a:ln>
+        </p:spPr>
+        <p:style>
+          <a:lnRef idx="2">
+            <a:schemeClr val="accent1"/>
+          </a:lnRef>
+          <a:fillRef idx="0">
+            <a:schemeClr val="accent1"/>
+          </a:fillRef>
+          <a:effectRef idx="1">
+            <a:schemeClr val="accent1"/>
+          </a:effectRef>
+          <a:fontRef idx="minor">
+            <a:schemeClr val="tx1"/>
+          </a:fontRef>
+        </p:style>
+      </p:cxnSp>
+      <p:sp>
+        <p:nvSpPr>
+          <p:cNvPr id="30" name="TextBox 29">
+            <a:extLst>
+              <a:ext uri="{FF2B5EF4-FFF2-40B4-BE49-F238E27FC236}">
+                <a16:creationId xmlns:a16="http://schemas.microsoft.com/office/drawing/2014/main" id="{D216E322-DB84-7E23-1E0B-7735BB92CE52}"/>
+              </a:ext>
+            </a:extLst>
+          </p:cNvPr>
+          <p:cNvSpPr txBox="1"/>
+          <p:nvPr/>
+        </p:nvSpPr>
+        <p:spPr>
+          <a:xfrm>
+            <a:off x="1468553" y="2747861"/>
+            <a:ext cx="2334074" cy="2031325"/>
+          </a:xfrm>
+          <a:prstGeom prst="rect">
+            <a:avLst/>
+          </a:prstGeom>
+          <a:noFill/>
+        </p:spPr>
+        <p:txBody>
+          <a:bodyPr wrap="square" rtlCol="0">
+            <a:spAutoFit/>
+          </a:bodyPr>
+          <a:lstStyle/>
+          <a:p>
+            <a:r>
+              <a:rPr lang="en-GB" dirty="0">
+                <a:solidFill>
+                  <a:srgbClr val="E3E9ED"/>
+                </a:solidFill>
+              </a:rPr>
+              <a:t>Web dev</a:t>
+            </a:r>
+          </a:p>
+          <a:p>
+            <a:r>
+              <a:rPr lang="en-GB" dirty="0">
+                <a:solidFill>
+                  <a:srgbClr val="E3E9ED"/>
+                </a:solidFill>
+              </a:rPr>
+              <a:t>Dsa</a:t>
+            </a:r>
+          </a:p>
+          <a:p>
+            <a:r>
+              <a:rPr lang="en-GB" dirty="0">
+                <a:solidFill>
+                  <a:srgbClr val="E3E9ED"/>
+                </a:solidFill>
+              </a:rPr>
+              <a:t>Databases</a:t>
+            </a:r>
+          </a:p>
+          <a:p>
+            <a:r>
+              <a:rPr lang="en-GB" dirty="0">
+                <a:solidFill>
+                  <a:srgbClr val="E3E9ED"/>
+                </a:solidFill>
+              </a:rPr>
+              <a:t>Functional</a:t>
+            </a:r>
+          </a:p>
+          <a:p>
+            <a:r>
+              <a:rPr lang="en-GB" dirty="0">
+                <a:solidFill>
+                  <a:srgbClr val="E3E9ED"/>
+                </a:solidFill>
+              </a:rPr>
+              <a:t>AI</a:t>
+            </a:r>
+          </a:p>
+          <a:p>
+            <a:r>
+              <a:rPr lang="en-GB" dirty="0">
+                <a:solidFill>
+                  <a:srgbClr val="E3E9ED"/>
+                </a:solidFill>
+              </a:rPr>
+              <a:t>Data Vis</a:t>
+            </a:r>
+          </a:p>
+          <a:p>
+            <a:r>
+              <a:rPr lang="en-GB" dirty="0">
+                <a:solidFill>
+                  <a:srgbClr val="E3E9ED"/>
+                </a:solidFill>
+              </a:rPr>
+              <a:t>General proficiency</a:t>
+            </a:r>
+          </a:p>
+        </p:txBody>
+      </p:sp>
+      <p:sp>
+        <p:nvSpPr>
+          <p:cNvPr id="31" name="TextBox 30">
+            <a:extLst>
+              <a:ext uri="{FF2B5EF4-FFF2-40B4-BE49-F238E27FC236}">
+                <a16:creationId xmlns:a16="http://schemas.microsoft.com/office/drawing/2014/main" id="{355AE709-CA38-FE35-A75E-30421FE14158}"/>
+              </a:ext>
+            </a:extLst>
+          </p:cNvPr>
+          <p:cNvSpPr txBox="1"/>
+          <p:nvPr/>
+        </p:nvSpPr>
+        <p:spPr>
+          <a:xfrm>
+            <a:off x="6392336" y="2172084"/>
+            <a:ext cx="720008" cy="234286"/>
+          </a:xfrm>
+          <a:prstGeom prst="rect">
+            <a:avLst/>
+          </a:prstGeom>
+          <a:noFill/>
+          <a:ln cap="flat">
+            <a:solidFill>
+              <a:srgbClr val="E3E9ED"/>
+            </a:solidFill>
+            <a:round/>
+          </a:ln>
+        </p:spPr>
+        <p:txBody>
+          <a:bodyPr wrap="square" lIns="36000" tIns="36000" rIns="36000" bIns="36000" rtlCol="0">
+            <a:spAutoFit/>
+          </a:bodyPr>
+          <a:lstStyle/>
+          <a:p>
+            <a:pPr algn="ctr"/>
+            <a:r>
+              <a:rPr lang="en-GB" sz="1050" dirty="0">
+                <a:solidFill>
+                  <a:srgbClr val="E3E9ED"/>
+                </a:solidFill>
+                <a:latin typeface="Aptos Mono" panose="020F0502020204030204" pitchFamily="49" charset="0"/>
+              </a:rPr>
+              <a:t>Web Dev</a:t>
+            </a:r>
+          </a:p>
+        </p:txBody>
+      </p:sp>
+      <p:cxnSp>
+        <p:nvCxnSpPr>
+          <p:cNvPr id="46" name="Straight Connector 45">
+            <a:extLst>
+              <a:ext uri="{FF2B5EF4-FFF2-40B4-BE49-F238E27FC236}">
+                <a16:creationId xmlns:a16="http://schemas.microsoft.com/office/drawing/2014/main" id="{E454D18C-4FED-E73F-57CE-6D9FD6D379DA}"/>
+              </a:ext>
+            </a:extLst>
+          </p:cNvPr>
+          <p:cNvCxnSpPr>
+            <a:cxnSpLocks/>
+          </p:cNvCxnSpPr>
+          <p:nvPr/>
+        </p:nvCxnSpPr>
+        <p:spPr>
+          <a:xfrm flipH="1">
+            <a:off x="7106061" y="1920408"/>
+            <a:ext cx="751619" cy="258582"/>
+          </a:xfrm>
+          <a:prstGeom prst="line">
+            <a:avLst/>
+          </a:prstGeom>
+          <a:ln>
+            <a:solidFill>
+              <a:srgbClr val="E3E9ED"/>
+            </a:solidFill>
+          </a:ln>
+        </p:spPr>
+        <p:style>
+          <a:lnRef idx="2">
+            <a:schemeClr val="accent1"/>
+          </a:lnRef>
+          <a:fillRef idx="0">
+            <a:schemeClr val="accent1"/>
+          </a:fillRef>
+          <a:effectRef idx="1">
+            <a:schemeClr val="accent1"/>
+          </a:effectRef>
+          <a:fontRef idx="minor">
+            <a:schemeClr val="tx1"/>
+          </a:fontRef>
+        </p:style>
+      </p:cxnSp>
+      <p:cxnSp>
+        <p:nvCxnSpPr>
+          <p:cNvPr id="47" name="Straight Connector 46">
+            <a:extLst>
+              <a:ext uri="{FF2B5EF4-FFF2-40B4-BE49-F238E27FC236}">
+                <a16:creationId xmlns:a16="http://schemas.microsoft.com/office/drawing/2014/main" id="{147B9477-BB87-7B7E-93D3-F360BC6709BA}"/>
+              </a:ext>
+            </a:extLst>
+          </p:cNvPr>
+          <p:cNvCxnSpPr>
+            <a:cxnSpLocks/>
+            <a:endCxn id="31" idx="3"/>
+          </p:cNvCxnSpPr>
+          <p:nvPr/>
+        </p:nvCxnSpPr>
+        <p:spPr>
+          <a:xfrm flipH="1" flipV="1">
+            <a:off x="7112344" y="2289227"/>
+            <a:ext cx="890766" cy="276844"/>
+          </a:xfrm>
+          <a:prstGeom prst="line">
+            <a:avLst/>
+          </a:prstGeom>
+          <a:ln>
+            <a:solidFill>
+              <a:srgbClr val="E3E9ED"/>
+            </a:solidFill>
+          </a:ln>
+        </p:spPr>
+        <p:style>
+          <a:lnRef idx="2">
+            <a:schemeClr val="accent1"/>
+          </a:lnRef>
+          <a:fillRef idx="0">
+            <a:schemeClr val="accent1"/>
+          </a:fillRef>
+          <a:effectRef idx="1">
+            <a:schemeClr val="accent1"/>
+          </a:effectRef>
+          <a:fontRef idx="minor">
+            <a:schemeClr val="tx1"/>
+          </a:fontRef>
+        </p:style>
+      </p:cxnSp>
+      <p:cxnSp>
+        <p:nvCxnSpPr>
+          <p:cNvPr id="50" name="Straight Connector 49">
+            <a:extLst>
+              <a:ext uri="{FF2B5EF4-FFF2-40B4-BE49-F238E27FC236}">
+                <a16:creationId xmlns:a16="http://schemas.microsoft.com/office/drawing/2014/main" id="{24BEE2ED-7670-A35B-A1F8-C9449117B64E}"/>
+              </a:ext>
+            </a:extLst>
+          </p:cNvPr>
+          <p:cNvCxnSpPr>
+            <a:cxnSpLocks/>
+          </p:cNvCxnSpPr>
+          <p:nvPr/>
+        </p:nvCxnSpPr>
+        <p:spPr>
+          <a:xfrm flipH="1">
+            <a:off x="6855054" y="1631614"/>
+            <a:ext cx="720613" cy="522775"/>
+          </a:xfrm>
+          <a:prstGeom prst="line">
+            <a:avLst/>
+          </a:prstGeom>
+          <a:ln>
+            <a:solidFill>
+              <a:srgbClr val="E3E9ED"/>
+            </a:solidFill>
+          </a:ln>
+        </p:spPr>
+        <p:style>
+          <a:lnRef idx="2">
+            <a:schemeClr val="accent1"/>
+          </a:lnRef>
+          <a:fillRef idx="0">
+            <a:schemeClr val="accent1"/>
+          </a:fillRef>
+          <a:effectRef idx="1">
+            <a:schemeClr val="accent1"/>
+          </a:effectRef>
+          <a:fontRef idx="minor">
+            <a:schemeClr val="tx1"/>
+          </a:fontRef>
+        </p:style>
+      </p:cxnSp>
+      <p:sp>
+        <p:nvSpPr>
+          <p:cNvPr id="59" name="TextBox 58">
+            <a:extLst>
+              <a:ext uri="{FF2B5EF4-FFF2-40B4-BE49-F238E27FC236}">
+                <a16:creationId xmlns:a16="http://schemas.microsoft.com/office/drawing/2014/main" id="{63453964-552E-B273-0D52-301E2AC77EF6}"/>
+              </a:ext>
+            </a:extLst>
+          </p:cNvPr>
+          <p:cNvSpPr txBox="1"/>
+          <p:nvPr/>
+        </p:nvSpPr>
+        <p:spPr>
+          <a:xfrm>
+            <a:off x="7350664" y="1401737"/>
+            <a:ext cx="450005" cy="234286"/>
+          </a:xfrm>
+          <a:prstGeom prst="rect">
+            <a:avLst/>
+          </a:prstGeom>
+          <a:noFill/>
+          <a:ln cap="flat">
+            <a:solidFill>
+              <a:srgbClr val="E3E9ED"/>
+            </a:solidFill>
+            <a:round/>
+          </a:ln>
+        </p:spPr>
+        <p:txBody>
+          <a:bodyPr wrap="square" lIns="36000" tIns="36000" rIns="36000" bIns="36000" rtlCol="0">
+            <a:spAutoFit/>
+          </a:bodyPr>
+          <a:lstStyle/>
+          <a:p>
+            <a:pPr algn="ctr"/>
+            <a:r>
+              <a:rPr lang="en-GB" sz="1050" dirty="0">
+                <a:solidFill>
+                  <a:srgbClr val="E3E9ED"/>
+                </a:solidFill>
+                <a:latin typeface="Aptos Mono" panose="020F0502020204030204" pitchFamily="49" charset="0"/>
+              </a:rPr>
+              <a:t>HTML</a:t>
+            </a:r>
+          </a:p>
+        </p:txBody>
+      </p:sp>
+      <p:sp>
+        <p:nvSpPr>
+          <p:cNvPr id="61" name="TextBox 60">
+            <a:extLst>
+              <a:ext uri="{FF2B5EF4-FFF2-40B4-BE49-F238E27FC236}">
+                <a16:creationId xmlns:a16="http://schemas.microsoft.com/office/drawing/2014/main" id="{C694CDDF-E87D-3063-04DD-C03B67493DA6}"/>
+              </a:ext>
+            </a:extLst>
+          </p:cNvPr>
+          <p:cNvSpPr txBox="1"/>
+          <p:nvPr/>
+        </p:nvSpPr>
+        <p:spPr>
+          <a:xfrm>
+            <a:off x="7656067" y="1688271"/>
+            <a:ext cx="403228" cy="234286"/>
+          </a:xfrm>
+          <a:prstGeom prst="rect">
+            <a:avLst/>
+          </a:prstGeom>
+          <a:noFill/>
+          <a:ln cap="flat">
+            <a:solidFill>
+              <a:srgbClr val="E3E9ED"/>
+            </a:solidFill>
+            <a:round/>
+          </a:ln>
+        </p:spPr>
+        <p:txBody>
+          <a:bodyPr wrap="square" lIns="36000" tIns="36000" rIns="36000" bIns="36000" rtlCol="0">
+            <a:spAutoFit/>
+          </a:bodyPr>
+          <a:lstStyle/>
+          <a:p>
+            <a:pPr algn="ctr"/>
+            <a:r>
+              <a:rPr lang="en-GB" sz="1050" dirty="0">
+                <a:solidFill>
+                  <a:srgbClr val="E3E9ED"/>
+                </a:solidFill>
+                <a:latin typeface="Aptos Mono" panose="020F0502020204030204" pitchFamily="49" charset="0"/>
+              </a:rPr>
+              <a:t>CSS</a:t>
+            </a:r>
+          </a:p>
+        </p:txBody>
+      </p:sp>
+      <p:sp>
+        <p:nvSpPr>
+          <p:cNvPr id="62" name="TextBox 61">
+            <a:extLst>
+              <a:ext uri="{FF2B5EF4-FFF2-40B4-BE49-F238E27FC236}">
+                <a16:creationId xmlns:a16="http://schemas.microsoft.com/office/drawing/2014/main" id="{09138CBC-7D04-1EBC-A10D-B9815EF3BDE0}"/>
+              </a:ext>
+            </a:extLst>
+          </p:cNvPr>
+          <p:cNvSpPr txBox="1"/>
+          <p:nvPr/>
+        </p:nvSpPr>
+        <p:spPr>
+          <a:xfrm>
+            <a:off x="7523983" y="2568259"/>
+            <a:ext cx="892815" cy="234286"/>
+          </a:xfrm>
+          <a:prstGeom prst="rect">
+            <a:avLst/>
+          </a:prstGeom>
+          <a:noFill/>
+          <a:ln cap="flat">
+            <a:solidFill>
+              <a:srgbClr val="E3E9ED"/>
+            </a:solidFill>
+            <a:round/>
+          </a:ln>
+        </p:spPr>
+        <p:txBody>
+          <a:bodyPr wrap="square" lIns="36000" tIns="36000" rIns="36000" bIns="36000" rtlCol="0">
+            <a:spAutoFit/>
+          </a:bodyPr>
+          <a:lstStyle/>
+          <a:p>
+            <a:pPr algn="ctr"/>
+            <a:r>
+              <a:rPr lang="en-GB" sz="1050" dirty="0">
+                <a:solidFill>
+                  <a:srgbClr val="E3E9ED"/>
+                </a:solidFill>
+                <a:latin typeface="Aptos Mono" panose="020F0502020204030204" pitchFamily="49" charset="0"/>
+              </a:rPr>
+              <a:t>JavaScript</a:t>
+            </a:r>
+          </a:p>
+        </p:txBody>
+      </p:sp>
+      <p:sp>
+        <p:nvSpPr>
+          <p:cNvPr id="68" name="TextBox 67">
+            <a:extLst>
+              <a:ext uri="{FF2B5EF4-FFF2-40B4-BE49-F238E27FC236}">
+                <a16:creationId xmlns:a16="http://schemas.microsoft.com/office/drawing/2014/main" id="{C004E3CF-A265-B0E7-B9A7-BD01645106B6}"/>
+              </a:ext>
+            </a:extLst>
+          </p:cNvPr>
+          <p:cNvSpPr txBox="1"/>
+          <p:nvPr/>
+        </p:nvSpPr>
+        <p:spPr>
+          <a:xfrm>
+            <a:off x="3136556" y="1504749"/>
+            <a:ext cx="450005" cy="234286"/>
+          </a:xfrm>
+          <a:prstGeom prst="rect">
+            <a:avLst/>
+          </a:prstGeom>
+          <a:noFill/>
+          <a:ln cap="flat">
+            <a:solidFill>
+              <a:srgbClr val="E3E9ED"/>
+            </a:solidFill>
+            <a:round/>
+          </a:ln>
+        </p:spPr>
+        <p:txBody>
+          <a:bodyPr wrap="square" lIns="36000" tIns="36000" rIns="36000" bIns="36000" rtlCol="0">
+            <a:spAutoFit/>
+          </a:bodyPr>
+          <a:lstStyle/>
+          <a:p>
+            <a:pPr algn="ctr"/>
+            <a:r>
+              <a:rPr lang="en-GB" sz="1050" dirty="0">
+                <a:solidFill>
+                  <a:srgbClr val="E3E9ED"/>
+                </a:solidFill>
+                <a:latin typeface="Aptos Mono" panose="020F0502020204030204" pitchFamily="49" charset="0"/>
+              </a:rPr>
+              <a:t>DSA</a:t>
+            </a:r>
+          </a:p>
+        </p:txBody>
+      </p:sp>
+      <p:sp>
+        <p:nvSpPr>
+          <p:cNvPr id="69" name="TextBox 68">
+            <a:extLst>
+              <a:ext uri="{FF2B5EF4-FFF2-40B4-BE49-F238E27FC236}">
+                <a16:creationId xmlns:a16="http://schemas.microsoft.com/office/drawing/2014/main" id="{90EF076E-3AC3-DC80-A831-E57F75746DA3}"/>
+              </a:ext>
+            </a:extLst>
+          </p:cNvPr>
+          <p:cNvSpPr txBox="1"/>
+          <p:nvPr/>
+        </p:nvSpPr>
+        <p:spPr>
+          <a:xfrm>
+            <a:off x="1975694" y="2209406"/>
+            <a:ext cx="810009" cy="234286"/>
+          </a:xfrm>
+          <a:prstGeom prst="rect">
+            <a:avLst/>
+          </a:prstGeom>
+          <a:noFill/>
+          <a:ln cap="flat">
+            <a:solidFill>
+              <a:srgbClr val="E3E9ED"/>
+            </a:solidFill>
+            <a:round/>
+          </a:ln>
+        </p:spPr>
+        <p:txBody>
+          <a:bodyPr wrap="square" lIns="36000" tIns="36000" rIns="36000" bIns="36000" rtlCol="0">
+            <a:spAutoFit/>
+          </a:bodyPr>
+          <a:lstStyle/>
+          <a:p>
+            <a:pPr algn="ctr"/>
+            <a:r>
+              <a:rPr lang="en-GB" sz="1050" dirty="0">
+                <a:solidFill>
+                  <a:srgbClr val="E3E9ED"/>
+                </a:solidFill>
+                <a:latin typeface="Aptos Mono" panose="020F0502020204030204" pitchFamily="49" charset="0"/>
+              </a:rPr>
+              <a:t>Databases</a:t>
+            </a:r>
+          </a:p>
+        </p:txBody>
+      </p:sp>
+      <p:sp>
+        <p:nvSpPr>
+          <p:cNvPr id="72" name="TextBox 71">
+            <a:extLst>
+              <a:ext uri="{FF2B5EF4-FFF2-40B4-BE49-F238E27FC236}">
+                <a16:creationId xmlns:a16="http://schemas.microsoft.com/office/drawing/2014/main" id="{92C467EB-CD47-0F7A-A80C-80AFEF62657C}"/>
+              </a:ext>
+            </a:extLst>
+          </p:cNvPr>
+          <p:cNvSpPr txBox="1"/>
+          <p:nvPr/>
+        </p:nvSpPr>
+        <p:spPr>
+          <a:xfrm>
+            <a:off x="2157770" y="1767344"/>
+            <a:ext cx="892815" cy="234286"/>
+          </a:xfrm>
+          <a:prstGeom prst="rect">
+            <a:avLst/>
+          </a:prstGeom>
+          <a:noFill/>
+          <a:ln cap="flat">
+            <a:solidFill>
+              <a:srgbClr val="E3E9ED"/>
+            </a:solidFill>
+            <a:round/>
+          </a:ln>
+        </p:spPr>
+        <p:txBody>
+          <a:bodyPr wrap="square" lIns="36000" tIns="36000" rIns="36000" bIns="36000" rtlCol="0">
+            <a:spAutoFit/>
+          </a:bodyPr>
+          <a:lstStyle/>
+          <a:p>
+            <a:pPr algn="ctr"/>
+            <a:r>
+              <a:rPr lang="en-GB" sz="1050" dirty="0">
+                <a:solidFill>
+                  <a:srgbClr val="E3E9ED"/>
+                </a:solidFill>
+                <a:latin typeface="Aptos Mono" panose="020F0502020204030204" pitchFamily="49" charset="0"/>
+              </a:rPr>
+              <a:t>Functional</a:t>
+            </a:r>
+          </a:p>
+        </p:txBody>
+      </p:sp>
+      <p:sp>
+        <p:nvSpPr>
+          <p:cNvPr id="73" name="TextBox 72">
+            <a:extLst>
+              <a:ext uri="{FF2B5EF4-FFF2-40B4-BE49-F238E27FC236}">
+                <a16:creationId xmlns:a16="http://schemas.microsoft.com/office/drawing/2014/main" id="{0E4E35A7-CA47-42C1-0A62-D4C52196BF90}"/>
+              </a:ext>
+            </a:extLst>
+          </p:cNvPr>
+          <p:cNvSpPr txBox="1"/>
+          <p:nvPr/>
+        </p:nvSpPr>
+        <p:spPr>
+          <a:xfrm>
+            <a:off x="5596550" y="3290765"/>
+            <a:ext cx="297605" cy="234286"/>
+          </a:xfrm>
+          <a:prstGeom prst="rect">
+            <a:avLst/>
+          </a:prstGeom>
+          <a:noFill/>
+          <a:ln cap="flat">
+            <a:solidFill>
+              <a:srgbClr val="E3E9ED"/>
+            </a:solidFill>
+            <a:round/>
+          </a:ln>
+        </p:spPr>
+        <p:txBody>
+          <a:bodyPr wrap="square" lIns="36000" tIns="36000" rIns="36000" bIns="36000" rtlCol="0">
+            <a:spAutoFit/>
+          </a:bodyPr>
+          <a:lstStyle/>
+          <a:p>
+            <a:pPr algn="ctr"/>
+            <a:r>
+              <a:rPr lang="en-GB" sz="1050" dirty="0">
+                <a:solidFill>
+                  <a:srgbClr val="E3E9ED"/>
+                </a:solidFill>
+                <a:latin typeface="Aptos Mono" panose="020F0502020204030204" pitchFamily="49" charset="0"/>
+              </a:rPr>
+              <a:t>AI</a:t>
+            </a:r>
+          </a:p>
+        </p:txBody>
+      </p:sp>
+      <p:sp>
+        <p:nvSpPr>
+          <p:cNvPr id="74" name="TextBox 73">
+            <a:extLst>
+              <a:ext uri="{FF2B5EF4-FFF2-40B4-BE49-F238E27FC236}">
+                <a16:creationId xmlns:a16="http://schemas.microsoft.com/office/drawing/2014/main" id="{3DAFF7A3-38B1-0EF7-A335-56F2094F3C31}"/>
+              </a:ext>
+            </a:extLst>
+          </p:cNvPr>
+          <p:cNvSpPr txBox="1"/>
+          <p:nvPr/>
+        </p:nvSpPr>
+        <p:spPr>
+          <a:xfrm>
+            <a:off x="5396658" y="1518880"/>
+            <a:ext cx="1128022" cy="395869"/>
+          </a:xfrm>
+          <a:prstGeom prst="rect">
+            <a:avLst/>
+          </a:prstGeom>
+          <a:noFill/>
+          <a:ln cap="flat">
+            <a:solidFill>
+              <a:srgbClr val="E3E9ED"/>
+            </a:solidFill>
+            <a:round/>
+          </a:ln>
+        </p:spPr>
+        <p:txBody>
+          <a:bodyPr wrap="square" lIns="36000" tIns="36000" rIns="36000" bIns="36000" rtlCol="0">
+            <a:spAutoFit/>
+          </a:bodyPr>
+          <a:lstStyle/>
+          <a:p>
+            <a:pPr algn="ctr"/>
+            <a:r>
+              <a:rPr lang="en-GB" sz="1050" dirty="0">
+                <a:solidFill>
+                  <a:srgbClr val="E3E9ED"/>
+                </a:solidFill>
+                <a:latin typeface="Aptos Mono" panose="020F0502020204030204" pitchFamily="49" charset="0"/>
+              </a:rPr>
+              <a:t>Data Visualisation</a:t>
+            </a:r>
+          </a:p>
+        </p:txBody>
+      </p:sp>
+      <p:sp>
+        <p:nvSpPr>
+          <p:cNvPr id="75" name="TextBox 74">
+            <a:extLst>
+              <a:ext uri="{FF2B5EF4-FFF2-40B4-BE49-F238E27FC236}">
+                <a16:creationId xmlns:a16="http://schemas.microsoft.com/office/drawing/2014/main" id="{145ACF9E-35AE-5AFD-44B3-EF663047A3FC}"/>
+              </a:ext>
+            </a:extLst>
+          </p:cNvPr>
+          <p:cNvSpPr txBox="1"/>
+          <p:nvPr/>
+        </p:nvSpPr>
+        <p:spPr>
+          <a:xfrm>
+            <a:off x="4028983" y="1667027"/>
+            <a:ext cx="1128022" cy="395869"/>
+          </a:xfrm>
+          <a:prstGeom prst="rect">
+            <a:avLst/>
+          </a:prstGeom>
+          <a:noFill/>
+          <a:ln cap="flat">
+            <a:solidFill>
+              <a:srgbClr val="E3E9ED"/>
+            </a:solidFill>
+            <a:round/>
+          </a:ln>
+        </p:spPr>
+        <p:txBody>
+          <a:bodyPr wrap="square" lIns="36000" tIns="36000" rIns="36000" bIns="36000" rtlCol="0">
+            <a:spAutoFit/>
+          </a:bodyPr>
+          <a:lstStyle/>
+          <a:p>
+            <a:pPr algn="ctr"/>
+            <a:r>
+              <a:rPr lang="en-GB" sz="1050" dirty="0">
+                <a:solidFill>
+                  <a:srgbClr val="E3E9ED"/>
+                </a:solidFill>
+                <a:latin typeface="Aptos Mono" panose="020F0502020204030204" pitchFamily="49" charset="0"/>
+              </a:rPr>
+              <a:t>General Proficiency</a:t>
+            </a:r>
+          </a:p>
+        </p:txBody>
+      </p:sp>
+      <p:cxnSp>
+        <p:nvCxnSpPr>
+          <p:cNvPr id="76" name="Straight Connector 75">
+            <a:extLst>
+              <a:ext uri="{FF2B5EF4-FFF2-40B4-BE49-F238E27FC236}">
+                <a16:creationId xmlns:a16="http://schemas.microsoft.com/office/drawing/2014/main" id="{34E93C23-6E15-E13E-8193-5D506A04F5A6}"/>
+              </a:ext>
+            </a:extLst>
+          </p:cNvPr>
+          <p:cNvCxnSpPr>
+            <a:cxnSpLocks/>
+            <a:stCxn id="74" idx="2"/>
+          </p:cNvCxnSpPr>
+          <p:nvPr/>
+        </p:nvCxnSpPr>
+        <p:spPr>
+          <a:xfrm flipH="1">
+            <a:off x="5472009" y="1914749"/>
+            <a:ext cx="488660" cy="502415"/>
+          </a:xfrm>
+          <a:prstGeom prst="line">
+            <a:avLst/>
+          </a:prstGeom>
+          <a:ln>
+            <a:solidFill>
+              <a:srgbClr val="E3E9ED"/>
+            </a:solidFill>
+          </a:ln>
+        </p:spPr>
+        <p:style>
+          <a:lnRef idx="2">
+            <a:schemeClr val="accent1"/>
+          </a:lnRef>
+          <a:fillRef idx="0">
+            <a:schemeClr val="accent1"/>
+          </a:fillRef>
+          <a:effectRef idx="1">
+            <a:schemeClr val="accent1"/>
+          </a:effectRef>
+          <a:fontRef idx="minor">
+            <a:schemeClr val="tx1"/>
+          </a:fontRef>
+        </p:style>
+      </p:cxnSp>
+      <p:cxnSp>
+        <p:nvCxnSpPr>
+          <p:cNvPr id="82" name="Straight Connector 81">
+            <a:extLst>
+              <a:ext uri="{FF2B5EF4-FFF2-40B4-BE49-F238E27FC236}">
+                <a16:creationId xmlns:a16="http://schemas.microsoft.com/office/drawing/2014/main" id="{2AED14CD-731C-0254-0F18-ADFDA85276E6}"/>
+              </a:ext>
+            </a:extLst>
+          </p:cNvPr>
+          <p:cNvCxnSpPr>
+            <a:cxnSpLocks/>
+          </p:cNvCxnSpPr>
+          <p:nvPr/>
+        </p:nvCxnSpPr>
+        <p:spPr>
+          <a:xfrm>
+            <a:off x="4301996" y="2075811"/>
+            <a:ext cx="270002" cy="725344"/>
+          </a:xfrm>
+          <a:prstGeom prst="line">
+            <a:avLst/>
+          </a:prstGeom>
+          <a:ln>
+            <a:solidFill>
+              <a:srgbClr val="E3E9ED"/>
+            </a:solidFill>
+          </a:ln>
+        </p:spPr>
+        <p:style>
+          <a:lnRef idx="2">
+            <a:schemeClr val="accent1"/>
+          </a:lnRef>
+          <a:fillRef idx="0">
+            <a:schemeClr val="accent1"/>
+          </a:fillRef>
+          <a:effectRef idx="1">
+            <a:schemeClr val="accent1"/>
+          </a:effectRef>
+          <a:fontRef idx="minor">
+            <a:schemeClr val="tx1"/>
+          </a:fontRef>
+        </p:style>
+      </p:cxnSp>
+      <p:cxnSp>
+        <p:nvCxnSpPr>
+          <p:cNvPr id="85" name="Straight Connector 84">
+            <a:extLst>
+              <a:ext uri="{FF2B5EF4-FFF2-40B4-BE49-F238E27FC236}">
+                <a16:creationId xmlns:a16="http://schemas.microsoft.com/office/drawing/2014/main" id="{2D0CB3AB-A374-29E9-AC9D-D62FD6EB85C9}"/>
+              </a:ext>
+            </a:extLst>
+          </p:cNvPr>
+          <p:cNvCxnSpPr>
+            <a:cxnSpLocks/>
+          </p:cNvCxnSpPr>
+          <p:nvPr/>
+        </p:nvCxnSpPr>
+        <p:spPr>
+          <a:xfrm flipH="1">
+            <a:off x="4579194" y="2075197"/>
+            <a:ext cx="262806" cy="723290"/>
+          </a:xfrm>
+          <a:prstGeom prst="line">
+            <a:avLst/>
+          </a:prstGeom>
+          <a:ln>
+            <a:solidFill>
+              <a:srgbClr val="E3E9ED"/>
+            </a:solidFill>
+          </a:ln>
+        </p:spPr>
+        <p:style>
+          <a:lnRef idx="2">
+            <a:schemeClr val="accent1"/>
+          </a:lnRef>
+          <a:fillRef idx="0">
+            <a:schemeClr val="accent1"/>
+          </a:fillRef>
+          <a:effectRef idx="1">
+            <a:schemeClr val="accent1"/>
+          </a:effectRef>
+          <a:fontRef idx="minor">
+            <a:schemeClr val="tx1"/>
+          </a:fontRef>
+        </p:style>
+      </p:cxnSp>
+      <p:cxnSp>
+        <p:nvCxnSpPr>
+          <p:cNvPr id="103" name="Straight Connector 102">
+            <a:extLst>
+              <a:ext uri="{FF2B5EF4-FFF2-40B4-BE49-F238E27FC236}">
+                <a16:creationId xmlns:a16="http://schemas.microsoft.com/office/drawing/2014/main" id="{ABC7A059-741A-804F-1CC5-FB50542E15D4}"/>
+              </a:ext>
+            </a:extLst>
+          </p:cNvPr>
+          <p:cNvCxnSpPr>
+            <a:cxnSpLocks/>
+          </p:cNvCxnSpPr>
+          <p:nvPr/>
+        </p:nvCxnSpPr>
+        <p:spPr>
+          <a:xfrm>
+            <a:off x="3547193" y="2436842"/>
+            <a:ext cx="567609" cy="352320"/>
+          </a:xfrm>
+          <a:prstGeom prst="line">
+            <a:avLst/>
+          </a:prstGeom>
+          <a:ln>
+            <a:solidFill>
+              <a:srgbClr val="E3E9ED"/>
+            </a:solidFill>
+          </a:ln>
+        </p:spPr>
+        <p:style>
+          <a:lnRef idx="2">
+            <a:schemeClr val="accent1"/>
+          </a:lnRef>
+          <a:fillRef idx="0">
+            <a:schemeClr val="accent1"/>
+          </a:fillRef>
+          <a:effectRef idx="1">
+            <a:schemeClr val="accent1"/>
+          </a:effectRef>
+          <a:fontRef idx="minor">
+            <a:schemeClr val="tx1"/>
+          </a:fontRef>
+        </p:style>
+      </p:cxnSp>
+      <p:cxnSp>
+        <p:nvCxnSpPr>
+          <p:cNvPr id="106" name="Straight Connector 105">
+            <a:extLst>
+              <a:ext uri="{FF2B5EF4-FFF2-40B4-BE49-F238E27FC236}">
+                <a16:creationId xmlns:a16="http://schemas.microsoft.com/office/drawing/2014/main" id="{C5818695-58AE-9040-BA10-CA40191D14ED}"/>
+              </a:ext>
+            </a:extLst>
+          </p:cNvPr>
+          <p:cNvCxnSpPr>
+            <a:cxnSpLocks/>
+            <a:stCxn id="69" idx="3"/>
+          </p:cNvCxnSpPr>
+          <p:nvPr/>
+        </p:nvCxnSpPr>
+        <p:spPr>
+          <a:xfrm>
+            <a:off x="2785703" y="2326549"/>
+            <a:ext cx="761490" cy="110293"/>
+          </a:xfrm>
+          <a:prstGeom prst="line">
+            <a:avLst/>
+          </a:prstGeom>
+          <a:ln>
+            <a:solidFill>
+              <a:srgbClr val="E3E9ED"/>
+            </a:solidFill>
+          </a:ln>
+        </p:spPr>
+        <p:style>
+          <a:lnRef idx="2">
+            <a:schemeClr val="accent1"/>
+          </a:lnRef>
+          <a:fillRef idx="0">
+            <a:schemeClr val="accent1"/>
+          </a:fillRef>
+          <a:effectRef idx="1">
+            <a:schemeClr val="accent1"/>
+          </a:effectRef>
+          <a:fontRef idx="minor">
+            <a:schemeClr val="tx1"/>
+          </a:fontRef>
+        </p:style>
+      </p:cxnSp>
+    </p:spTree>
+    <p:extLst>
+      <p:ext uri="{BB962C8B-B14F-4D97-AF65-F5344CB8AC3E}">
+        <p14:creationId xmlns:p14="http://schemas.microsoft.com/office/powerpoint/2010/main" val="234888975"/>
       </p:ext>
     </p:extLst>
   </p:cSld>

</xml_diff>

<commit_message>
finished basic wireframes. started development.
- image corrections on fotomatic project for more appealing screenshots.
</commit_message>
<xml_diff>
--- a/Portfolio-Project-Personal-Portfolio-Website/Wireframes.pptx
+++ b/Portfolio-Project-Personal-Portfolio-Website/Wireframes.pptx
@@ -5,7 +5,7 @@
     <p:sldMasterId id="2147483708" r:id="rId1"/>
   </p:sldMasterIdLst>
   <p:notesMasterIdLst>
-    <p:notesMasterId r:id="rId7"/>
+    <p:notesMasterId r:id="rId12"/>
   </p:notesMasterIdLst>
   <p:sldIdLst>
     <p:sldId id="256" r:id="rId2"/>
@@ -13,6 +13,11 @@
     <p:sldId id="258" r:id="rId4"/>
     <p:sldId id="259" r:id="rId5"/>
     <p:sldId id="260" r:id="rId6"/>
+    <p:sldId id="261" r:id="rId7"/>
+    <p:sldId id="262" r:id="rId8"/>
+    <p:sldId id="263" r:id="rId9"/>
+    <p:sldId id="264" r:id="rId10"/>
+    <p:sldId id="265" r:id="rId11"/>
   </p:sldIdLst>
   <p:sldSz cx="9144000" cy="5143500" type="screen16x9"/>
   <p:notesSz cx="6858000" cy="9144000"/>
@@ -201,7 +206,7 @@
           <a:p>
             <a:fld id="{A273ECB5-27FA-4334-B172-E40162A074CC}" type="datetimeFigureOut">
               <a:rPr lang="en-GB" smtClean="0"/>
-              <a:t>19/08/2024</a:t>
+              <a:t>20/08/2024</a:t>
             </a:fld>
             <a:endParaRPr lang="en-GB" dirty="0"/>
           </a:p>
@@ -805,6 +810,426 @@
 </p:notes>
 </file>
 
+<file path=ppt/notesSlides/notesSlide5.xml><?xml version="1.0" encoding="utf-8"?>
+<p:notes xmlns:a="http://schemas.openxmlformats.org/drawingml/2006/main" xmlns:r="http://schemas.openxmlformats.org/officeDocument/2006/relationships" xmlns:p="http://schemas.openxmlformats.org/presentationml/2006/main">
+  <p:cSld>
+    <p:spTree>
+      <p:nvGrpSpPr>
+        <p:cNvPr id="1" name=""/>
+        <p:cNvGrpSpPr/>
+        <p:nvPr/>
+      </p:nvGrpSpPr>
+      <p:grpSpPr>
+        <a:xfrm>
+          <a:off x="0" y="0"/>
+          <a:ext cx="0" cy="0"/>
+          <a:chOff x="0" y="0"/>
+          <a:chExt cx="0" cy="0"/>
+        </a:xfrm>
+      </p:grpSpPr>
+      <p:sp>
+        <p:nvSpPr>
+          <p:cNvPr id="2" name="Slide Image Placeholder 1"/>
+          <p:cNvSpPr>
+            <a:spLocks noGrp="1" noRot="1" noChangeAspect="1"/>
+          </p:cNvSpPr>
+          <p:nvPr>
+            <p:ph type="sldImg"/>
+          </p:nvPr>
+        </p:nvSpPr>
+        <p:spPr/>
+      </p:sp>
+      <p:sp>
+        <p:nvSpPr>
+          <p:cNvPr id="3" name="Notes Placeholder 2"/>
+          <p:cNvSpPr>
+            <a:spLocks noGrp="1"/>
+          </p:cNvSpPr>
+          <p:nvPr>
+            <p:ph type="body" idx="1"/>
+          </p:nvPr>
+        </p:nvSpPr>
+        <p:spPr/>
+        <p:txBody>
+          <a:bodyPr/>
+          <a:lstStyle/>
+          <a:p>
+            <a:endParaRPr lang="en-GB" dirty="0"/>
+          </a:p>
+        </p:txBody>
+      </p:sp>
+      <p:sp>
+        <p:nvSpPr>
+          <p:cNvPr id="4" name="Slide Number Placeholder 3"/>
+          <p:cNvSpPr>
+            <a:spLocks noGrp="1"/>
+          </p:cNvSpPr>
+          <p:nvPr>
+            <p:ph type="sldNum" sz="quarter" idx="5"/>
+          </p:nvPr>
+        </p:nvSpPr>
+        <p:spPr/>
+        <p:txBody>
+          <a:bodyPr/>
+          <a:lstStyle/>
+          <a:p>
+            <a:fld id="{EC8F3035-11B3-46F6-8FD1-FF84F47AA3E8}" type="slidenum">
+              <a:rPr lang="en-GB" smtClean="0"/>
+              <a:t>6</a:t>
+            </a:fld>
+            <a:endParaRPr lang="en-GB" dirty="0"/>
+          </a:p>
+        </p:txBody>
+      </p:sp>
+    </p:spTree>
+    <p:extLst>
+      <p:ext uri="{BB962C8B-B14F-4D97-AF65-F5344CB8AC3E}">
+        <p14:creationId xmlns:p14="http://schemas.microsoft.com/office/powerpoint/2010/main" val="1602874589"/>
+      </p:ext>
+    </p:extLst>
+  </p:cSld>
+  <p:clrMapOvr>
+    <a:masterClrMapping/>
+  </p:clrMapOvr>
+</p:notes>
+</file>
+
+<file path=ppt/notesSlides/notesSlide6.xml><?xml version="1.0" encoding="utf-8"?>
+<p:notes xmlns:a="http://schemas.openxmlformats.org/drawingml/2006/main" xmlns:r="http://schemas.openxmlformats.org/officeDocument/2006/relationships" xmlns:p="http://schemas.openxmlformats.org/presentationml/2006/main">
+  <p:cSld>
+    <p:spTree>
+      <p:nvGrpSpPr>
+        <p:cNvPr id="1" name=""/>
+        <p:cNvGrpSpPr/>
+        <p:nvPr/>
+      </p:nvGrpSpPr>
+      <p:grpSpPr>
+        <a:xfrm>
+          <a:off x="0" y="0"/>
+          <a:ext cx="0" cy="0"/>
+          <a:chOff x="0" y="0"/>
+          <a:chExt cx="0" cy="0"/>
+        </a:xfrm>
+      </p:grpSpPr>
+      <p:sp>
+        <p:nvSpPr>
+          <p:cNvPr id="2" name="Slide Image Placeholder 1"/>
+          <p:cNvSpPr>
+            <a:spLocks noGrp="1" noRot="1" noChangeAspect="1"/>
+          </p:cNvSpPr>
+          <p:nvPr>
+            <p:ph type="sldImg"/>
+          </p:nvPr>
+        </p:nvSpPr>
+        <p:spPr/>
+      </p:sp>
+      <p:sp>
+        <p:nvSpPr>
+          <p:cNvPr id="3" name="Notes Placeholder 2"/>
+          <p:cNvSpPr>
+            <a:spLocks noGrp="1"/>
+          </p:cNvSpPr>
+          <p:nvPr>
+            <p:ph type="body" idx="1"/>
+          </p:nvPr>
+        </p:nvSpPr>
+        <p:spPr/>
+        <p:txBody>
+          <a:bodyPr/>
+          <a:lstStyle/>
+          <a:p>
+            <a:endParaRPr lang="en-GB" dirty="0"/>
+          </a:p>
+        </p:txBody>
+      </p:sp>
+      <p:sp>
+        <p:nvSpPr>
+          <p:cNvPr id="4" name="Slide Number Placeholder 3"/>
+          <p:cNvSpPr>
+            <a:spLocks noGrp="1"/>
+          </p:cNvSpPr>
+          <p:nvPr>
+            <p:ph type="sldNum" sz="quarter" idx="5"/>
+          </p:nvPr>
+        </p:nvSpPr>
+        <p:spPr/>
+        <p:txBody>
+          <a:bodyPr/>
+          <a:lstStyle/>
+          <a:p>
+            <a:fld id="{EC8F3035-11B3-46F6-8FD1-FF84F47AA3E8}" type="slidenum">
+              <a:rPr lang="en-GB" smtClean="0"/>
+              <a:t>7</a:t>
+            </a:fld>
+            <a:endParaRPr lang="en-GB" dirty="0"/>
+          </a:p>
+        </p:txBody>
+      </p:sp>
+    </p:spTree>
+    <p:extLst>
+      <p:ext uri="{BB962C8B-B14F-4D97-AF65-F5344CB8AC3E}">
+        <p14:creationId xmlns:p14="http://schemas.microsoft.com/office/powerpoint/2010/main" val="3076635699"/>
+      </p:ext>
+    </p:extLst>
+  </p:cSld>
+  <p:clrMapOvr>
+    <a:masterClrMapping/>
+  </p:clrMapOvr>
+</p:notes>
+</file>
+
+<file path=ppt/notesSlides/notesSlide7.xml><?xml version="1.0" encoding="utf-8"?>
+<p:notes xmlns:a="http://schemas.openxmlformats.org/drawingml/2006/main" xmlns:r="http://schemas.openxmlformats.org/officeDocument/2006/relationships" xmlns:p="http://schemas.openxmlformats.org/presentationml/2006/main">
+  <p:cSld>
+    <p:spTree>
+      <p:nvGrpSpPr>
+        <p:cNvPr id="1" name=""/>
+        <p:cNvGrpSpPr/>
+        <p:nvPr/>
+      </p:nvGrpSpPr>
+      <p:grpSpPr>
+        <a:xfrm>
+          <a:off x="0" y="0"/>
+          <a:ext cx="0" cy="0"/>
+          <a:chOff x="0" y="0"/>
+          <a:chExt cx="0" cy="0"/>
+        </a:xfrm>
+      </p:grpSpPr>
+      <p:sp>
+        <p:nvSpPr>
+          <p:cNvPr id="2" name="Slide Image Placeholder 1"/>
+          <p:cNvSpPr>
+            <a:spLocks noGrp="1" noRot="1" noChangeAspect="1"/>
+          </p:cNvSpPr>
+          <p:nvPr>
+            <p:ph type="sldImg"/>
+          </p:nvPr>
+        </p:nvSpPr>
+        <p:spPr/>
+      </p:sp>
+      <p:sp>
+        <p:nvSpPr>
+          <p:cNvPr id="3" name="Notes Placeholder 2"/>
+          <p:cNvSpPr>
+            <a:spLocks noGrp="1"/>
+          </p:cNvSpPr>
+          <p:nvPr>
+            <p:ph type="body" idx="1"/>
+          </p:nvPr>
+        </p:nvSpPr>
+        <p:spPr/>
+        <p:txBody>
+          <a:bodyPr/>
+          <a:lstStyle/>
+          <a:p>
+            <a:endParaRPr lang="en-GB" dirty="0"/>
+          </a:p>
+        </p:txBody>
+      </p:sp>
+      <p:sp>
+        <p:nvSpPr>
+          <p:cNvPr id="4" name="Slide Number Placeholder 3"/>
+          <p:cNvSpPr>
+            <a:spLocks noGrp="1"/>
+          </p:cNvSpPr>
+          <p:nvPr>
+            <p:ph type="sldNum" sz="quarter" idx="5"/>
+          </p:nvPr>
+        </p:nvSpPr>
+        <p:spPr/>
+        <p:txBody>
+          <a:bodyPr/>
+          <a:lstStyle/>
+          <a:p>
+            <a:fld id="{EC8F3035-11B3-46F6-8FD1-FF84F47AA3E8}" type="slidenum">
+              <a:rPr lang="en-GB" smtClean="0"/>
+              <a:t>8</a:t>
+            </a:fld>
+            <a:endParaRPr lang="en-GB" dirty="0"/>
+          </a:p>
+        </p:txBody>
+      </p:sp>
+    </p:spTree>
+    <p:extLst>
+      <p:ext uri="{BB962C8B-B14F-4D97-AF65-F5344CB8AC3E}">
+        <p14:creationId xmlns:p14="http://schemas.microsoft.com/office/powerpoint/2010/main" val="1555524286"/>
+      </p:ext>
+    </p:extLst>
+  </p:cSld>
+  <p:clrMapOvr>
+    <a:masterClrMapping/>
+  </p:clrMapOvr>
+</p:notes>
+</file>
+
+<file path=ppt/notesSlides/notesSlide8.xml><?xml version="1.0" encoding="utf-8"?>
+<p:notes xmlns:a="http://schemas.openxmlformats.org/drawingml/2006/main" xmlns:r="http://schemas.openxmlformats.org/officeDocument/2006/relationships" xmlns:p="http://schemas.openxmlformats.org/presentationml/2006/main">
+  <p:cSld>
+    <p:spTree>
+      <p:nvGrpSpPr>
+        <p:cNvPr id="1" name=""/>
+        <p:cNvGrpSpPr/>
+        <p:nvPr/>
+      </p:nvGrpSpPr>
+      <p:grpSpPr>
+        <a:xfrm>
+          <a:off x="0" y="0"/>
+          <a:ext cx="0" cy="0"/>
+          <a:chOff x="0" y="0"/>
+          <a:chExt cx="0" cy="0"/>
+        </a:xfrm>
+      </p:grpSpPr>
+      <p:sp>
+        <p:nvSpPr>
+          <p:cNvPr id="2" name="Slide Image Placeholder 1"/>
+          <p:cNvSpPr>
+            <a:spLocks noGrp="1" noRot="1" noChangeAspect="1"/>
+          </p:cNvSpPr>
+          <p:nvPr>
+            <p:ph type="sldImg"/>
+          </p:nvPr>
+        </p:nvSpPr>
+        <p:spPr/>
+      </p:sp>
+      <p:sp>
+        <p:nvSpPr>
+          <p:cNvPr id="3" name="Notes Placeholder 2"/>
+          <p:cNvSpPr>
+            <a:spLocks noGrp="1"/>
+          </p:cNvSpPr>
+          <p:nvPr>
+            <p:ph type="body" idx="1"/>
+          </p:nvPr>
+        </p:nvSpPr>
+        <p:spPr/>
+        <p:txBody>
+          <a:bodyPr/>
+          <a:lstStyle/>
+          <a:p>
+            <a:endParaRPr lang="en-GB" dirty="0"/>
+          </a:p>
+        </p:txBody>
+      </p:sp>
+      <p:sp>
+        <p:nvSpPr>
+          <p:cNvPr id="4" name="Slide Number Placeholder 3"/>
+          <p:cNvSpPr>
+            <a:spLocks noGrp="1"/>
+          </p:cNvSpPr>
+          <p:nvPr>
+            <p:ph type="sldNum" sz="quarter" idx="5"/>
+          </p:nvPr>
+        </p:nvSpPr>
+        <p:spPr/>
+        <p:txBody>
+          <a:bodyPr/>
+          <a:lstStyle/>
+          <a:p>
+            <a:fld id="{EC8F3035-11B3-46F6-8FD1-FF84F47AA3E8}" type="slidenum">
+              <a:rPr lang="en-GB" smtClean="0"/>
+              <a:t>9</a:t>
+            </a:fld>
+            <a:endParaRPr lang="en-GB" dirty="0"/>
+          </a:p>
+        </p:txBody>
+      </p:sp>
+    </p:spTree>
+    <p:extLst>
+      <p:ext uri="{BB962C8B-B14F-4D97-AF65-F5344CB8AC3E}">
+        <p14:creationId xmlns:p14="http://schemas.microsoft.com/office/powerpoint/2010/main" val="3563526266"/>
+      </p:ext>
+    </p:extLst>
+  </p:cSld>
+  <p:clrMapOvr>
+    <a:masterClrMapping/>
+  </p:clrMapOvr>
+</p:notes>
+</file>
+
+<file path=ppt/notesSlides/notesSlide9.xml><?xml version="1.0" encoding="utf-8"?>
+<p:notes xmlns:a="http://schemas.openxmlformats.org/drawingml/2006/main" xmlns:r="http://schemas.openxmlformats.org/officeDocument/2006/relationships" xmlns:p="http://schemas.openxmlformats.org/presentationml/2006/main">
+  <p:cSld>
+    <p:spTree>
+      <p:nvGrpSpPr>
+        <p:cNvPr id="1" name=""/>
+        <p:cNvGrpSpPr/>
+        <p:nvPr/>
+      </p:nvGrpSpPr>
+      <p:grpSpPr>
+        <a:xfrm>
+          <a:off x="0" y="0"/>
+          <a:ext cx="0" cy="0"/>
+          <a:chOff x="0" y="0"/>
+          <a:chExt cx="0" cy="0"/>
+        </a:xfrm>
+      </p:grpSpPr>
+      <p:sp>
+        <p:nvSpPr>
+          <p:cNvPr id="2" name="Slide Image Placeholder 1"/>
+          <p:cNvSpPr>
+            <a:spLocks noGrp="1" noRot="1" noChangeAspect="1"/>
+          </p:cNvSpPr>
+          <p:nvPr>
+            <p:ph type="sldImg"/>
+          </p:nvPr>
+        </p:nvSpPr>
+        <p:spPr/>
+      </p:sp>
+      <p:sp>
+        <p:nvSpPr>
+          <p:cNvPr id="3" name="Notes Placeholder 2"/>
+          <p:cNvSpPr>
+            <a:spLocks noGrp="1"/>
+          </p:cNvSpPr>
+          <p:nvPr>
+            <p:ph type="body" idx="1"/>
+          </p:nvPr>
+        </p:nvSpPr>
+        <p:spPr/>
+        <p:txBody>
+          <a:bodyPr/>
+          <a:lstStyle/>
+          <a:p>
+            <a:endParaRPr lang="en-GB" dirty="0"/>
+          </a:p>
+        </p:txBody>
+      </p:sp>
+      <p:sp>
+        <p:nvSpPr>
+          <p:cNvPr id="4" name="Slide Number Placeholder 3"/>
+          <p:cNvSpPr>
+            <a:spLocks noGrp="1"/>
+          </p:cNvSpPr>
+          <p:nvPr>
+            <p:ph type="sldNum" sz="quarter" idx="5"/>
+          </p:nvPr>
+        </p:nvSpPr>
+        <p:spPr/>
+        <p:txBody>
+          <a:bodyPr/>
+          <a:lstStyle/>
+          <a:p>
+            <a:fld id="{EC8F3035-11B3-46F6-8FD1-FF84F47AA3E8}" type="slidenum">
+              <a:rPr lang="en-GB" smtClean="0"/>
+              <a:t>10</a:t>
+            </a:fld>
+            <a:endParaRPr lang="en-GB" dirty="0"/>
+          </a:p>
+        </p:txBody>
+      </p:sp>
+    </p:spTree>
+    <p:extLst>
+      <p:ext uri="{BB962C8B-B14F-4D97-AF65-F5344CB8AC3E}">
+        <p14:creationId xmlns:p14="http://schemas.microsoft.com/office/powerpoint/2010/main" val="4153060987"/>
+      </p:ext>
+    </p:extLst>
+  </p:cSld>
+  <p:clrMapOvr>
+    <a:masterClrMapping/>
+  </p:clrMapOvr>
+</p:notes>
+</file>
+
 <file path=ppt/slideLayouts/slideLayout1.xml><?xml version="1.0" encoding="utf-8"?>
 <p:sldLayout xmlns:a="http://schemas.openxmlformats.org/drawingml/2006/main" xmlns:r="http://schemas.openxmlformats.org/officeDocument/2006/relationships" xmlns:p="http://schemas.openxmlformats.org/presentationml/2006/main" type="title" preserve="1">
   <p:cSld name="Title Slide">
@@ -936,7 +1361,7 @@
           <a:p>
             <a:fld id="{BB19518F-CAD7-4222-B826-8CD348F393C6}" type="datetimeFigureOut">
               <a:rPr lang="en-GB" smtClean="0"/>
-              <a:t>19/08/2024</a:t>
+              <a:t>20/08/2024</a:t>
             </a:fld>
             <a:endParaRPr lang="en-GB" dirty="0"/>
           </a:p>
@@ -1106,7 +1531,7 @@
           <a:p>
             <a:fld id="{BB19518F-CAD7-4222-B826-8CD348F393C6}" type="datetimeFigureOut">
               <a:rPr lang="en-GB" smtClean="0"/>
-              <a:t>19/08/2024</a:t>
+              <a:t>20/08/2024</a:t>
             </a:fld>
             <a:endParaRPr lang="en-GB" dirty="0"/>
           </a:p>
@@ -1286,7 +1711,7 @@
           <a:p>
             <a:fld id="{BB19518F-CAD7-4222-B826-8CD348F393C6}" type="datetimeFigureOut">
               <a:rPr lang="en-GB" smtClean="0"/>
-              <a:t>19/08/2024</a:t>
+              <a:t>20/08/2024</a:t>
             </a:fld>
             <a:endParaRPr lang="en-GB" dirty="0"/>
           </a:p>
@@ -1456,7 +1881,7 @@
           <a:p>
             <a:fld id="{BB19518F-CAD7-4222-B826-8CD348F393C6}" type="datetimeFigureOut">
               <a:rPr lang="en-GB" smtClean="0"/>
-              <a:t>19/08/2024</a:t>
+              <a:t>20/08/2024</a:t>
             </a:fld>
             <a:endParaRPr lang="en-GB" dirty="0"/>
           </a:p>
@@ -1702,7 +2127,7 @@
           <a:p>
             <a:fld id="{BB19518F-CAD7-4222-B826-8CD348F393C6}" type="datetimeFigureOut">
               <a:rPr lang="en-GB" smtClean="0"/>
-              <a:t>19/08/2024</a:t>
+              <a:t>20/08/2024</a:t>
             </a:fld>
             <a:endParaRPr lang="en-GB" dirty="0"/>
           </a:p>
@@ -1934,7 +2359,7 @@
           <a:p>
             <a:fld id="{BB19518F-CAD7-4222-B826-8CD348F393C6}" type="datetimeFigureOut">
               <a:rPr lang="en-GB" smtClean="0"/>
-              <a:t>19/08/2024</a:t>
+              <a:t>20/08/2024</a:t>
             </a:fld>
             <a:endParaRPr lang="en-GB" dirty="0"/>
           </a:p>
@@ -2301,7 +2726,7 @@
           <a:p>
             <a:fld id="{BB19518F-CAD7-4222-B826-8CD348F393C6}" type="datetimeFigureOut">
               <a:rPr lang="en-GB" smtClean="0"/>
-              <a:t>19/08/2024</a:t>
+              <a:t>20/08/2024</a:t>
             </a:fld>
             <a:endParaRPr lang="en-GB" dirty="0"/>
           </a:p>
@@ -2419,7 +2844,7 @@
           <a:p>
             <a:fld id="{BB19518F-CAD7-4222-B826-8CD348F393C6}" type="datetimeFigureOut">
               <a:rPr lang="en-GB" smtClean="0"/>
-              <a:t>19/08/2024</a:t>
+              <a:t>20/08/2024</a:t>
             </a:fld>
             <a:endParaRPr lang="en-GB" dirty="0"/>
           </a:p>
@@ -2514,7 +2939,7 @@
           <a:p>
             <a:fld id="{BB19518F-CAD7-4222-B826-8CD348F393C6}" type="datetimeFigureOut">
               <a:rPr lang="en-GB" smtClean="0"/>
-              <a:t>19/08/2024</a:t>
+              <a:t>20/08/2024</a:t>
             </a:fld>
             <a:endParaRPr lang="en-GB" dirty="0"/>
           </a:p>
@@ -2791,7 +3216,7 @@
           <a:p>
             <a:fld id="{BB19518F-CAD7-4222-B826-8CD348F393C6}" type="datetimeFigureOut">
               <a:rPr lang="en-GB" smtClean="0"/>
-              <a:t>19/08/2024</a:t>
+              <a:t>20/08/2024</a:t>
             </a:fld>
             <a:endParaRPr lang="en-GB" dirty="0"/>
           </a:p>
@@ -3047,7 +3472,7 @@
           <a:p>
             <a:fld id="{BB19518F-CAD7-4222-B826-8CD348F393C6}" type="datetimeFigureOut">
               <a:rPr lang="en-GB" smtClean="0"/>
-              <a:t>19/08/2024</a:t>
+              <a:t>20/08/2024</a:t>
             </a:fld>
             <a:endParaRPr lang="en-GB" dirty="0"/>
           </a:p>
@@ -3260,7 +3685,7 @@
           <a:p>
             <a:fld id="{BB19518F-CAD7-4222-B826-8CD348F393C6}" type="datetimeFigureOut">
               <a:rPr lang="en-GB" smtClean="0"/>
-              <a:t>19/08/2024</a:t>
+              <a:t>20/08/2024</a:t>
             </a:fld>
             <a:endParaRPr lang="en-GB" dirty="0"/>
           </a:p>
@@ -4579,6 +5004,490 @@
 </p:sld>
 </file>
 
+<file path=ppt/slides/slide10.xml><?xml version="1.0" encoding="utf-8"?>
+<p:sld xmlns:a="http://schemas.openxmlformats.org/drawingml/2006/main" xmlns:r="http://schemas.openxmlformats.org/officeDocument/2006/relationships" xmlns:p="http://schemas.openxmlformats.org/presentationml/2006/main">
+  <p:cSld>
+    <p:spTree>
+      <p:nvGrpSpPr>
+        <p:cNvPr id="1" name=""/>
+        <p:cNvGrpSpPr/>
+        <p:nvPr/>
+      </p:nvGrpSpPr>
+      <p:grpSpPr>
+        <a:xfrm>
+          <a:off x="0" y="0"/>
+          <a:ext cx="0" cy="0"/>
+          <a:chOff x="0" y="0"/>
+          <a:chExt cx="0" cy="0"/>
+        </a:xfrm>
+      </p:grpSpPr>
+      <p:pic>
+        <p:nvPicPr>
+          <p:cNvPr id="17" name="Picture 16" descr="A aerial view of a football field&#10;&#10;Description automatically generated">
+            <a:extLst>
+              <a:ext uri="{FF2B5EF4-FFF2-40B4-BE49-F238E27FC236}">
+                <a16:creationId xmlns:a16="http://schemas.microsoft.com/office/drawing/2014/main" id="{E765C726-91B9-C2F7-7776-BD13DEC6FB65}"/>
+              </a:ext>
+            </a:extLst>
+          </p:cNvPr>
+          <p:cNvPicPr>
+            <a:picLocks noChangeAspect="1"/>
+          </p:cNvPicPr>
+          <p:nvPr/>
+        </p:nvPicPr>
+        <p:blipFill rotWithShape="1">
+          <a:blip r:embed="rId3">
+            <a:extLst>
+              <a:ext uri="{28A0092B-C50C-407E-A947-70E740481C1C}">
+                <a14:useLocalDpi xmlns:a14="http://schemas.microsoft.com/office/drawing/2010/main" val="0"/>
+              </a:ext>
+            </a:extLst>
+          </a:blip>
+          <a:srcRect l="-30" t="34181" r="30" b="34181"/>
+          <a:stretch/>
+        </p:blipFill>
+        <p:spPr>
+          <a:xfrm>
+            <a:off x="0" y="0"/>
+            <a:ext cx="9156100" cy="5143500"/>
+          </a:xfrm>
+          <a:prstGeom prst="rect">
+            <a:avLst/>
+          </a:prstGeom>
+        </p:spPr>
+      </p:pic>
+      <p:sp>
+        <p:nvSpPr>
+          <p:cNvPr id="12" name="Rectangle 11">
+            <a:extLst>
+              <a:ext uri="{FF2B5EF4-FFF2-40B4-BE49-F238E27FC236}">
+                <a16:creationId xmlns:a16="http://schemas.microsoft.com/office/drawing/2014/main" id="{BAD760F3-3A96-2311-362E-D76774272972}"/>
+              </a:ext>
+            </a:extLst>
+          </p:cNvPr>
+          <p:cNvSpPr>
+            <a:spLocks noGrp="1" noRot="1" noMove="1" noResize="1" noEditPoints="1" noAdjustHandles="1" noChangeArrowheads="1" noChangeShapeType="1"/>
+          </p:cNvSpPr>
+          <p:nvPr/>
+        </p:nvSpPr>
+        <p:spPr>
+          <a:xfrm>
+            <a:off x="0" y="-24601"/>
+            <a:ext cx="9156101" cy="5167487"/>
+          </a:xfrm>
+          <a:prstGeom prst="rect">
+            <a:avLst/>
+          </a:prstGeom>
+          <a:gradFill flip="none" rotWithShape="1">
+            <a:gsLst>
+              <a:gs pos="0">
+                <a:srgbClr val="171D41">
+                  <a:alpha val="80000"/>
+                </a:srgbClr>
+              </a:gs>
+              <a:gs pos="100000">
+                <a:srgbClr val="171D41">
+                  <a:alpha val="80000"/>
+                </a:srgbClr>
+              </a:gs>
+            </a:gsLst>
+            <a:lin ang="16200000" scaled="1"/>
+            <a:tileRect/>
+          </a:gradFill>
+          <a:ln>
+            <a:noFill/>
+          </a:ln>
+        </p:spPr>
+        <p:style>
+          <a:lnRef idx="2">
+            <a:schemeClr val="accent1">
+              <a:shade val="15000"/>
+            </a:schemeClr>
+          </a:lnRef>
+          <a:fillRef idx="1">
+            <a:schemeClr val="accent1"/>
+          </a:fillRef>
+          <a:effectRef idx="0">
+            <a:schemeClr val="accent1"/>
+          </a:effectRef>
+          <a:fontRef idx="minor">
+            <a:schemeClr val="lt1"/>
+          </a:fontRef>
+        </p:style>
+        <p:txBody>
+          <a:bodyPr rtlCol="0" anchor="ctr"/>
+          <a:lstStyle/>
+          <a:p>
+            <a:pPr algn="ctr"/>
+            <a:endParaRPr lang="en-GB" dirty="0"/>
+          </a:p>
+        </p:txBody>
+      </p:sp>
+      <p:sp>
+        <p:nvSpPr>
+          <p:cNvPr id="11" name="Rectangle: Rounded Corners 10">
+            <a:extLst>
+              <a:ext uri="{FF2B5EF4-FFF2-40B4-BE49-F238E27FC236}">
+                <a16:creationId xmlns:a16="http://schemas.microsoft.com/office/drawing/2014/main" id="{B0354E3A-B5B8-B2CD-9561-457CC7AF49DA}"/>
+              </a:ext>
+            </a:extLst>
+          </p:cNvPr>
+          <p:cNvSpPr/>
+          <p:nvPr/>
+        </p:nvSpPr>
+        <p:spPr>
+          <a:xfrm>
+            <a:off x="4076993" y="141723"/>
+            <a:ext cx="990012" cy="400110"/>
+          </a:xfrm>
+          <a:prstGeom prst="roundRect">
+            <a:avLst/>
+          </a:prstGeom>
+          <a:noFill/>
+          <a:ln w="9525">
+            <a:solidFill>
+              <a:srgbClr val="E3E9ED"/>
+            </a:solidFill>
+          </a:ln>
+        </p:spPr>
+        <p:style>
+          <a:lnRef idx="2">
+            <a:schemeClr val="accent1">
+              <a:shade val="15000"/>
+            </a:schemeClr>
+          </a:lnRef>
+          <a:fillRef idx="1">
+            <a:schemeClr val="accent1"/>
+          </a:fillRef>
+          <a:effectRef idx="0">
+            <a:schemeClr val="accent1"/>
+          </a:effectRef>
+          <a:fontRef idx="minor">
+            <a:schemeClr val="lt1"/>
+          </a:fontRef>
+        </p:style>
+        <p:txBody>
+          <a:bodyPr rtlCol="0" anchor="ctr"/>
+          <a:lstStyle/>
+          <a:p>
+            <a:pPr algn="ctr"/>
+            <a:r>
+              <a:rPr lang="en-GB" sz="1600" dirty="0">
+                <a:latin typeface="Aptos Mono" panose="020B0009020202020204" pitchFamily="49" charset="0"/>
+              </a:rPr>
+              <a:t>home</a:t>
+            </a:r>
+          </a:p>
+        </p:txBody>
+      </p:sp>
+      <p:sp>
+        <p:nvSpPr>
+          <p:cNvPr id="49" name="Rectangle 48">
+            <a:extLst>
+              <a:ext uri="{FF2B5EF4-FFF2-40B4-BE49-F238E27FC236}">
+                <a16:creationId xmlns:a16="http://schemas.microsoft.com/office/drawing/2014/main" id="{B32ADD89-4C72-3752-4392-1D2734DAF995}"/>
+              </a:ext>
+            </a:extLst>
+          </p:cNvPr>
+          <p:cNvSpPr/>
+          <p:nvPr/>
+        </p:nvSpPr>
+        <p:spPr>
+          <a:xfrm>
+            <a:off x="8982049" y="51722"/>
+            <a:ext cx="90001" cy="1440016"/>
+          </a:xfrm>
+          <a:prstGeom prst="rect">
+            <a:avLst/>
+          </a:prstGeom>
+          <a:solidFill>
+            <a:srgbClr val="E3E9ED"/>
+          </a:solidFill>
+        </p:spPr>
+        <p:style>
+          <a:lnRef idx="2">
+            <a:schemeClr val="accent1">
+              <a:shade val="15000"/>
+            </a:schemeClr>
+          </a:lnRef>
+          <a:fillRef idx="1">
+            <a:schemeClr val="accent1"/>
+          </a:fillRef>
+          <a:effectRef idx="0">
+            <a:schemeClr val="accent1"/>
+          </a:effectRef>
+          <a:fontRef idx="minor">
+            <a:schemeClr val="lt1"/>
+          </a:fontRef>
+        </p:style>
+        <p:txBody>
+          <a:bodyPr rtlCol="0" anchor="ctr"/>
+          <a:lstStyle/>
+          <a:p>
+            <a:pPr algn="ctr"/>
+            <a:endParaRPr lang="en-GB" dirty="0"/>
+          </a:p>
+        </p:txBody>
+      </p:sp>
+      <p:sp>
+        <p:nvSpPr>
+          <p:cNvPr id="2" name="TextBox 1">
+            <a:extLst>
+              <a:ext uri="{FF2B5EF4-FFF2-40B4-BE49-F238E27FC236}">
+                <a16:creationId xmlns:a16="http://schemas.microsoft.com/office/drawing/2014/main" id="{78E9BE3F-A99C-B7D1-3797-857235E8A3FD}"/>
+              </a:ext>
+            </a:extLst>
+          </p:cNvPr>
+          <p:cNvSpPr txBox="1"/>
+          <p:nvPr/>
+        </p:nvSpPr>
+        <p:spPr>
+          <a:xfrm>
+            <a:off x="72232" y="-629879"/>
+            <a:ext cx="1130507" cy="189924"/>
+          </a:xfrm>
+          <a:prstGeom prst="rect">
+            <a:avLst/>
+          </a:prstGeom>
+          <a:noFill/>
+          <a:ln w="38100">
+            <a:solidFill>
+              <a:srgbClr val="FFC000"/>
+            </a:solidFill>
+          </a:ln>
+        </p:spPr>
+        <p:txBody>
+          <a:bodyPr wrap="square" rtlCol="0">
+            <a:spAutoFit/>
+          </a:bodyPr>
+          <a:lstStyle/>
+          <a:p>
+            <a:r>
+              <a:rPr lang="en-GB" sz="634" dirty="0">
+                <a:solidFill>
+                  <a:schemeClr val="bg1"/>
+                </a:solidFill>
+              </a:rPr>
+              <a:t>academic Projects</a:t>
+            </a:r>
+          </a:p>
+        </p:txBody>
+      </p:sp>
+      <p:sp>
+        <p:nvSpPr>
+          <p:cNvPr id="19" name="Rectangle: Rounded Corners 18">
+            <a:extLst>
+              <a:ext uri="{FF2B5EF4-FFF2-40B4-BE49-F238E27FC236}">
+                <a16:creationId xmlns:a16="http://schemas.microsoft.com/office/drawing/2014/main" id="{0F65DFDC-4455-562C-29E8-0939FF0FDF32}"/>
+              </a:ext>
+            </a:extLst>
+          </p:cNvPr>
+          <p:cNvSpPr/>
+          <p:nvPr/>
+        </p:nvSpPr>
+        <p:spPr>
+          <a:xfrm>
+            <a:off x="1691966" y="681729"/>
+            <a:ext cx="5760063" cy="2159517"/>
+          </a:xfrm>
+          <a:prstGeom prst="roundRect">
+            <a:avLst>
+              <a:gd name="adj" fmla="val 7003"/>
+            </a:avLst>
+          </a:prstGeom>
+          <a:noFill/>
+          <a:ln w="9525">
+            <a:solidFill>
+              <a:srgbClr val="E3E9ED"/>
+            </a:solidFill>
+          </a:ln>
+        </p:spPr>
+        <p:style>
+          <a:lnRef idx="2">
+            <a:schemeClr val="accent1">
+              <a:shade val="15000"/>
+            </a:schemeClr>
+          </a:lnRef>
+          <a:fillRef idx="1">
+            <a:schemeClr val="accent1"/>
+          </a:fillRef>
+          <a:effectRef idx="0">
+            <a:schemeClr val="accent1"/>
+          </a:effectRef>
+          <a:fontRef idx="minor">
+            <a:schemeClr val="lt1"/>
+          </a:fontRef>
+        </p:style>
+        <p:txBody>
+          <a:bodyPr rtlCol="0" anchor="t"/>
+          <a:lstStyle/>
+          <a:p>
+            <a:pPr algn="r"/>
+            <a:r>
+              <a:rPr lang="en-GB" sz="1600" dirty="0">
+                <a:solidFill>
+                  <a:srgbClr val="E3E9ED"/>
+                </a:solidFill>
+                <a:latin typeface="Aptos Mono" panose="020B0009020202020204" pitchFamily="49" charset="0"/>
+              </a:rPr>
+              <a:t>asteroids</a:t>
+            </a:r>
+          </a:p>
+          <a:p>
+            <a:pPr algn="r"/>
+            <a:endParaRPr lang="en-GB" sz="1000" dirty="0">
+              <a:solidFill>
+                <a:srgbClr val="E3E9ED"/>
+              </a:solidFill>
+              <a:latin typeface="Aptos Mono" panose="020B0009020202020204" pitchFamily="49" charset="0"/>
+            </a:endParaRPr>
+          </a:p>
+          <a:p>
+            <a:pPr algn="r"/>
+            <a:r>
+              <a:rPr lang="en-GB" sz="1000" dirty="0">
+                <a:solidFill>
+                  <a:srgbClr val="E3E9ED"/>
+                </a:solidFill>
+                <a:latin typeface="Aptos Mono" panose="020B0009020202020204" pitchFamily="49" charset="0"/>
+              </a:rPr>
+              <a:t>games technology</a:t>
+            </a:r>
+          </a:p>
+        </p:txBody>
+      </p:sp>
+      <p:sp>
+        <p:nvSpPr>
+          <p:cNvPr id="20" name="Rectangle: Rounded Corners 19">
+            <a:extLst>
+              <a:ext uri="{FF2B5EF4-FFF2-40B4-BE49-F238E27FC236}">
+                <a16:creationId xmlns:a16="http://schemas.microsoft.com/office/drawing/2014/main" id="{9BC47CE2-76C1-7597-DAD7-EBD79A0E34FA}"/>
+              </a:ext>
+            </a:extLst>
+          </p:cNvPr>
+          <p:cNvSpPr/>
+          <p:nvPr/>
+        </p:nvSpPr>
+        <p:spPr>
+          <a:xfrm>
+            <a:off x="1691966" y="2897574"/>
+            <a:ext cx="5760063" cy="2159517"/>
+          </a:xfrm>
+          <a:prstGeom prst="roundRect">
+            <a:avLst>
+              <a:gd name="adj" fmla="val 7003"/>
+            </a:avLst>
+          </a:prstGeom>
+          <a:noFill/>
+          <a:ln w="9525">
+            <a:solidFill>
+              <a:srgbClr val="E3E9ED"/>
+            </a:solidFill>
+          </a:ln>
+        </p:spPr>
+        <p:style>
+          <a:lnRef idx="2">
+            <a:schemeClr val="accent1">
+              <a:shade val="15000"/>
+            </a:schemeClr>
+          </a:lnRef>
+          <a:fillRef idx="1">
+            <a:schemeClr val="accent1"/>
+          </a:fillRef>
+          <a:effectRef idx="0">
+            <a:schemeClr val="accent1"/>
+          </a:effectRef>
+          <a:fontRef idx="minor">
+            <a:schemeClr val="lt1"/>
+          </a:fontRef>
+        </p:style>
+        <p:txBody>
+          <a:bodyPr rtlCol="0" anchor="t"/>
+          <a:lstStyle/>
+          <a:p>
+            <a:pPr algn="r"/>
+            <a:r>
+              <a:rPr lang="en-GB" sz="1600" dirty="0">
+                <a:solidFill>
+                  <a:srgbClr val="E3E9ED"/>
+                </a:solidFill>
+                <a:latin typeface="Aptos Mono" panose="020B0009020202020204" pitchFamily="49" charset="0"/>
+              </a:rPr>
+              <a:t>premier league players` </a:t>
+            </a:r>
+            <a:r>
+              <a:rPr lang="en-GB" sz="1600" dirty="0" err="1">
+                <a:solidFill>
+                  <a:srgbClr val="E3E9ED"/>
+                </a:solidFill>
+                <a:latin typeface="Aptos Mono" panose="020B0009020202020204" pitchFamily="49" charset="0"/>
+              </a:rPr>
+              <a:t>xG</a:t>
+            </a:r>
+            <a:r>
+              <a:rPr lang="en-GB" sz="1600" dirty="0">
+                <a:solidFill>
+                  <a:srgbClr val="E3E9ED"/>
+                </a:solidFill>
+                <a:latin typeface="Aptos Mono" panose="020B0009020202020204" pitchFamily="49" charset="0"/>
+              </a:rPr>
+              <a:t>/</a:t>
+            </a:r>
+            <a:r>
+              <a:rPr lang="en-GB" sz="1600" dirty="0" err="1">
+                <a:solidFill>
+                  <a:srgbClr val="E3E9ED"/>
+                </a:solidFill>
+                <a:latin typeface="Aptos Mono" panose="020B0009020202020204" pitchFamily="49" charset="0"/>
+              </a:rPr>
+              <a:t>xA</a:t>
+            </a:r>
+            <a:r>
+              <a:rPr lang="en-GB" sz="1600" dirty="0">
+                <a:solidFill>
+                  <a:srgbClr val="E3E9ED"/>
+                </a:solidFill>
+                <a:latin typeface="Aptos Mono" panose="020B0009020202020204" pitchFamily="49" charset="0"/>
+              </a:rPr>
+              <a:t> vs G/A</a:t>
+            </a:r>
+          </a:p>
+          <a:p>
+            <a:pPr algn="r"/>
+            <a:endParaRPr lang="en-GB" sz="1000" dirty="0">
+              <a:solidFill>
+                <a:srgbClr val="E3E9ED"/>
+              </a:solidFill>
+              <a:latin typeface="Aptos Mono" panose="020B0009020202020204" pitchFamily="49" charset="0"/>
+            </a:endParaRPr>
+          </a:p>
+          <a:p>
+            <a:pPr algn="r"/>
+            <a:r>
+              <a:rPr lang="en-GB" sz="1000" dirty="0">
+                <a:solidFill>
+                  <a:srgbClr val="E3E9ED"/>
+                </a:solidFill>
+                <a:latin typeface="Aptos Mono" panose="020B0009020202020204" pitchFamily="49" charset="0"/>
+              </a:rPr>
+              <a:t>data visualisation</a:t>
+            </a:r>
+          </a:p>
+        </p:txBody>
+      </p:sp>
+    </p:spTree>
+    <p:extLst>
+      <p:ext uri="{BB962C8B-B14F-4D97-AF65-F5344CB8AC3E}">
+        <p14:creationId xmlns:p14="http://schemas.microsoft.com/office/powerpoint/2010/main" val="2169171275"/>
+      </p:ext>
+    </p:extLst>
+  </p:cSld>
+  <p:clrMapOvr>
+    <a:masterClrMapping/>
+  </p:clrMapOvr>
+</p:sld>
+</file>
+
 <file path=ppt/slides/slide2.xml><?xml version="1.0" encoding="utf-8"?>
 <p:sld xmlns:a="http://schemas.openxmlformats.org/drawingml/2006/main" xmlns:r="http://schemas.openxmlformats.org/officeDocument/2006/relationships" xmlns:p="http://schemas.openxmlformats.org/presentationml/2006/main">
   <p:cSld>
@@ -5374,51 +6283,6 @@
           </a:p>
         </p:txBody>
       </p:sp>
-      <p:cxnSp>
-        <p:nvCxnSpPr>
-          <p:cNvPr id="32" name="Connector: Elbow 31">
-            <a:extLst>
-              <a:ext uri="{FF2B5EF4-FFF2-40B4-BE49-F238E27FC236}">
-                <a16:creationId xmlns:a16="http://schemas.microsoft.com/office/drawing/2014/main" id="{622095E4-3309-F558-012E-FFA6FB4C6289}"/>
-              </a:ext>
-            </a:extLst>
-          </p:cNvPr>
-          <p:cNvCxnSpPr>
-            <a:cxnSpLocks/>
-            <a:endCxn id="33" idx="0"/>
-          </p:cNvCxnSpPr>
-          <p:nvPr/>
-        </p:nvCxnSpPr>
-        <p:spPr>
-          <a:xfrm>
-            <a:off x="4933111" y="2911369"/>
-            <a:ext cx="628900" cy="2298145"/>
-          </a:xfrm>
-          <a:prstGeom prst="bentConnector2">
-            <a:avLst/>
-          </a:prstGeom>
-          <a:ln w="25400">
-            <a:solidFill>
-              <a:srgbClr val="FFC000"/>
-            </a:solidFill>
-            <a:tailEnd type="triangle"/>
-          </a:ln>
-        </p:spPr>
-        <p:style>
-          <a:lnRef idx="2">
-            <a:schemeClr val="accent1"/>
-          </a:lnRef>
-          <a:fillRef idx="0">
-            <a:schemeClr val="accent1"/>
-          </a:fillRef>
-          <a:effectRef idx="1">
-            <a:schemeClr val="accent1"/>
-          </a:effectRef>
-          <a:fontRef idx="minor">
-            <a:schemeClr val="tx1"/>
-          </a:fontRef>
-        </p:style>
-      </p:cxnSp>
       <p:sp>
         <p:nvSpPr>
           <p:cNvPr id="33" name="TextBox 32">
@@ -6623,22 +7487,13 @@
           <a:lstStyle/>
           <a:p>
             <a:r>
-              <a:rPr lang="en-GB" sz="1600" dirty="0" err="1">
-                <a:solidFill>
-                  <a:srgbClr val="E3E9ED"/>
-                </a:solidFill>
-                <a:latin typeface="Aptos Mono" panose="020F0502020204030204" pitchFamily="49" charset="0"/>
-              </a:rPr>
-              <a:t>i</a:t>
-            </a:r>
-            <a:r>
               <a:rPr lang="en-GB" sz="1600" dirty="0">
                 <a:solidFill>
                   <a:srgbClr val="E3E9ED"/>
                 </a:solidFill>
                 <a:latin typeface="Aptos Mono" panose="020F0502020204030204" pitchFamily="49" charset="0"/>
               </a:rPr>
-              <a:t> have been programming for roughly 10 years</a:t>
+              <a:t>i have been programming for roughly 10 years</a:t>
             </a:r>
           </a:p>
           <a:p>
@@ -6707,7 +7562,7 @@
           <a:lstStyle/>
           <a:p>
             <a:pPr algn="ctr"/>
-            <a:endParaRPr lang="en-GB"/>
+            <a:endParaRPr lang="en-GB" dirty="0"/>
           </a:p>
         </p:txBody>
       </p:sp>
@@ -7079,7 +7934,7 @@
           <a:lstStyle/>
           <a:p>
             <a:pPr algn="ctr"/>
-            <a:endParaRPr lang="en-GB"/>
+            <a:endParaRPr lang="en-GB" dirty="0"/>
           </a:p>
         </p:txBody>
       </p:sp>
@@ -7266,7 +8121,7 @@
         </p:nvSpPr>
         <p:spPr>
           <a:xfrm>
-            <a:off x="3131984" y="2548137"/>
+            <a:off x="3131984" y="2571750"/>
             <a:ext cx="1440016" cy="720008"/>
           </a:xfrm>
           <a:prstGeom prst="roundRect">
@@ -7767,7 +8622,7 @@
           <a:lstStyle/>
           <a:p>
             <a:pPr algn="ctr"/>
-            <a:endParaRPr lang="en-GB"/>
+            <a:endParaRPr lang="en-GB" dirty="0"/>
           </a:p>
         </p:txBody>
       </p:sp>
@@ -7831,8 +8686,8 @@
         </p:nvCxnSpPr>
         <p:spPr>
           <a:xfrm flipV="1">
-            <a:off x="4301996" y="3497176"/>
-            <a:ext cx="1" cy="1324599"/>
+            <a:off x="4298224" y="3497176"/>
+            <a:ext cx="3773" cy="1234598"/>
           </a:xfrm>
           <a:prstGeom prst="line">
             <a:avLst/>
@@ -7875,7 +8730,7 @@
         <p:spPr>
           <a:xfrm flipV="1">
             <a:off x="4842003" y="3497176"/>
-            <a:ext cx="0" cy="1324599"/>
+            <a:ext cx="0" cy="1234598"/>
           </a:xfrm>
           <a:prstGeom prst="line">
             <a:avLst/>
@@ -7912,13 +8767,14 @@
           </p:cNvPr>
           <p:cNvCxnSpPr>
             <a:cxnSpLocks/>
+            <a:stCxn id="141" idx="0"/>
           </p:cNvCxnSpPr>
           <p:nvPr/>
         </p:nvCxnSpPr>
         <p:spPr>
-          <a:xfrm flipV="1">
-            <a:off x="4571998" y="2798487"/>
-            <a:ext cx="0" cy="2023288"/>
+          <a:xfrm flipH="1" flipV="1">
+            <a:off x="4571998" y="2797153"/>
+            <a:ext cx="7196" cy="1936368"/>
           </a:xfrm>
           <a:prstGeom prst="line">
             <a:avLst/>
@@ -8073,56 +8929,12 @@
           </a:fontRef>
         </p:style>
       </p:cxnSp>
-      <p:cxnSp>
-        <p:nvCxnSpPr>
-          <p:cNvPr id="27" name="Straight Connector 26">
-            <a:extLst>
-              <a:ext uri="{FF2B5EF4-FFF2-40B4-BE49-F238E27FC236}">
-                <a16:creationId xmlns:a16="http://schemas.microsoft.com/office/drawing/2014/main" id="{99BE48CD-2F2A-F6BB-65F0-E2C813F54D16}"/>
-              </a:ext>
-            </a:extLst>
-          </p:cNvPr>
-          <p:cNvCxnSpPr>
-            <a:cxnSpLocks/>
-            <a:stCxn id="31" idx="1"/>
-          </p:cNvCxnSpPr>
-          <p:nvPr/>
-        </p:nvCxnSpPr>
-        <p:spPr>
-          <a:xfrm flipH="1">
-            <a:off x="5489191" y="2289227"/>
-            <a:ext cx="903145" cy="127323"/>
-          </a:xfrm>
-          <a:prstGeom prst="line">
-            <a:avLst/>
-          </a:prstGeom>
-          <a:ln>
-            <a:solidFill>
-              <a:srgbClr val="E3E9ED"/>
-            </a:solidFill>
-          </a:ln>
-        </p:spPr>
-        <p:style>
-          <a:lnRef idx="2">
-            <a:schemeClr val="accent1"/>
-          </a:lnRef>
-          <a:fillRef idx="0">
-            <a:schemeClr val="accent1"/>
-          </a:fillRef>
-          <a:effectRef idx="1">
-            <a:schemeClr val="accent1"/>
-          </a:effectRef>
-          <a:fontRef idx="minor">
-            <a:schemeClr val="tx1"/>
-          </a:fontRef>
-        </p:style>
-      </p:cxnSp>
-      <p:sp>
-        <p:nvSpPr>
-          <p:cNvPr id="30" name="TextBox 29">
-            <a:extLst>
-              <a:ext uri="{FF2B5EF4-FFF2-40B4-BE49-F238E27FC236}">
-                <a16:creationId xmlns:a16="http://schemas.microsoft.com/office/drawing/2014/main" id="{D216E322-DB84-7E23-1E0B-7735BB92CE52}"/>
+      <p:sp>
+        <p:nvSpPr>
+          <p:cNvPr id="31" name="TextBox 30">
+            <a:extLst>
+              <a:ext uri="{FF2B5EF4-FFF2-40B4-BE49-F238E27FC236}">
+                <a16:creationId xmlns:a16="http://schemas.microsoft.com/office/drawing/2014/main" id="{355AE709-CA38-FE35-A75E-30421FE14158}"/>
               </a:ext>
             </a:extLst>
           </p:cNvPr>
@@ -8131,106 +8943,7 @@
         </p:nvSpPr>
         <p:spPr>
           <a:xfrm>
-            <a:off x="1468553" y="2747861"/>
-            <a:ext cx="2334074" cy="2031325"/>
-          </a:xfrm>
-          <a:prstGeom prst="rect">
-            <a:avLst/>
-          </a:prstGeom>
-          <a:noFill/>
-        </p:spPr>
-        <p:txBody>
-          <a:bodyPr wrap="square" rtlCol="0">
-            <a:spAutoFit/>
-          </a:bodyPr>
-          <a:lstStyle/>
-          <a:p>
-            <a:r>
-              <a:rPr lang="en-GB" dirty="0">
-                <a:solidFill>
-                  <a:srgbClr val="E3E9ED"/>
-                </a:solidFill>
-              </a:rPr>
-              <a:t>Web dev</a:t>
-            </a:r>
-          </a:p>
-          <a:p>
-            <a:r>
-              <a:rPr lang="en-GB" dirty="0">
-                <a:solidFill>
-                  <a:srgbClr val="E3E9ED"/>
-                </a:solidFill>
-              </a:rPr>
-              <a:t>Dsa</a:t>
-            </a:r>
-          </a:p>
-          <a:p>
-            <a:r>
-              <a:rPr lang="en-GB" dirty="0">
-                <a:solidFill>
-                  <a:srgbClr val="E3E9ED"/>
-                </a:solidFill>
-              </a:rPr>
-              <a:t>Databases</a:t>
-            </a:r>
-          </a:p>
-          <a:p>
-            <a:r>
-              <a:rPr lang="en-GB" dirty="0">
-                <a:solidFill>
-                  <a:srgbClr val="E3E9ED"/>
-                </a:solidFill>
-              </a:rPr>
-              <a:t>Functional</a:t>
-            </a:r>
-          </a:p>
-          <a:p>
-            <a:r>
-              <a:rPr lang="en-GB" dirty="0">
-                <a:solidFill>
-                  <a:srgbClr val="E3E9ED"/>
-                </a:solidFill>
-              </a:rPr>
-              <a:t>AI</a:t>
-            </a:r>
-          </a:p>
-          <a:p>
-            <a:r>
-              <a:rPr lang="en-GB" dirty="0">
-                <a:solidFill>
-                  <a:srgbClr val="E3E9ED"/>
-                </a:solidFill>
-              </a:rPr>
-              <a:t>Data Vis</a:t>
-            </a:r>
-          </a:p>
-          <a:p>
-            <a:r>
-              <a:rPr lang="en-GB" dirty="0">
-                <a:solidFill>
-                  <a:srgbClr val="E3E9ED"/>
-                </a:solidFill>
-              </a:rPr>
-              <a:t>General proficiency</a:t>
-            </a:r>
-          </a:p>
-        </p:txBody>
-      </p:sp>
-      <p:sp>
-        <p:nvSpPr>
-          <p:cNvPr id="31" name="TextBox 30">
-            <a:extLst>
-              <a:ext uri="{FF2B5EF4-FFF2-40B4-BE49-F238E27FC236}">
-                <a16:creationId xmlns:a16="http://schemas.microsoft.com/office/drawing/2014/main" id="{355AE709-CA38-FE35-A75E-30421FE14158}"/>
-              </a:ext>
-            </a:extLst>
-          </p:cNvPr>
-          <p:cNvSpPr txBox="1"/>
-          <p:nvPr/>
-        </p:nvSpPr>
-        <p:spPr>
-          <a:xfrm>
-            <a:off x="6392336" y="2172084"/>
+            <a:off x="1996382" y="2113486"/>
             <a:ext cx="720008" cy="234286"/>
           </a:xfrm>
           <a:prstGeom prst="rect">
@@ -8274,13 +8987,14 @@
           </p:cNvPr>
           <p:cNvCxnSpPr>
             <a:cxnSpLocks/>
+            <a:endCxn id="31" idx="0"/>
           </p:cNvCxnSpPr>
           <p:nvPr/>
         </p:nvCxnSpPr>
         <p:spPr>
-          <a:xfrm flipH="1">
-            <a:off x="7106061" y="1920408"/>
-            <a:ext cx="751619" cy="258582"/>
+          <a:xfrm>
+            <a:off x="1229195" y="1396828"/>
+            <a:ext cx="1127191" cy="716658"/>
           </a:xfrm>
           <a:prstGeom prst="line">
             <a:avLst/>
@@ -8317,14 +9031,15 @@
           </p:cNvPr>
           <p:cNvCxnSpPr>
             <a:cxnSpLocks/>
-            <a:endCxn id="31" idx="3"/>
+            <a:stCxn id="62" idx="3"/>
+            <a:endCxn id="31" idx="1"/>
           </p:cNvCxnSpPr>
           <p:nvPr/>
         </p:nvCxnSpPr>
         <p:spPr>
-          <a:xfrm flipH="1" flipV="1">
-            <a:off x="7112344" y="2289227"/>
-            <a:ext cx="890766" cy="276844"/>
+          <a:xfrm>
+            <a:off x="1222000" y="2090993"/>
+            <a:ext cx="774382" cy="139636"/>
           </a:xfrm>
           <a:prstGeom prst="line">
             <a:avLst/>
@@ -8361,13 +9076,15 @@
           </p:cNvPr>
           <p:cNvCxnSpPr>
             <a:cxnSpLocks/>
+            <a:stCxn id="59" idx="2"/>
+            <a:endCxn id="31" idx="0"/>
           </p:cNvCxnSpPr>
           <p:nvPr/>
         </p:nvCxnSpPr>
         <p:spPr>
-          <a:xfrm flipH="1">
-            <a:off x="6855054" y="1631614"/>
-            <a:ext cx="720613" cy="522775"/>
+          <a:xfrm>
+            <a:off x="1023591" y="1780508"/>
+            <a:ext cx="1332795" cy="332978"/>
           </a:xfrm>
           <a:prstGeom prst="line">
             <a:avLst/>
@@ -8407,7 +9124,7 @@
         </p:nvSpPr>
         <p:spPr>
           <a:xfrm>
-            <a:off x="7350664" y="1401737"/>
+            <a:off x="798588" y="1546222"/>
             <a:ext cx="450005" cy="234286"/>
           </a:xfrm>
           <a:prstGeom prst="rect">
@@ -8454,7 +9171,7 @@
         </p:nvSpPr>
         <p:spPr>
           <a:xfrm>
-            <a:off x="7656067" y="1688271"/>
+            <a:off x="1023590" y="1140049"/>
             <a:ext cx="403228" cy="234286"/>
           </a:xfrm>
           <a:prstGeom prst="rect">
@@ -8501,7 +9218,7 @@
         </p:nvSpPr>
         <p:spPr>
           <a:xfrm>
-            <a:off x="7523983" y="2568259"/>
+            <a:off x="329185" y="1973850"/>
             <a:ext cx="892815" cy="234286"/>
           </a:xfrm>
           <a:prstGeom prst="rect">
@@ -8548,7 +9265,7 @@
         </p:nvSpPr>
         <p:spPr>
           <a:xfrm>
-            <a:off x="3136556" y="1504749"/>
+            <a:off x="3066086" y="960836"/>
             <a:ext cx="450005" cy="234286"/>
           </a:xfrm>
           <a:prstGeom prst="rect">
@@ -8595,7 +9312,7 @@
         </p:nvSpPr>
         <p:spPr>
           <a:xfrm>
-            <a:off x="1975694" y="2209406"/>
+            <a:off x="6250647" y="1382980"/>
             <a:ext cx="810009" cy="234286"/>
           </a:xfrm>
           <a:prstGeom prst="rect">
@@ -8642,7 +9359,7 @@
         </p:nvSpPr>
         <p:spPr>
           <a:xfrm>
-            <a:off x="2157770" y="1767344"/>
+            <a:off x="2052404" y="1379633"/>
             <a:ext cx="892815" cy="234286"/>
           </a:xfrm>
           <a:prstGeom prst="rect">
@@ -8689,7 +9406,7 @@
         </p:nvSpPr>
         <p:spPr>
           <a:xfrm>
-            <a:off x="5596550" y="3290765"/>
+            <a:off x="6940682" y="1969998"/>
             <a:ext cx="297605" cy="234286"/>
           </a:xfrm>
           <a:prstGeom prst="rect">
@@ -8736,7 +9453,7 @@
         </p:nvSpPr>
         <p:spPr>
           <a:xfrm>
-            <a:off x="5396658" y="1518880"/>
+            <a:off x="5502030" y="762902"/>
             <a:ext cx="1128022" cy="395869"/>
           </a:xfrm>
           <a:prstGeom prst="rect">
@@ -8833,8 +9550,8 @@
         </p:nvCxnSpPr>
         <p:spPr>
           <a:xfrm flipH="1">
-            <a:off x="5472009" y="1914749"/>
-            <a:ext cx="488660" cy="502415"/>
+            <a:off x="5017248" y="1158771"/>
+            <a:ext cx="1048793" cy="1626801"/>
           </a:xfrm>
           <a:prstGeom prst="line">
             <a:avLst/>
@@ -9000,14 +9717,15 @@
           </p:cNvPr>
           <p:cNvCxnSpPr>
             <a:cxnSpLocks/>
-            <a:stCxn id="69" idx="3"/>
+            <a:stCxn id="69" idx="0"/>
+            <a:endCxn id="57" idx="2"/>
           </p:cNvCxnSpPr>
           <p:nvPr/>
         </p:nvCxnSpPr>
         <p:spPr>
-          <a:xfrm>
-            <a:off x="2785703" y="2326549"/>
-            <a:ext cx="761490" cy="110293"/>
+          <a:xfrm flipV="1">
+            <a:off x="6655652" y="830978"/>
+            <a:ext cx="798679" cy="552002"/>
           </a:xfrm>
           <a:prstGeom prst="line">
             <a:avLst/>
@@ -9033,10 +9751,3257 @@
           </a:fontRef>
         </p:style>
       </p:cxnSp>
+      <p:cxnSp>
+        <p:nvCxnSpPr>
+          <p:cNvPr id="6" name="Straight Connector 5">
+            <a:extLst>
+              <a:ext uri="{FF2B5EF4-FFF2-40B4-BE49-F238E27FC236}">
+                <a16:creationId xmlns:a16="http://schemas.microsoft.com/office/drawing/2014/main" id="{89DE503A-D81C-04AB-BFDF-1B001F0FB0AE}"/>
+              </a:ext>
+            </a:extLst>
+          </p:cNvPr>
+          <p:cNvCxnSpPr>
+            <a:cxnSpLocks/>
+            <a:stCxn id="69" idx="2"/>
+          </p:cNvCxnSpPr>
+          <p:nvPr/>
+        </p:nvCxnSpPr>
+        <p:spPr>
+          <a:xfrm flipH="1">
+            <a:off x="5455838" y="1617266"/>
+            <a:ext cx="1199814" cy="810383"/>
+          </a:xfrm>
+          <a:prstGeom prst="line">
+            <a:avLst/>
+          </a:prstGeom>
+          <a:ln>
+            <a:solidFill>
+              <a:srgbClr val="E3E9ED"/>
+            </a:solidFill>
+          </a:ln>
+        </p:spPr>
+        <p:style>
+          <a:lnRef idx="2">
+            <a:schemeClr val="accent1"/>
+          </a:lnRef>
+          <a:fillRef idx="0">
+            <a:schemeClr val="accent1"/>
+          </a:fillRef>
+          <a:effectRef idx="1">
+            <a:schemeClr val="accent1"/>
+          </a:effectRef>
+          <a:fontRef idx="minor">
+            <a:schemeClr val="tx1"/>
+          </a:fontRef>
+        </p:style>
+      </p:cxnSp>
+      <p:cxnSp>
+        <p:nvCxnSpPr>
+          <p:cNvPr id="10" name="Straight Connector 9">
+            <a:extLst>
+              <a:ext uri="{FF2B5EF4-FFF2-40B4-BE49-F238E27FC236}">
+                <a16:creationId xmlns:a16="http://schemas.microsoft.com/office/drawing/2014/main" id="{5CC7912B-0B62-75F7-91FD-5DFFD6493007}"/>
+              </a:ext>
+            </a:extLst>
+          </p:cNvPr>
+          <p:cNvCxnSpPr>
+            <a:cxnSpLocks/>
+          </p:cNvCxnSpPr>
+          <p:nvPr/>
+        </p:nvCxnSpPr>
+        <p:spPr>
+          <a:xfrm flipH="1" flipV="1">
+            <a:off x="3365590" y="1195122"/>
+            <a:ext cx="756406" cy="1590450"/>
+          </a:xfrm>
+          <a:prstGeom prst="line">
+            <a:avLst/>
+          </a:prstGeom>
+          <a:ln>
+            <a:solidFill>
+              <a:srgbClr val="E3E9ED"/>
+            </a:solidFill>
+          </a:ln>
+        </p:spPr>
+        <p:style>
+          <a:lnRef idx="2">
+            <a:schemeClr val="accent1"/>
+          </a:lnRef>
+          <a:fillRef idx="0">
+            <a:schemeClr val="accent1"/>
+          </a:fillRef>
+          <a:effectRef idx="1">
+            <a:schemeClr val="accent1"/>
+          </a:effectRef>
+          <a:fontRef idx="minor">
+            <a:schemeClr val="tx1"/>
+          </a:fontRef>
+        </p:style>
+      </p:cxnSp>
+      <p:cxnSp>
+        <p:nvCxnSpPr>
+          <p:cNvPr id="15" name="Straight Connector 14">
+            <a:extLst>
+              <a:ext uri="{FF2B5EF4-FFF2-40B4-BE49-F238E27FC236}">
+                <a16:creationId xmlns:a16="http://schemas.microsoft.com/office/drawing/2014/main" id="{253222A8-6509-91BE-C825-B370026AEDE2}"/>
+              </a:ext>
+            </a:extLst>
+          </p:cNvPr>
+          <p:cNvCxnSpPr>
+            <a:cxnSpLocks/>
+          </p:cNvCxnSpPr>
+          <p:nvPr/>
+        </p:nvCxnSpPr>
+        <p:spPr>
+          <a:xfrm flipH="1" flipV="1">
+            <a:off x="2927625" y="1631614"/>
+            <a:ext cx="623132" cy="804614"/>
+          </a:xfrm>
+          <a:prstGeom prst="line">
+            <a:avLst/>
+          </a:prstGeom>
+          <a:ln>
+            <a:solidFill>
+              <a:srgbClr val="E3E9ED"/>
+            </a:solidFill>
+          </a:ln>
+        </p:spPr>
+        <p:style>
+          <a:lnRef idx="2">
+            <a:schemeClr val="accent1"/>
+          </a:lnRef>
+          <a:fillRef idx="0">
+            <a:schemeClr val="accent1"/>
+          </a:fillRef>
+          <a:effectRef idx="1">
+            <a:schemeClr val="accent1"/>
+          </a:effectRef>
+          <a:fontRef idx="minor">
+            <a:schemeClr val="tx1"/>
+          </a:fontRef>
+        </p:style>
+      </p:cxnSp>
+      <p:sp>
+        <p:nvSpPr>
+          <p:cNvPr id="35" name="TextBox 34">
+            <a:extLst>
+              <a:ext uri="{FF2B5EF4-FFF2-40B4-BE49-F238E27FC236}">
+                <a16:creationId xmlns:a16="http://schemas.microsoft.com/office/drawing/2014/main" id="{A8130A77-06A4-11B9-C7B7-138A88E8B39A}"/>
+              </a:ext>
+            </a:extLst>
+          </p:cNvPr>
+          <p:cNvSpPr txBox="1"/>
+          <p:nvPr/>
+        </p:nvSpPr>
+        <p:spPr>
+          <a:xfrm>
+            <a:off x="7639201" y="1143090"/>
+            <a:ext cx="618640" cy="234286"/>
+          </a:xfrm>
+          <a:prstGeom prst="rect">
+            <a:avLst/>
+          </a:prstGeom>
+          <a:noFill/>
+          <a:ln cap="flat">
+            <a:solidFill>
+              <a:srgbClr val="E3E9ED"/>
+            </a:solidFill>
+            <a:round/>
+          </a:ln>
+        </p:spPr>
+        <p:txBody>
+          <a:bodyPr wrap="square" lIns="36000" tIns="36000" rIns="36000" bIns="36000" rtlCol="0">
+            <a:spAutoFit/>
+          </a:bodyPr>
+          <a:lstStyle/>
+          <a:p>
+            <a:pPr algn="ctr"/>
+            <a:r>
+              <a:rPr lang="en-GB" sz="1050" dirty="0">
+                <a:solidFill>
+                  <a:srgbClr val="E3E9ED"/>
+                </a:solidFill>
+                <a:latin typeface="Aptos Mono" panose="020F0502020204030204" pitchFamily="49" charset="0"/>
+              </a:rPr>
+              <a:t>Python</a:t>
+            </a:r>
+          </a:p>
+        </p:txBody>
+      </p:sp>
+      <p:sp>
+        <p:nvSpPr>
+          <p:cNvPr id="36" name="TextBox 35">
+            <a:extLst>
+              <a:ext uri="{FF2B5EF4-FFF2-40B4-BE49-F238E27FC236}">
+                <a16:creationId xmlns:a16="http://schemas.microsoft.com/office/drawing/2014/main" id="{DCFE2D75-4E91-93B2-D639-87A7C3EE2B02}"/>
+              </a:ext>
+            </a:extLst>
+          </p:cNvPr>
+          <p:cNvSpPr txBox="1"/>
+          <p:nvPr/>
+        </p:nvSpPr>
+        <p:spPr>
+          <a:xfrm>
+            <a:off x="7779899" y="1513676"/>
+            <a:ext cx="1017613" cy="234286"/>
+          </a:xfrm>
+          <a:prstGeom prst="rect">
+            <a:avLst/>
+          </a:prstGeom>
+          <a:noFill/>
+          <a:ln cap="flat">
+            <a:solidFill>
+              <a:srgbClr val="E3E9ED"/>
+            </a:solidFill>
+            <a:round/>
+          </a:ln>
+        </p:spPr>
+        <p:txBody>
+          <a:bodyPr wrap="square" lIns="36000" tIns="36000" rIns="36000" bIns="36000" rtlCol="0">
+            <a:spAutoFit/>
+          </a:bodyPr>
+          <a:lstStyle/>
+          <a:p>
+            <a:pPr algn="ctr"/>
+            <a:r>
+              <a:rPr lang="en-GB" sz="1050" dirty="0">
+                <a:solidFill>
+                  <a:srgbClr val="E3E9ED"/>
+                </a:solidFill>
+                <a:latin typeface="Aptos Mono" panose="020F0502020204030204" pitchFamily="49" charset="0"/>
+              </a:rPr>
+              <a:t>Scikit-Lean</a:t>
+            </a:r>
+          </a:p>
+        </p:txBody>
+      </p:sp>
+      <p:sp>
+        <p:nvSpPr>
+          <p:cNvPr id="37" name="TextBox 36">
+            <a:extLst>
+              <a:ext uri="{FF2B5EF4-FFF2-40B4-BE49-F238E27FC236}">
+                <a16:creationId xmlns:a16="http://schemas.microsoft.com/office/drawing/2014/main" id="{51294605-FF5B-BF9A-3726-3E37E93038B6}"/>
+              </a:ext>
+            </a:extLst>
+          </p:cNvPr>
+          <p:cNvSpPr txBox="1"/>
+          <p:nvPr/>
+        </p:nvSpPr>
+        <p:spPr>
+          <a:xfrm>
+            <a:off x="7965680" y="1972171"/>
+            <a:ext cx="892815" cy="234286"/>
+          </a:xfrm>
+          <a:prstGeom prst="rect">
+            <a:avLst/>
+          </a:prstGeom>
+          <a:noFill/>
+          <a:ln cap="flat">
+            <a:solidFill>
+              <a:srgbClr val="E3E9ED"/>
+            </a:solidFill>
+            <a:round/>
+          </a:ln>
+        </p:spPr>
+        <p:txBody>
+          <a:bodyPr wrap="square" lIns="36000" tIns="36000" rIns="36000" bIns="36000" rtlCol="0">
+            <a:spAutoFit/>
+          </a:bodyPr>
+          <a:lstStyle/>
+          <a:p>
+            <a:pPr algn="ctr"/>
+            <a:r>
+              <a:rPr lang="en-GB" sz="1050" dirty="0">
+                <a:solidFill>
+                  <a:srgbClr val="E3E9ED"/>
+                </a:solidFill>
+                <a:latin typeface="Aptos Mono" panose="020F0502020204030204" pitchFamily="49" charset="0"/>
+              </a:rPr>
+              <a:t>TensorFlow</a:t>
+            </a:r>
+          </a:p>
+        </p:txBody>
+      </p:sp>
+      <p:cxnSp>
+        <p:nvCxnSpPr>
+          <p:cNvPr id="40" name="Straight Connector 39">
+            <a:extLst>
+              <a:ext uri="{FF2B5EF4-FFF2-40B4-BE49-F238E27FC236}">
+                <a16:creationId xmlns:a16="http://schemas.microsoft.com/office/drawing/2014/main" id="{857CC8D4-5CA5-CC55-3DEA-C8943FC109C9}"/>
+              </a:ext>
+            </a:extLst>
+          </p:cNvPr>
+          <p:cNvCxnSpPr>
+            <a:cxnSpLocks/>
+          </p:cNvCxnSpPr>
+          <p:nvPr/>
+        </p:nvCxnSpPr>
+        <p:spPr>
+          <a:xfrm flipH="1">
+            <a:off x="7238287" y="1747962"/>
+            <a:ext cx="549717" cy="216432"/>
+          </a:xfrm>
+          <a:prstGeom prst="line">
+            <a:avLst/>
+          </a:prstGeom>
+          <a:ln>
+            <a:solidFill>
+              <a:srgbClr val="E3E9ED"/>
+            </a:solidFill>
+          </a:ln>
+        </p:spPr>
+        <p:style>
+          <a:lnRef idx="2">
+            <a:schemeClr val="accent1"/>
+          </a:lnRef>
+          <a:fillRef idx="0">
+            <a:schemeClr val="accent1"/>
+          </a:fillRef>
+          <a:effectRef idx="1">
+            <a:schemeClr val="accent1"/>
+          </a:effectRef>
+          <a:fontRef idx="minor">
+            <a:schemeClr val="tx1"/>
+          </a:fontRef>
+        </p:style>
+      </p:cxnSp>
+      <p:cxnSp>
+        <p:nvCxnSpPr>
+          <p:cNvPr id="41" name="Straight Connector 40">
+            <a:extLst>
+              <a:ext uri="{FF2B5EF4-FFF2-40B4-BE49-F238E27FC236}">
+                <a16:creationId xmlns:a16="http://schemas.microsoft.com/office/drawing/2014/main" id="{197ED23C-C1E0-5FD4-E2A6-C14ECF787861}"/>
+              </a:ext>
+            </a:extLst>
+          </p:cNvPr>
+          <p:cNvCxnSpPr>
+            <a:cxnSpLocks/>
+            <a:stCxn id="35" idx="1"/>
+            <a:endCxn id="73" idx="0"/>
+          </p:cNvCxnSpPr>
+          <p:nvPr/>
+        </p:nvCxnSpPr>
+        <p:spPr>
+          <a:xfrm flipH="1">
+            <a:off x="7089485" y="1260233"/>
+            <a:ext cx="549716" cy="709765"/>
+          </a:xfrm>
+          <a:prstGeom prst="line">
+            <a:avLst/>
+          </a:prstGeom>
+          <a:ln>
+            <a:solidFill>
+              <a:srgbClr val="E3E9ED"/>
+            </a:solidFill>
+          </a:ln>
+        </p:spPr>
+        <p:style>
+          <a:lnRef idx="2">
+            <a:schemeClr val="accent1"/>
+          </a:lnRef>
+          <a:fillRef idx="0">
+            <a:schemeClr val="accent1"/>
+          </a:fillRef>
+          <a:effectRef idx="1">
+            <a:schemeClr val="accent1"/>
+          </a:effectRef>
+          <a:fontRef idx="minor">
+            <a:schemeClr val="tx1"/>
+          </a:fontRef>
+        </p:style>
+      </p:cxnSp>
+      <p:cxnSp>
+        <p:nvCxnSpPr>
+          <p:cNvPr id="42" name="Straight Connector 41">
+            <a:extLst>
+              <a:ext uri="{FF2B5EF4-FFF2-40B4-BE49-F238E27FC236}">
+                <a16:creationId xmlns:a16="http://schemas.microsoft.com/office/drawing/2014/main" id="{EABF9136-8A14-D6D9-A426-DD6FB49AAFA8}"/>
+              </a:ext>
+            </a:extLst>
+          </p:cNvPr>
+          <p:cNvCxnSpPr>
+            <a:cxnSpLocks/>
+            <a:stCxn id="37" idx="1"/>
+            <a:endCxn id="73" idx="3"/>
+          </p:cNvCxnSpPr>
+          <p:nvPr/>
+        </p:nvCxnSpPr>
+        <p:spPr>
+          <a:xfrm flipH="1" flipV="1">
+            <a:off x="7238287" y="2087141"/>
+            <a:ext cx="727393" cy="2173"/>
+          </a:xfrm>
+          <a:prstGeom prst="line">
+            <a:avLst/>
+          </a:prstGeom>
+          <a:ln>
+            <a:solidFill>
+              <a:srgbClr val="E3E9ED"/>
+            </a:solidFill>
+          </a:ln>
+        </p:spPr>
+        <p:style>
+          <a:lnRef idx="2">
+            <a:schemeClr val="accent1"/>
+          </a:lnRef>
+          <a:fillRef idx="0">
+            <a:schemeClr val="accent1"/>
+          </a:fillRef>
+          <a:effectRef idx="1">
+            <a:schemeClr val="accent1"/>
+          </a:effectRef>
+          <a:fontRef idx="minor">
+            <a:schemeClr val="tx1"/>
+          </a:fontRef>
+        </p:style>
+      </p:cxnSp>
+      <p:sp>
+        <p:nvSpPr>
+          <p:cNvPr id="54" name="TextBox 53">
+            <a:extLst>
+              <a:ext uri="{FF2B5EF4-FFF2-40B4-BE49-F238E27FC236}">
+                <a16:creationId xmlns:a16="http://schemas.microsoft.com/office/drawing/2014/main" id="{D5B2A316-DAC2-DA60-2569-C11CA0CFF2C1}"/>
+              </a:ext>
+            </a:extLst>
+          </p:cNvPr>
+          <p:cNvSpPr txBox="1"/>
+          <p:nvPr/>
+        </p:nvSpPr>
+        <p:spPr>
+          <a:xfrm>
+            <a:off x="6242617" y="203796"/>
+            <a:ext cx="387435" cy="234286"/>
+          </a:xfrm>
+          <a:prstGeom prst="rect">
+            <a:avLst/>
+          </a:prstGeom>
+          <a:noFill/>
+          <a:ln cap="flat">
+            <a:solidFill>
+              <a:srgbClr val="E3E9ED"/>
+            </a:solidFill>
+            <a:round/>
+          </a:ln>
+        </p:spPr>
+        <p:txBody>
+          <a:bodyPr wrap="square" lIns="36000" tIns="36000" rIns="36000" bIns="36000" rtlCol="0">
+            <a:spAutoFit/>
+          </a:bodyPr>
+          <a:lstStyle/>
+          <a:p>
+            <a:pPr algn="ctr"/>
+            <a:r>
+              <a:rPr lang="en-GB" sz="1050" dirty="0">
+                <a:solidFill>
+                  <a:srgbClr val="E3E9ED"/>
+                </a:solidFill>
+                <a:latin typeface="Aptos Mono" panose="020F0502020204030204" pitchFamily="49" charset="0"/>
+              </a:rPr>
+              <a:t>Elm</a:t>
+            </a:r>
+          </a:p>
+        </p:txBody>
+      </p:sp>
+      <p:sp>
+        <p:nvSpPr>
+          <p:cNvPr id="55" name="TextBox 54">
+            <a:extLst>
+              <a:ext uri="{FF2B5EF4-FFF2-40B4-BE49-F238E27FC236}">
+                <a16:creationId xmlns:a16="http://schemas.microsoft.com/office/drawing/2014/main" id="{BAD25808-5986-BF8D-7BB1-A5811B863D38}"/>
+              </a:ext>
+            </a:extLst>
+          </p:cNvPr>
+          <p:cNvSpPr txBox="1"/>
+          <p:nvPr/>
+        </p:nvSpPr>
+        <p:spPr>
+          <a:xfrm>
+            <a:off x="1259909" y="595278"/>
+            <a:ext cx="666827" cy="234286"/>
+          </a:xfrm>
+          <a:prstGeom prst="rect">
+            <a:avLst/>
+          </a:prstGeom>
+          <a:noFill/>
+          <a:ln cap="flat">
+            <a:solidFill>
+              <a:srgbClr val="E3E9ED"/>
+            </a:solidFill>
+            <a:round/>
+          </a:ln>
+        </p:spPr>
+        <p:txBody>
+          <a:bodyPr wrap="square" lIns="36000" tIns="36000" rIns="36000" bIns="36000" rtlCol="0">
+            <a:spAutoFit/>
+          </a:bodyPr>
+          <a:lstStyle/>
+          <a:p>
+            <a:pPr algn="ctr"/>
+            <a:r>
+              <a:rPr lang="en-GB" sz="1050" dirty="0">
+                <a:solidFill>
+                  <a:srgbClr val="E3E9ED"/>
+                </a:solidFill>
+                <a:latin typeface="Aptos Mono" panose="020F0502020204030204" pitchFamily="49" charset="0"/>
+              </a:rPr>
+              <a:t>Haskell</a:t>
+            </a:r>
+          </a:p>
+        </p:txBody>
+      </p:sp>
+      <p:sp>
+        <p:nvSpPr>
+          <p:cNvPr id="57" name="TextBox 56">
+            <a:extLst>
+              <a:ext uri="{FF2B5EF4-FFF2-40B4-BE49-F238E27FC236}">
+                <a16:creationId xmlns:a16="http://schemas.microsoft.com/office/drawing/2014/main" id="{597BBC01-3860-7275-E287-867475D1D082}"/>
+              </a:ext>
+            </a:extLst>
+          </p:cNvPr>
+          <p:cNvSpPr txBox="1"/>
+          <p:nvPr/>
+        </p:nvSpPr>
+        <p:spPr>
+          <a:xfrm>
+            <a:off x="7260613" y="596692"/>
+            <a:ext cx="387435" cy="234286"/>
+          </a:xfrm>
+          <a:prstGeom prst="rect">
+            <a:avLst/>
+          </a:prstGeom>
+          <a:noFill/>
+          <a:ln cap="flat">
+            <a:solidFill>
+              <a:srgbClr val="E3E9ED"/>
+            </a:solidFill>
+            <a:round/>
+          </a:ln>
+        </p:spPr>
+        <p:txBody>
+          <a:bodyPr wrap="square" lIns="36000" tIns="36000" rIns="36000" bIns="36000" rtlCol="0">
+            <a:spAutoFit/>
+          </a:bodyPr>
+          <a:lstStyle/>
+          <a:p>
+            <a:pPr algn="ctr"/>
+            <a:r>
+              <a:rPr lang="en-GB" sz="1050" dirty="0">
+                <a:solidFill>
+                  <a:srgbClr val="E3E9ED"/>
+                </a:solidFill>
+                <a:latin typeface="Aptos Mono" panose="020F0502020204030204" pitchFamily="49" charset="0"/>
+              </a:rPr>
+              <a:t>SQL</a:t>
+            </a:r>
+          </a:p>
+        </p:txBody>
+      </p:sp>
+      <p:sp>
+        <p:nvSpPr>
+          <p:cNvPr id="58" name="TextBox 57">
+            <a:extLst>
+              <a:ext uri="{FF2B5EF4-FFF2-40B4-BE49-F238E27FC236}">
+                <a16:creationId xmlns:a16="http://schemas.microsoft.com/office/drawing/2014/main" id="{37647B21-B0F5-E1E4-9F2F-A6F542F52804}"/>
+              </a:ext>
+            </a:extLst>
+          </p:cNvPr>
+          <p:cNvSpPr txBox="1"/>
+          <p:nvPr/>
+        </p:nvSpPr>
+        <p:spPr>
+          <a:xfrm>
+            <a:off x="2575270" y="228721"/>
+            <a:ext cx="434891" cy="234286"/>
+          </a:xfrm>
+          <a:prstGeom prst="rect">
+            <a:avLst/>
+          </a:prstGeom>
+          <a:noFill/>
+          <a:ln cap="flat">
+            <a:solidFill>
+              <a:srgbClr val="E3E9ED"/>
+            </a:solidFill>
+            <a:round/>
+          </a:ln>
+        </p:spPr>
+        <p:txBody>
+          <a:bodyPr wrap="square" lIns="36000" tIns="36000" rIns="36000" bIns="36000" rtlCol="0">
+            <a:spAutoFit/>
+          </a:bodyPr>
+          <a:lstStyle/>
+          <a:p>
+            <a:pPr algn="ctr"/>
+            <a:r>
+              <a:rPr lang="en-GB" sz="1050" dirty="0">
+                <a:solidFill>
+                  <a:srgbClr val="E3E9ED"/>
+                </a:solidFill>
+                <a:latin typeface="Aptos Mono" panose="020F0502020204030204" pitchFamily="49" charset="0"/>
+              </a:rPr>
+              <a:t>Java</a:t>
+            </a:r>
+          </a:p>
+        </p:txBody>
+      </p:sp>
+      <p:sp>
+        <p:nvSpPr>
+          <p:cNvPr id="60" name="TextBox 59">
+            <a:extLst>
+              <a:ext uri="{FF2B5EF4-FFF2-40B4-BE49-F238E27FC236}">
+                <a16:creationId xmlns:a16="http://schemas.microsoft.com/office/drawing/2014/main" id="{CB9CF233-54E5-946D-BE24-38592BCE80E5}"/>
+              </a:ext>
+            </a:extLst>
+          </p:cNvPr>
+          <p:cNvSpPr txBox="1"/>
+          <p:nvPr/>
+        </p:nvSpPr>
+        <p:spPr>
+          <a:xfrm>
+            <a:off x="4078815" y="808624"/>
+            <a:ext cx="387435" cy="234286"/>
+          </a:xfrm>
+          <a:prstGeom prst="rect">
+            <a:avLst/>
+          </a:prstGeom>
+          <a:noFill/>
+          <a:ln cap="flat">
+            <a:solidFill>
+              <a:srgbClr val="E3E9ED"/>
+            </a:solidFill>
+            <a:round/>
+          </a:ln>
+        </p:spPr>
+        <p:txBody>
+          <a:bodyPr wrap="square" lIns="36000" tIns="36000" rIns="36000" bIns="36000" rtlCol="0">
+            <a:spAutoFit/>
+          </a:bodyPr>
+          <a:lstStyle/>
+          <a:p>
+            <a:pPr algn="ctr"/>
+            <a:r>
+              <a:rPr lang="en-GB" sz="1050" dirty="0">
+                <a:solidFill>
+                  <a:srgbClr val="E3E9ED"/>
+                </a:solidFill>
+                <a:latin typeface="Aptos Mono" panose="020F0502020204030204" pitchFamily="49" charset="0"/>
+              </a:rPr>
+              <a:t>C#</a:t>
+            </a:r>
+          </a:p>
+        </p:txBody>
+      </p:sp>
+      <p:sp>
+        <p:nvSpPr>
+          <p:cNvPr id="63" name="TextBox 62">
+            <a:extLst>
+              <a:ext uri="{FF2B5EF4-FFF2-40B4-BE49-F238E27FC236}">
+                <a16:creationId xmlns:a16="http://schemas.microsoft.com/office/drawing/2014/main" id="{A8E6ECF1-8570-320F-64BC-4AF93A3B09E8}"/>
+              </a:ext>
+            </a:extLst>
+          </p:cNvPr>
+          <p:cNvSpPr txBox="1"/>
+          <p:nvPr/>
+        </p:nvSpPr>
+        <p:spPr>
+          <a:xfrm>
+            <a:off x="4677751" y="807447"/>
+            <a:ext cx="387435" cy="234286"/>
+          </a:xfrm>
+          <a:prstGeom prst="rect">
+            <a:avLst/>
+          </a:prstGeom>
+          <a:noFill/>
+          <a:ln cap="flat">
+            <a:solidFill>
+              <a:srgbClr val="E3E9ED"/>
+            </a:solidFill>
+            <a:round/>
+          </a:ln>
+        </p:spPr>
+        <p:txBody>
+          <a:bodyPr wrap="square" lIns="36000" tIns="36000" rIns="36000" bIns="36000" rtlCol="0">
+            <a:spAutoFit/>
+          </a:bodyPr>
+          <a:lstStyle/>
+          <a:p>
+            <a:pPr algn="ctr"/>
+            <a:r>
+              <a:rPr lang="en-GB" sz="1050" dirty="0">
+                <a:solidFill>
+                  <a:srgbClr val="E3E9ED"/>
+                </a:solidFill>
+                <a:latin typeface="Aptos Mono" panose="020F0502020204030204" pitchFamily="49" charset="0"/>
+              </a:rPr>
+              <a:t>C++</a:t>
+            </a:r>
+          </a:p>
+        </p:txBody>
+      </p:sp>
+      <p:cxnSp>
+        <p:nvCxnSpPr>
+          <p:cNvPr id="89" name="Straight Connector 88">
+            <a:extLst>
+              <a:ext uri="{FF2B5EF4-FFF2-40B4-BE49-F238E27FC236}">
+                <a16:creationId xmlns:a16="http://schemas.microsoft.com/office/drawing/2014/main" id="{BBA60EBE-B659-C34A-9951-7D8228C4D246}"/>
+              </a:ext>
+            </a:extLst>
+          </p:cNvPr>
+          <p:cNvCxnSpPr>
+            <a:cxnSpLocks/>
+            <a:stCxn id="73" idx="1"/>
+          </p:cNvCxnSpPr>
+          <p:nvPr/>
+        </p:nvCxnSpPr>
+        <p:spPr>
+          <a:xfrm flipH="1">
+            <a:off x="5476767" y="2087141"/>
+            <a:ext cx="1463915" cy="340508"/>
+          </a:xfrm>
+          <a:prstGeom prst="line">
+            <a:avLst/>
+          </a:prstGeom>
+          <a:ln>
+            <a:solidFill>
+              <a:srgbClr val="E3E9ED"/>
+            </a:solidFill>
+          </a:ln>
+        </p:spPr>
+        <p:style>
+          <a:lnRef idx="2">
+            <a:schemeClr val="accent1"/>
+          </a:lnRef>
+          <a:fillRef idx="0">
+            <a:schemeClr val="accent1"/>
+          </a:fillRef>
+          <a:effectRef idx="1">
+            <a:schemeClr val="accent1"/>
+          </a:effectRef>
+          <a:fontRef idx="minor">
+            <a:schemeClr val="tx1"/>
+          </a:fontRef>
+        </p:style>
+      </p:cxnSp>
+      <p:cxnSp>
+        <p:nvCxnSpPr>
+          <p:cNvPr id="108" name="Straight Connector 107">
+            <a:extLst>
+              <a:ext uri="{FF2B5EF4-FFF2-40B4-BE49-F238E27FC236}">
+                <a16:creationId xmlns:a16="http://schemas.microsoft.com/office/drawing/2014/main" id="{AD512CA0-0413-847F-6A38-4DFF3C68BD03}"/>
+              </a:ext>
+            </a:extLst>
+          </p:cNvPr>
+          <p:cNvCxnSpPr>
+            <a:cxnSpLocks/>
+            <a:endCxn id="75" idx="0"/>
+          </p:cNvCxnSpPr>
+          <p:nvPr/>
+        </p:nvCxnSpPr>
+        <p:spPr>
+          <a:xfrm>
+            <a:off x="4298224" y="1044852"/>
+            <a:ext cx="294770" cy="622175"/>
+          </a:xfrm>
+          <a:prstGeom prst="line">
+            <a:avLst/>
+          </a:prstGeom>
+          <a:ln>
+            <a:solidFill>
+              <a:srgbClr val="E3E9ED"/>
+            </a:solidFill>
+          </a:ln>
+        </p:spPr>
+        <p:style>
+          <a:lnRef idx="2">
+            <a:schemeClr val="accent1"/>
+          </a:lnRef>
+          <a:fillRef idx="0">
+            <a:schemeClr val="accent1"/>
+          </a:fillRef>
+          <a:effectRef idx="1">
+            <a:schemeClr val="accent1"/>
+          </a:effectRef>
+          <a:fontRef idx="minor">
+            <a:schemeClr val="tx1"/>
+          </a:fontRef>
+        </p:style>
+      </p:cxnSp>
+      <p:cxnSp>
+        <p:nvCxnSpPr>
+          <p:cNvPr id="109" name="Straight Connector 108">
+            <a:extLst>
+              <a:ext uri="{FF2B5EF4-FFF2-40B4-BE49-F238E27FC236}">
+                <a16:creationId xmlns:a16="http://schemas.microsoft.com/office/drawing/2014/main" id="{07BC187D-679B-B7A5-5B51-C09BBAEC120D}"/>
+              </a:ext>
+            </a:extLst>
+          </p:cNvPr>
+          <p:cNvCxnSpPr>
+            <a:cxnSpLocks/>
+            <a:endCxn id="75" idx="0"/>
+          </p:cNvCxnSpPr>
+          <p:nvPr/>
+        </p:nvCxnSpPr>
+        <p:spPr>
+          <a:xfrm flipH="1">
+            <a:off x="4592994" y="1044238"/>
+            <a:ext cx="245234" cy="622789"/>
+          </a:xfrm>
+          <a:prstGeom prst="line">
+            <a:avLst/>
+          </a:prstGeom>
+          <a:ln>
+            <a:solidFill>
+              <a:srgbClr val="E3E9ED"/>
+            </a:solidFill>
+          </a:ln>
+        </p:spPr>
+        <p:style>
+          <a:lnRef idx="2">
+            <a:schemeClr val="accent1"/>
+          </a:lnRef>
+          <a:fillRef idx="0">
+            <a:schemeClr val="accent1"/>
+          </a:fillRef>
+          <a:effectRef idx="1">
+            <a:schemeClr val="accent1"/>
+          </a:effectRef>
+          <a:fontRef idx="minor">
+            <a:schemeClr val="tx1"/>
+          </a:fontRef>
+        </p:style>
+      </p:cxnSp>
+      <p:cxnSp>
+        <p:nvCxnSpPr>
+          <p:cNvPr id="122" name="Straight Connector 121">
+            <a:extLst>
+              <a:ext uri="{FF2B5EF4-FFF2-40B4-BE49-F238E27FC236}">
+                <a16:creationId xmlns:a16="http://schemas.microsoft.com/office/drawing/2014/main" id="{C146E413-012B-775C-BB90-C4F16D67C435}"/>
+              </a:ext>
+            </a:extLst>
+          </p:cNvPr>
+          <p:cNvCxnSpPr>
+            <a:cxnSpLocks/>
+            <a:endCxn id="31" idx="3"/>
+          </p:cNvCxnSpPr>
+          <p:nvPr/>
+        </p:nvCxnSpPr>
+        <p:spPr>
+          <a:xfrm flipH="1" flipV="1">
+            <a:off x="2716390" y="2230629"/>
+            <a:ext cx="830800" cy="205599"/>
+          </a:xfrm>
+          <a:prstGeom prst="line">
+            <a:avLst/>
+          </a:prstGeom>
+          <a:ln>
+            <a:solidFill>
+              <a:srgbClr val="E3E9ED"/>
+            </a:solidFill>
+          </a:ln>
+        </p:spPr>
+        <p:style>
+          <a:lnRef idx="2">
+            <a:schemeClr val="accent1"/>
+          </a:lnRef>
+          <a:fillRef idx="0">
+            <a:schemeClr val="accent1"/>
+          </a:fillRef>
+          <a:effectRef idx="1">
+            <a:schemeClr val="accent1"/>
+          </a:effectRef>
+          <a:fontRef idx="minor">
+            <a:schemeClr val="tx1"/>
+          </a:fontRef>
+        </p:style>
+      </p:cxnSp>
+      <p:cxnSp>
+        <p:nvCxnSpPr>
+          <p:cNvPr id="125" name="Straight Connector 124">
+            <a:extLst>
+              <a:ext uri="{FF2B5EF4-FFF2-40B4-BE49-F238E27FC236}">
+                <a16:creationId xmlns:a16="http://schemas.microsoft.com/office/drawing/2014/main" id="{FB129839-BCC7-37C7-A560-DB261FC57292}"/>
+              </a:ext>
+            </a:extLst>
+          </p:cNvPr>
+          <p:cNvCxnSpPr>
+            <a:cxnSpLocks/>
+            <a:stCxn id="72" idx="0"/>
+            <a:endCxn id="55" idx="2"/>
+          </p:cNvCxnSpPr>
+          <p:nvPr/>
+        </p:nvCxnSpPr>
+        <p:spPr>
+          <a:xfrm flipH="1" flipV="1">
+            <a:off x="1593323" y="829564"/>
+            <a:ext cx="905489" cy="550069"/>
+          </a:xfrm>
+          <a:prstGeom prst="line">
+            <a:avLst/>
+          </a:prstGeom>
+          <a:ln>
+            <a:solidFill>
+              <a:srgbClr val="E3E9ED"/>
+            </a:solidFill>
+          </a:ln>
+        </p:spPr>
+        <p:style>
+          <a:lnRef idx="2">
+            <a:schemeClr val="accent1"/>
+          </a:lnRef>
+          <a:fillRef idx="0">
+            <a:schemeClr val="accent1"/>
+          </a:fillRef>
+          <a:effectRef idx="1">
+            <a:schemeClr val="accent1"/>
+          </a:effectRef>
+          <a:fontRef idx="minor">
+            <a:schemeClr val="tx1"/>
+          </a:fontRef>
+        </p:style>
+      </p:cxnSp>
+      <p:cxnSp>
+        <p:nvCxnSpPr>
+          <p:cNvPr id="128" name="Straight Connector 127">
+            <a:extLst>
+              <a:ext uri="{FF2B5EF4-FFF2-40B4-BE49-F238E27FC236}">
+                <a16:creationId xmlns:a16="http://schemas.microsoft.com/office/drawing/2014/main" id="{A053E587-86F7-3885-FA20-FA843922EE1D}"/>
+              </a:ext>
+            </a:extLst>
+          </p:cNvPr>
+          <p:cNvCxnSpPr>
+            <a:cxnSpLocks/>
+            <a:stCxn id="68" idx="0"/>
+            <a:endCxn id="58" idx="2"/>
+          </p:cNvCxnSpPr>
+          <p:nvPr/>
+        </p:nvCxnSpPr>
+        <p:spPr>
+          <a:xfrm flipH="1" flipV="1">
+            <a:off x="2792716" y="463007"/>
+            <a:ext cx="498373" cy="497829"/>
+          </a:xfrm>
+          <a:prstGeom prst="line">
+            <a:avLst/>
+          </a:prstGeom>
+          <a:ln>
+            <a:solidFill>
+              <a:srgbClr val="E3E9ED"/>
+            </a:solidFill>
+          </a:ln>
+        </p:spPr>
+        <p:style>
+          <a:lnRef idx="2">
+            <a:schemeClr val="accent1"/>
+          </a:lnRef>
+          <a:fillRef idx="0">
+            <a:schemeClr val="accent1"/>
+          </a:fillRef>
+          <a:effectRef idx="1">
+            <a:schemeClr val="accent1"/>
+          </a:effectRef>
+          <a:fontRef idx="minor">
+            <a:schemeClr val="tx1"/>
+          </a:fontRef>
+        </p:style>
+      </p:cxnSp>
+      <p:cxnSp>
+        <p:nvCxnSpPr>
+          <p:cNvPr id="131" name="Straight Connector 130">
+            <a:extLst>
+              <a:ext uri="{FF2B5EF4-FFF2-40B4-BE49-F238E27FC236}">
+                <a16:creationId xmlns:a16="http://schemas.microsoft.com/office/drawing/2014/main" id="{BF5AFDC5-1895-7AC2-A444-FCC6F454CBF6}"/>
+              </a:ext>
+            </a:extLst>
+          </p:cNvPr>
+          <p:cNvCxnSpPr>
+            <a:cxnSpLocks/>
+            <a:stCxn id="74" idx="0"/>
+            <a:endCxn id="54" idx="2"/>
+          </p:cNvCxnSpPr>
+          <p:nvPr/>
+        </p:nvCxnSpPr>
+        <p:spPr>
+          <a:xfrm flipV="1">
+            <a:off x="6066041" y="438082"/>
+            <a:ext cx="370294" cy="324820"/>
+          </a:xfrm>
+          <a:prstGeom prst="line">
+            <a:avLst/>
+          </a:prstGeom>
+          <a:ln>
+            <a:solidFill>
+              <a:srgbClr val="E3E9ED"/>
+            </a:solidFill>
+          </a:ln>
+        </p:spPr>
+        <p:style>
+          <a:lnRef idx="2">
+            <a:schemeClr val="accent1"/>
+          </a:lnRef>
+          <a:fillRef idx="0">
+            <a:schemeClr val="accent1"/>
+          </a:fillRef>
+          <a:effectRef idx="1">
+            <a:schemeClr val="accent1"/>
+          </a:effectRef>
+          <a:fontRef idx="minor">
+            <a:schemeClr val="tx1"/>
+          </a:fontRef>
+        </p:style>
+      </p:cxnSp>
+      <p:sp>
+        <p:nvSpPr>
+          <p:cNvPr id="141" name="TextBox 140">
+            <a:extLst>
+              <a:ext uri="{FF2B5EF4-FFF2-40B4-BE49-F238E27FC236}">
+                <a16:creationId xmlns:a16="http://schemas.microsoft.com/office/drawing/2014/main" id="{09FDBCAE-521D-D02A-4A23-3B41F65A72FF}"/>
+              </a:ext>
+            </a:extLst>
+          </p:cNvPr>
+          <p:cNvSpPr txBox="1"/>
+          <p:nvPr/>
+        </p:nvSpPr>
+        <p:spPr>
+          <a:xfrm>
+            <a:off x="4015183" y="4733521"/>
+            <a:ext cx="1128022" cy="234286"/>
+          </a:xfrm>
+          <a:prstGeom prst="rect">
+            <a:avLst/>
+          </a:prstGeom>
+          <a:noFill/>
+          <a:ln cap="flat">
+            <a:solidFill>
+              <a:srgbClr val="E3E9ED"/>
+            </a:solidFill>
+            <a:round/>
+          </a:ln>
+        </p:spPr>
+        <p:txBody>
+          <a:bodyPr wrap="square" lIns="36000" tIns="36000" rIns="36000" bIns="36000" rtlCol="0">
+            <a:spAutoFit/>
+          </a:bodyPr>
+          <a:lstStyle/>
+          <a:p>
+            <a:pPr algn="ctr"/>
+            <a:r>
+              <a:rPr lang="en-GB" sz="1050" dirty="0">
+                <a:solidFill>
+                  <a:srgbClr val="E3E9ED"/>
+                </a:solidFill>
+                <a:latin typeface="Aptos Mono" panose="020F0502020204030204" pitchFamily="49" charset="0"/>
+              </a:rPr>
+              <a:t>My Skill Tree</a:t>
+            </a:r>
+          </a:p>
+        </p:txBody>
+      </p:sp>
     </p:spTree>
     <p:extLst>
       <p:ext uri="{BB962C8B-B14F-4D97-AF65-F5344CB8AC3E}">
         <p14:creationId xmlns:p14="http://schemas.microsoft.com/office/powerpoint/2010/main" val="234888975"/>
+      </p:ext>
+    </p:extLst>
+  </p:cSld>
+  <p:clrMapOvr>
+    <a:masterClrMapping/>
+  </p:clrMapOvr>
+</p:sld>
+</file>
+
+<file path=ppt/slides/slide6.xml><?xml version="1.0" encoding="utf-8"?>
+<p:sld xmlns:a="http://schemas.openxmlformats.org/drawingml/2006/main" xmlns:r="http://schemas.openxmlformats.org/officeDocument/2006/relationships" xmlns:p="http://schemas.openxmlformats.org/presentationml/2006/main">
+  <p:cSld>
+    <p:spTree>
+      <p:nvGrpSpPr>
+        <p:cNvPr id="1" name=""/>
+        <p:cNvGrpSpPr/>
+        <p:nvPr/>
+      </p:nvGrpSpPr>
+      <p:grpSpPr>
+        <a:xfrm>
+          <a:off x="0" y="0"/>
+          <a:ext cx="0" cy="0"/>
+          <a:chOff x="0" y="0"/>
+          <a:chExt cx="0" cy="0"/>
+        </a:xfrm>
+      </p:grpSpPr>
+      <p:pic>
+        <p:nvPicPr>
+          <p:cNvPr id="17" name="Picture 16" descr="A aerial view of a football field&#10;&#10;Description automatically generated">
+            <a:extLst>
+              <a:ext uri="{FF2B5EF4-FFF2-40B4-BE49-F238E27FC236}">
+                <a16:creationId xmlns:a16="http://schemas.microsoft.com/office/drawing/2014/main" id="{E765C726-91B9-C2F7-7776-BD13DEC6FB65}"/>
+              </a:ext>
+            </a:extLst>
+          </p:cNvPr>
+          <p:cNvPicPr>
+            <a:picLocks noChangeAspect="1"/>
+          </p:cNvPicPr>
+          <p:nvPr/>
+        </p:nvPicPr>
+        <p:blipFill rotWithShape="1">
+          <a:blip r:embed="rId3">
+            <a:extLst>
+              <a:ext uri="{28A0092B-C50C-407E-A947-70E740481C1C}">
+                <a14:useLocalDpi xmlns:a14="http://schemas.microsoft.com/office/drawing/2010/main" val="0"/>
+              </a:ext>
+            </a:extLst>
+          </a:blip>
+          <a:srcRect l="-30" t="34181" r="30" b="34181"/>
+          <a:stretch/>
+        </p:blipFill>
+        <p:spPr>
+          <a:xfrm>
+            <a:off x="0" y="0"/>
+            <a:ext cx="9156100" cy="5143500"/>
+          </a:xfrm>
+          <a:prstGeom prst="rect">
+            <a:avLst/>
+          </a:prstGeom>
+        </p:spPr>
+      </p:pic>
+      <p:sp>
+        <p:nvSpPr>
+          <p:cNvPr id="12" name="Rectangle 11">
+            <a:extLst>
+              <a:ext uri="{FF2B5EF4-FFF2-40B4-BE49-F238E27FC236}">
+                <a16:creationId xmlns:a16="http://schemas.microsoft.com/office/drawing/2014/main" id="{BAD760F3-3A96-2311-362E-D76774272972}"/>
+              </a:ext>
+            </a:extLst>
+          </p:cNvPr>
+          <p:cNvSpPr>
+            <a:spLocks noGrp="1" noRot="1" noMove="1" noResize="1" noEditPoints="1" noAdjustHandles="1" noChangeArrowheads="1" noChangeShapeType="1"/>
+          </p:cNvSpPr>
+          <p:nvPr/>
+        </p:nvSpPr>
+        <p:spPr>
+          <a:xfrm>
+            <a:off x="0" y="-24601"/>
+            <a:ext cx="9156101" cy="5167487"/>
+          </a:xfrm>
+          <a:prstGeom prst="rect">
+            <a:avLst/>
+          </a:prstGeom>
+          <a:gradFill flip="none" rotWithShape="1">
+            <a:gsLst>
+              <a:gs pos="0">
+                <a:srgbClr val="171D41">
+                  <a:alpha val="80000"/>
+                </a:srgbClr>
+              </a:gs>
+              <a:gs pos="100000">
+                <a:srgbClr val="171D41">
+                  <a:alpha val="80000"/>
+                </a:srgbClr>
+              </a:gs>
+            </a:gsLst>
+            <a:lin ang="16200000" scaled="1"/>
+            <a:tileRect/>
+          </a:gradFill>
+          <a:ln>
+            <a:noFill/>
+          </a:ln>
+        </p:spPr>
+        <p:style>
+          <a:lnRef idx="2">
+            <a:schemeClr val="accent1">
+              <a:shade val="15000"/>
+            </a:schemeClr>
+          </a:lnRef>
+          <a:fillRef idx="1">
+            <a:schemeClr val="accent1"/>
+          </a:fillRef>
+          <a:effectRef idx="0">
+            <a:schemeClr val="accent1"/>
+          </a:effectRef>
+          <a:fontRef idx="minor">
+            <a:schemeClr val="lt1"/>
+          </a:fontRef>
+        </p:style>
+        <p:txBody>
+          <a:bodyPr rtlCol="0" anchor="ctr"/>
+          <a:lstStyle/>
+          <a:p>
+            <a:pPr algn="r"/>
+            <a:endParaRPr lang="en-GB" dirty="0"/>
+          </a:p>
+        </p:txBody>
+      </p:sp>
+      <p:sp>
+        <p:nvSpPr>
+          <p:cNvPr id="11" name="Rectangle: Rounded Corners 10">
+            <a:extLst>
+              <a:ext uri="{FF2B5EF4-FFF2-40B4-BE49-F238E27FC236}">
+                <a16:creationId xmlns:a16="http://schemas.microsoft.com/office/drawing/2014/main" id="{B0354E3A-B5B8-B2CD-9561-457CC7AF49DA}"/>
+              </a:ext>
+            </a:extLst>
+          </p:cNvPr>
+          <p:cNvSpPr/>
+          <p:nvPr/>
+        </p:nvSpPr>
+        <p:spPr>
+          <a:xfrm>
+            <a:off x="4076993" y="141723"/>
+            <a:ext cx="990012" cy="400110"/>
+          </a:xfrm>
+          <a:prstGeom prst="roundRect">
+            <a:avLst/>
+          </a:prstGeom>
+          <a:noFill/>
+          <a:ln w="9525">
+            <a:solidFill>
+              <a:srgbClr val="E3E9ED"/>
+            </a:solidFill>
+          </a:ln>
+        </p:spPr>
+        <p:style>
+          <a:lnRef idx="2">
+            <a:schemeClr val="accent1">
+              <a:shade val="15000"/>
+            </a:schemeClr>
+          </a:lnRef>
+          <a:fillRef idx="1">
+            <a:schemeClr val="accent1"/>
+          </a:fillRef>
+          <a:effectRef idx="0">
+            <a:schemeClr val="accent1"/>
+          </a:effectRef>
+          <a:fontRef idx="minor">
+            <a:schemeClr val="lt1"/>
+          </a:fontRef>
+        </p:style>
+        <p:txBody>
+          <a:bodyPr rtlCol="0" anchor="ctr"/>
+          <a:lstStyle/>
+          <a:p>
+            <a:pPr algn="ctr"/>
+            <a:r>
+              <a:rPr lang="en-GB" sz="1600" dirty="0">
+                <a:latin typeface="Aptos Mono" panose="020B0009020202020204" pitchFamily="49" charset="0"/>
+              </a:rPr>
+              <a:t>home</a:t>
+            </a:r>
+          </a:p>
+        </p:txBody>
+      </p:sp>
+      <p:sp>
+        <p:nvSpPr>
+          <p:cNvPr id="29" name="TextBox 28">
+            <a:extLst>
+              <a:ext uri="{FF2B5EF4-FFF2-40B4-BE49-F238E27FC236}">
+                <a16:creationId xmlns:a16="http://schemas.microsoft.com/office/drawing/2014/main" id="{5CD68176-74AD-C22F-3695-0D55AE085A2E}"/>
+              </a:ext>
+            </a:extLst>
+          </p:cNvPr>
+          <p:cNvSpPr txBox="1"/>
+          <p:nvPr/>
+        </p:nvSpPr>
+        <p:spPr>
+          <a:xfrm>
+            <a:off x="1691968" y="1131734"/>
+            <a:ext cx="5760063" cy="646331"/>
+          </a:xfrm>
+          <a:prstGeom prst="rect">
+            <a:avLst/>
+          </a:prstGeom>
+          <a:noFill/>
+          <a:ln cap="flat">
+            <a:solidFill>
+              <a:srgbClr val="E3E9ED"/>
+            </a:solidFill>
+            <a:round/>
+          </a:ln>
+        </p:spPr>
+        <p:txBody>
+          <a:bodyPr wrap="square" rtlCol="0">
+            <a:spAutoFit/>
+          </a:bodyPr>
+          <a:lstStyle/>
+          <a:p>
+            <a:pPr algn="ctr"/>
+            <a:r>
+              <a:rPr lang="en-GB" sz="3600" dirty="0">
+                <a:solidFill>
+                  <a:srgbClr val="E3E9ED"/>
+                </a:solidFill>
+                <a:latin typeface="Aptos Mono" panose="020F0502020204030204" pitchFamily="49" charset="0"/>
+              </a:rPr>
+              <a:t>personal projects</a:t>
+            </a:r>
+          </a:p>
+        </p:txBody>
+      </p:sp>
+      <p:sp>
+        <p:nvSpPr>
+          <p:cNvPr id="49" name="Rectangle 48">
+            <a:extLst>
+              <a:ext uri="{FF2B5EF4-FFF2-40B4-BE49-F238E27FC236}">
+                <a16:creationId xmlns:a16="http://schemas.microsoft.com/office/drawing/2014/main" id="{B32ADD89-4C72-3752-4392-1D2734DAF995}"/>
+              </a:ext>
+            </a:extLst>
+          </p:cNvPr>
+          <p:cNvSpPr/>
+          <p:nvPr/>
+        </p:nvSpPr>
+        <p:spPr>
+          <a:xfrm>
+            <a:off x="8982049" y="51722"/>
+            <a:ext cx="90001" cy="1440016"/>
+          </a:xfrm>
+          <a:prstGeom prst="rect">
+            <a:avLst/>
+          </a:prstGeom>
+          <a:solidFill>
+            <a:srgbClr val="E3E9ED"/>
+          </a:solidFill>
+        </p:spPr>
+        <p:style>
+          <a:lnRef idx="2">
+            <a:schemeClr val="accent1">
+              <a:shade val="15000"/>
+            </a:schemeClr>
+          </a:lnRef>
+          <a:fillRef idx="1">
+            <a:schemeClr val="accent1"/>
+          </a:fillRef>
+          <a:effectRef idx="0">
+            <a:schemeClr val="accent1"/>
+          </a:effectRef>
+          <a:fontRef idx="minor">
+            <a:schemeClr val="lt1"/>
+          </a:fontRef>
+        </p:style>
+        <p:txBody>
+          <a:bodyPr rtlCol="0" anchor="ctr"/>
+          <a:lstStyle/>
+          <a:p>
+            <a:pPr algn="ctr"/>
+            <a:endParaRPr lang="en-GB" dirty="0"/>
+          </a:p>
+        </p:txBody>
+      </p:sp>
+      <p:sp>
+        <p:nvSpPr>
+          <p:cNvPr id="2" name="TextBox 1">
+            <a:extLst>
+              <a:ext uri="{FF2B5EF4-FFF2-40B4-BE49-F238E27FC236}">
+                <a16:creationId xmlns:a16="http://schemas.microsoft.com/office/drawing/2014/main" id="{78E9BE3F-A99C-B7D1-3797-857235E8A3FD}"/>
+              </a:ext>
+            </a:extLst>
+          </p:cNvPr>
+          <p:cNvSpPr txBox="1"/>
+          <p:nvPr/>
+        </p:nvSpPr>
+        <p:spPr>
+          <a:xfrm>
+            <a:off x="72232" y="-629879"/>
+            <a:ext cx="1130507" cy="189924"/>
+          </a:xfrm>
+          <a:prstGeom prst="rect">
+            <a:avLst/>
+          </a:prstGeom>
+          <a:noFill/>
+          <a:ln w="38100">
+            <a:solidFill>
+              <a:srgbClr val="FFC000"/>
+            </a:solidFill>
+          </a:ln>
+        </p:spPr>
+        <p:txBody>
+          <a:bodyPr wrap="square" rtlCol="0">
+            <a:spAutoFit/>
+          </a:bodyPr>
+          <a:lstStyle/>
+          <a:p>
+            <a:r>
+              <a:rPr lang="en-GB" sz="634" dirty="0">
+                <a:solidFill>
+                  <a:schemeClr val="bg1"/>
+                </a:solidFill>
+              </a:rPr>
+              <a:t>Personal Projects</a:t>
+            </a:r>
+          </a:p>
+        </p:txBody>
+      </p:sp>
+      <p:sp>
+        <p:nvSpPr>
+          <p:cNvPr id="7" name="Rectangle: Rounded Corners 6">
+            <a:extLst>
+              <a:ext uri="{FF2B5EF4-FFF2-40B4-BE49-F238E27FC236}">
+                <a16:creationId xmlns:a16="http://schemas.microsoft.com/office/drawing/2014/main" id="{9718EAAE-CE18-8885-2C05-DF9ED1697D14}"/>
+              </a:ext>
+            </a:extLst>
+          </p:cNvPr>
+          <p:cNvSpPr/>
+          <p:nvPr/>
+        </p:nvSpPr>
+        <p:spPr>
+          <a:xfrm>
+            <a:off x="1691966" y="2094463"/>
+            <a:ext cx="5760063" cy="2159517"/>
+          </a:xfrm>
+          <a:prstGeom prst="roundRect">
+            <a:avLst>
+              <a:gd name="adj" fmla="val 7003"/>
+            </a:avLst>
+          </a:prstGeom>
+          <a:noFill/>
+          <a:ln w="9525">
+            <a:solidFill>
+              <a:srgbClr val="E3E9ED"/>
+            </a:solidFill>
+          </a:ln>
+        </p:spPr>
+        <p:style>
+          <a:lnRef idx="2">
+            <a:schemeClr val="accent1">
+              <a:shade val="15000"/>
+            </a:schemeClr>
+          </a:lnRef>
+          <a:fillRef idx="1">
+            <a:schemeClr val="accent1"/>
+          </a:fillRef>
+          <a:effectRef idx="0">
+            <a:schemeClr val="accent1"/>
+          </a:effectRef>
+          <a:fontRef idx="minor">
+            <a:schemeClr val="lt1"/>
+          </a:fontRef>
+        </p:style>
+        <p:txBody>
+          <a:bodyPr rtlCol="0" anchor="t"/>
+          <a:lstStyle/>
+          <a:p>
+            <a:pPr algn="r"/>
+            <a:r>
+              <a:rPr lang="en-GB" sz="1600" dirty="0">
+                <a:solidFill>
+                  <a:srgbClr val="E3E9ED"/>
+                </a:solidFill>
+                <a:latin typeface="Aptos Mono" panose="020B0009020202020204" pitchFamily="49" charset="0"/>
+              </a:rPr>
+              <a:t>this portfolio website</a:t>
+            </a:r>
+          </a:p>
+          <a:p>
+            <a:endParaRPr lang="en-GB" sz="1000" dirty="0">
+              <a:solidFill>
+                <a:srgbClr val="E3E9ED"/>
+              </a:solidFill>
+              <a:latin typeface="Aptos Mono" panose="020B0009020202020204" pitchFamily="49" charset="0"/>
+            </a:endParaRPr>
+          </a:p>
+          <a:p>
+            <a:pPr algn="r"/>
+            <a:r>
+              <a:rPr lang="en-GB" sz="1000" dirty="0">
+                <a:solidFill>
+                  <a:srgbClr val="E3E9ED"/>
+                </a:solidFill>
+                <a:latin typeface="Aptos Mono" panose="020B0009020202020204" pitchFamily="49" charset="0"/>
+              </a:rPr>
+              <a:t>full-stack developer course</a:t>
+            </a:r>
+          </a:p>
+          <a:p>
+            <a:pPr algn="r"/>
+            <a:r>
+              <a:rPr lang="en-GB" sz="1000" dirty="0">
+                <a:solidFill>
+                  <a:srgbClr val="E3E9ED"/>
+                </a:solidFill>
+                <a:latin typeface="Aptos Mono" panose="020B0009020202020204" pitchFamily="49" charset="0"/>
+              </a:rPr>
+              <a:t>codecademy</a:t>
+            </a:r>
+          </a:p>
+          <a:p>
+            <a:pPr algn="r"/>
+            <a:endParaRPr lang="en-GB" sz="1000" dirty="0">
+              <a:solidFill>
+                <a:srgbClr val="E3E9ED"/>
+              </a:solidFill>
+              <a:latin typeface="Aptos Mono" panose="020B0009020202020204" pitchFamily="49" charset="0"/>
+            </a:endParaRPr>
+          </a:p>
+        </p:txBody>
+      </p:sp>
+      <p:sp>
+        <p:nvSpPr>
+          <p:cNvPr id="18" name="Rectangle: Rounded Corners 17">
+            <a:extLst>
+              <a:ext uri="{FF2B5EF4-FFF2-40B4-BE49-F238E27FC236}">
+                <a16:creationId xmlns:a16="http://schemas.microsoft.com/office/drawing/2014/main" id="{5DF8A7D4-6663-93D3-517F-9B529F0BBEBC}"/>
+              </a:ext>
+            </a:extLst>
+          </p:cNvPr>
+          <p:cNvSpPr/>
+          <p:nvPr/>
+        </p:nvSpPr>
+        <p:spPr>
+          <a:xfrm>
+            <a:off x="1691966" y="4371771"/>
+            <a:ext cx="5760063" cy="771116"/>
+          </a:xfrm>
+          <a:prstGeom prst="roundRect">
+            <a:avLst>
+              <a:gd name="adj" fmla="val 18221"/>
+            </a:avLst>
+          </a:prstGeom>
+          <a:noFill/>
+          <a:ln w="9525">
+            <a:solidFill>
+              <a:srgbClr val="E3E9ED"/>
+            </a:solidFill>
+          </a:ln>
+        </p:spPr>
+        <p:style>
+          <a:lnRef idx="2">
+            <a:schemeClr val="accent1">
+              <a:shade val="15000"/>
+            </a:schemeClr>
+          </a:lnRef>
+          <a:fillRef idx="1">
+            <a:schemeClr val="accent1"/>
+          </a:fillRef>
+          <a:effectRef idx="0">
+            <a:schemeClr val="accent1"/>
+          </a:effectRef>
+          <a:fontRef idx="minor">
+            <a:schemeClr val="lt1"/>
+          </a:fontRef>
+        </p:style>
+        <p:txBody>
+          <a:bodyPr rtlCol="0" anchor="t"/>
+          <a:lstStyle/>
+          <a:p>
+            <a:pPr algn="r"/>
+            <a:endParaRPr lang="en-GB" sz="1000" dirty="0">
+              <a:solidFill>
+                <a:srgbClr val="E3E9ED"/>
+              </a:solidFill>
+            </a:endParaRPr>
+          </a:p>
+        </p:txBody>
+      </p:sp>
+      <p:sp>
+        <p:nvSpPr>
+          <p:cNvPr id="19" name="TextBox 18">
+            <a:extLst>
+              <a:ext uri="{FF2B5EF4-FFF2-40B4-BE49-F238E27FC236}">
+                <a16:creationId xmlns:a16="http://schemas.microsoft.com/office/drawing/2014/main" id="{852CD164-1A51-4A7A-4759-99FB290FAF54}"/>
+              </a:ext>
+            </a:extLst>
+          </p:cNvPr>
+          <p:cNvSpPr txBox="1"/>
+          <p:nvPr/>
+        </p:nvSpPr>
+        <p:spPr>
+          <a:xfrm>
+            <a:off x="5022005" y="-519417"/>
+            <a:ext cx="1710019" cy="287515"/>
+          </a:xfrm>
+          <a:prstGeom prst="rect">
+            <a:avLst/>
+          </a:prstGeom>
+          <a:noFill/>
+          <a:ln w="38100">
+            <a:solidFill>
+              <a:srgbClr val="FFC000"/>
+            </a:solidFill>
+          </a:ln>
+        </p:spPr>
+        <p:txBody>
+          <a:bodyPr wrap="square" rtlCol="0">
+            <a:spAutoFit/>
+          </a:bodyPr>
+          <a:lstStyle/>
+          <a:p>
+            <a:r>
+              <a:rPr lang="en-GB" sz="634" dirty="0">
+                <a:solidFill>
+                  <a:schemeClr val="bg1"/>
+                </a:solidFill>
+              </a:rPr>
+              <a:t>Insert background image when the home page is finished</a:t>
+            </a:r>
+          </a:p>
+        </p:txBody>
+      </p:sp>
+      <p:cxnSp>
+        <p:nvCxnSpPr>
+          <p:cNvPr id="20" name="Connector: Elbow 19">
+            <a:extLst>
+              <a:ext uri="{FF2B5EF4-FFF2-40B4-BE49-F238E27FC236}">
+                <a16:creationId xmlns:a16="http://schemas.microsoft.com/office/drawing/2014/main" id="{078C2F80-5C6E-073B-4F75-AE9B860AE615}"/>
+              </a:ext>
+            </a:extLst>
+          </p:cNvPr>
+          <p:cNvCxnSpPr>
+            <a:cxnSpLocks/>
+            <a:stCxn id="19" idx="3"/>
+            <a:endCxn id="7" idx="3"/>
+          </p:cNvCxnSpPr>
+          <p:nvPr/>
+        </p:nvCxnSpPr>
+        <p:spPr>
+          <a:xfrm>
+            <a:off x="6732024" y="-375659"/>
+            <a:ext cx="720005" cy="3549881"/>
+          </a:xfrm>
+          <a:prstGeom prst="bentConnector3">
+            <a:avLst>
+              <a:gd name="adj1" fmla="val 131750"/>
+            </a:avLst>
+          </a:prstGeom>
+          <a:ln w="25400">
+            <a:solidFill>
+              <a:srgbClr val="FFC000"/>
+            </a:solidFill>
+            <a:tailEnd type="triangle"/>
+          </a:ln>
+        </p:spPr>
+        <p:style>
+          <a:lnRef idx="2">
+            <a:schemeClr val="accent1"/>
+          </a:lnRef>
+          <a:fillRef idx="0">
+            <a:schemeClr val="accent1"/>
+          </a:fillRef>
+          <a:effectRef idx="1">
+            <a:schemeClr val="accent1"/>
+          </a:effectRef>
+          <a:fontRef idx="minor">
+            <a:schemeClr val="tx1"/>
+          </a:fontRef>
+        </p:style>
+      </p:cxnSp>
+      <p:cxnSp>
+        <p:nvCxnSpPr>
+          <p:cNvPr id="23" name="Connector: Elbow 22">
+            <a:extLst>
+              <a:ext uri="{FF2B5EF4-FFF2-40B4-BE49-F238E27FC236}">
+                <a16:creationId xmlns:a16="http://schemas.microsoft.com/office/drawing/2014/main" id="{BC64D4EF-D486-8F35-E710-AA8E2EFE81B2}"/>
+              </a:ext>
+            </a:extLst>
+          </p:cNvPr>
+          <p:cNvCxnSpPr>
+            <a:cxnSpLocks/>
+            <a:stCxn id="18" idx="3"/>
+            <a:endCxn id="26" idx="0"/>
+          </p:cNvCxnSpPr>
+          <p:nvPr/>
+        </p:nvCxnSpPr>
+        <p:spPr>
+          <a:xfrm>
+            <a:off x="7452029" y="4757329"/>
+            <a:ext cx="405008" cy="1152500"/>
+          </a:xfrm>
+          <a:prstGeom prst="bentConnector2">
+            <a:avLst/>
+          </a:prstGeom>
+          <a:ln w="25400">
+            <a:solidFill>
+              <a:srgbClr val="FFC000"/>
+            </a:solidFill>
+            <a:tailEnd type="triangle"/>
+          </a:ln>
+        </p:spPr>
+        <p:style>
+          <a:lnRef idx="2">
+            <a:schemeClr val="accent1"/>
+          </a:lnRef>
+          <a:fillRef idx="0">
+            <a:schemeClr val="accent1"/>
+          </a:fillRef>
+          <a:effectRef idx="1">
+            <a:schemeClr val="accent1"/>
+          </a:effectRef>
+          <a:fontRef idx="minor">
+            <a:schemeClr val="tx1"/>
+          </a:fontRef>
+        </p:style>
+      </p:cxnSp>
+      <p:sp>
+        <p:nvSpPr>
+          <p:cNvPr id="26" name="TextBox 25">
+            <a:extLst>
+              <a:ext uri="{FF2B5EF4-FFF2-40B4-BE49-F238E27FC236}">
+                <a16:creationId xmlns:a16="http://schemas.microsoft.com/office/drawing/2014/main" id="{5E316AA8-5E6F-3DFE-1372-923F2E6C34F0}"/>
+              </a:ext>
+            </a:extLst>
+          </p:cNvPr>
+          <p:cNvSpPr txBox="1"/>
+          <p:nvPr/>
+        </p:nvSpPr>
+        <p:spPr>
+          <a:xfrm>
+            <a:off x="7002027" y="5909829"/>
+            <a:ext cx="1710019" cy="287515"/>
+          </a:xfrm>
+          <a:prstGeom prst="rect">
+            <a:avLst/>
+          </a:prstGeom>
+          <a:noFill/>
+          <a:ln w="38100">
+            <a:solidFill>
+              <a:srgbClr val="FFC000"/>
+            </a:solidFill>
+          </a:ln>
+        </p:spPr>
+        <p:txBody>
+          <a:bodyPr wrap="square" rtlCol="0">
+            <a:spAutoFit/>
+          </a:bodyPr>
+          <a:lstStyle/>
+          <a:p>
+            <a:r>
+              <a:rPr lang="en-GB" sz="634" dirty="0">
+                <a:solidFill>
+                  <a:schemeClr val="bg1"/>
+                </a:solidFill>
+              </a:rPr>
+              <a:t>Template for next section.</a:t>
+            </a:r>
+          </a:p>
+          <a:p>
+            <a:r>
+              <a:rPr lang="en-GB" sz="634" dirty="0">
+                <a:solidFill>
+                  <a:schemeClr val="bg1"/>
+                </a:solidFill>
+              </a:rPr>
+              <a:t>Scroll to next slide to see detail. </a:t>
+            </a:r>
+          </a:p>
+        </p:txBody>
+      </p:sp>
+    </p:spTree>
+    <p:extLst>
+      <p:ext uri="{BB962C8B-B14F-4D97-AF65-F5344CB8AC3E}">
+        <p14:creationId xmlns:p14="http://schemas.microsoft.com/office/powerpoint/2010/main" val="1371256383"/>
+      </p:ext>
+    </p:extLst>
+  </p:cSld>
+  <p:clrMapOvr>
+    <a:masterClrMapping/>
+  </p:clrMapOvr>
+</p:sld>
+</file>
+
+<file path=ppt/slides/slide7.xml><?xml version="1.0" encoding="utf-8"?>
+<p:sld xmlns:a="http://schemas.openxmlformats.org/drawingml/2006/main" xmlns:r="http://schemas.openxmlformats.org/officeDocument/2006/relationships" xmlns:p="http://schemas.openxmlformats.org/presentationml/2006/main">
+  <p:cSld>
+    <p:spTree>
+      <p:nvGrpSpPr>
+        <p:cNvPr id="1" name=""/>
+        <p:cNvGrpSpPr/>
+        <p:nvPr/>
+      </p:nvGrpSpPr>
+      <p:grpSpPr>
+        <a:xfrm>
+          <a:off x="0" y="0"/>
+          <a:ext cx="0" cy="0"/>
+          <a:chOff x="0" y="0"/>
+          <a:chExt cx="0" cy="0"/>
+        </a:xfrm>
+      </p:grpSpPr>
+      <p:pic>
+        <p:nvPicPr>
+          <p:cNvPr id="17" name="Picture 16" descr="A aerial view of a football field&#10;&#10;Description automatically generated">
+            <a:extLst>
+              <a:ext uri="{FF2B5EF4-FFF2-40B4-BE49-F238E27FC236}">
+                <a16:creationId xmlns:a16="http://schemas.microsoft.com/office/drawing/2014/main" id="{E765C726-91B9-C2F7-7776-BD13DEC6FB65}"/>
+              </a:ext>
+            </a:extLst>
+          </p:cNvPr>
+          <p:cNvPicPr>
+            <a:picLocks noChangeAspect="1"/>
+          </p:cNvPicPr>
+          <p:nvPr/>
+        </p:nvPicPr>
+        <p:blipFill rotWithShape="1">
+          <a:blip r:embed="rId3">
+            <a:extLst>
+              <a:ext uri="{28A0092B-C50C-407E-A947-70E740481C1C}">
+                <a14:useLocalDpi xmlns:a14="http://schemas.microsoft.com/office/drawing/2010/main" val="0"/>
+              </a:ext>
+            </a:extLst>
+          </a:blip>
+          <a:srcRect l="-30" t="34181" r="30" b="34181"/>
+          <a:stretch/>
+        </p:blipFill>
+        <p:spPr>
+          <a:xfrm>
+            <a:off x="0" y="0"/>
+            <a:ext cx="9156100" cy="5143500"/>
+          </a:xfrm>
+          <a:prstGeom prst="rect">
+            <a:avLst/>
+          </a:prstGeom>
+        </p:spPr>
+      </p:pic>
+      <p:sp>
+        <p:nvSpPr>
+          <p:cNvPr id="12" name="Rectangle 11">
+            <a:extLst>
+              <a:ext uri="{FF2B5EF4-FFF2-40B4-BE49-F238E27FC236}">
+                <a16:creationId xmlns:a16="http://schemas.microsoft.com/office/drawing/2014/main" id="{BAD760F3-3A96-2311-362E-D76774272972}"/>
+              </a:ext>
+            </a:extLst>
+          </p:cNvPr>
+          <p:cNvSpPr>
+            <a:spLocks noGrp="1" noRot="1" noMove="1" noResize="1" noEditPoints="1" noAdjustHandles="1" noChangeArrowheads="1" noChangeShapeType="1"/>
+          </p:cNvSpPr>
+          <p:nvPr/>
+        </p:nvSpPr>
+        <p:spPr>
+          <a:xfrm>
+            <a:off x="0" y="-24601"/>
+            <a:ext cx="9156101" cy="5167487"/>
+          </a:xfrm>
+          <a:prstGeom prst="rect">
+            <a:avLst/>
+          </a:prstGeom>
+          <a:gradFill flip="none" rotWithShape="1">
+            <a:gsLst>
+              <a:gs pos="0">
+                <a:srgbClr val="171D41">
+                  <a:alpha val="80000"/>
+                </a:srgbClr>
+              </a:gs>
+              <a:gs pos="100000">
+                <a:srgbClr val="171D41">
+                  <a:alpha val="80000"/>
+                </a:srgbClr>
+              </a:gs>
+            </a:gsLst>
+            <a:lin ang="16200000" scaled="1"/>
+            <a:tileRect/>
+          </a:gradFill>
+          <a:ln>
+            <a:noFill/>
+          </a:ln>
+        </p:spPr>
+        <p:style>
+          <a:lnRef idx="2">
+            <a:schemeClr val="accent1">
+              <a:shade val="15000"/>
+            </a:schemeClr>
+          </a:lnRef>
+          <a:fillRef idx="1">
+            <a:schemeClr val="accent1"/>
+          </a:fillRef>
+          <a:effectRef idx="0">
+            <a:schemeClr val="accent1"/>
+          </a:effectRef>
+          <a:fontRef idx="minor">
+            <a:schemeClr val="lt1"/>
+          </a:fontRef>
+        </p:style>
+        <p:txBody>
+          <a:bodyPr rtlCol="0" anchor="ctr"/>
+          <a:lstStyle/>
+          <a:p>
+            <a:pPr algn="ctr"/>
+            <a:endParaRPr lang="en-GB" dirty="0"/>
+          </a:p>
+        </p:txBody>
+      </p:sp>
+      <p:sp>
+        <p:nvSpPr>
+          <p:cNvPr id="11" name="Rectangle: Rounded Corners 10">
+            <a:extLst>
+              <a:ext uri="{FF2B5EF4-FFF2-40B4-BE49-F238E27FC236}">
+                <a16:creationId xmlns:a16="http://schemas.microsoft.com/office/drawing/2014/main" id="{B0354E3A-B5B8-B2CD-9561-457CC7AF49DA}"/>
+              </a:ext>
+            </a:extLst>
+          </p:cNvPr>
+          <p:cNvSpPr/>
+          <p:nvPr/>
+        </p:nvSpPr>
+        <p:spPr>
+          <a:xfrm>
+            <a:off x="4076993" y="141723"/>
+            <a:ext cx="990012" cy="400110"/>
+          </a:xfrm>
+          <a:prstGeom prst="roundRect">
+            <a:avLst/>
+          </a:prstGeom>
+          <a:noFill/>
+          <a:ln w="9525">
+            <a:solidFill>
+              <a:srgbClr val="E3E9ED"/>
+            </a:solidFill>
+          </a:ln>
+        </p:spPr>
+        <p:style>
+          <a:lnRef idx="2">
+            <a:schemeClr val="accent1">
+              <a:shade val="15000"/>
+            </a:schemeClr>
+          </a:lnRef>
+          <a:fillRef idx="1">
+            <a:schemeClr val="accent1"/>
+          </a:fillRef>
+          <a:effectRef idx="0">
+            <a:schemeClr val="accent1"/>
+          </a:effectRef>
+          <a:fontRef idx="minor">
+            <a:schemeClr val="lt1"/>
+          </a:fontRef>
+        </p:style>
+        <p:txBody>
+          <a:bodyPr rtlCol="0" anchor="ctr"/>
+          <a:lstStyle/>
+          <a:p>
+            <a:pPr algn="ctr"/>
+            <a:r>
+              <a:rPr lang="en-GB" sz="1600" dirty="0">
+                <a:latin typeface="Aptos Mono" panose="020B0009020202020204" pitchFamily="49" charset="0"/>
+              </a:rPr>
+              <a:t>home</a:t>
+            </a:r>
+          </a:p>
+        </p:txBody>
+      </p:sp>
+      <p:sp>
+        <p:nvSpPr>
+          <p:cNvPr id="49" name="Rectangle 48">
+            <a:extLst>
+              <a:ext uri="{FF2B5EF4-FFF2-40B4-BE49-F238E27FC236}">
+                <a16:creationId xmlns:a16="http://schemas.microsoft.com/office/drawing/2014/main" id="{B32ADD89-4C72-3752-4392-1D2734DAF995}"/>
+              </a:ext>
+            </a:extLst>
+          </p:cNvPr>
+          <p:cNvSpPr/>
+          <p:nvPr/>
+        </p:nvSpPr>
+        <p:spPr>
+          <a:xfrm>
+            <a:off x="8982049" y="51722"/>
+            <a:ext cx="90001" cy="1440016"/>
+          </a:xfrm>
+          <a:prstGeom prst="rect">
+            <a:avLst/>
+          </a:prstGeom>
+          <a:solidFill>
+            <a:srgbClr val="E3E9ED"/>
+          </a:solidFill>
+        </p:spPr>
+        <p:style>
+          <a:lnRef idx="2">
+            <a:schemeClr val="accent1">
+              <a:shade val="15000"/>
+            </a:schemeClr>
+          </a:lnRef>
+          <a:fillRef idx="1">
+            <a:schemeClr val="accent1"/>
+          </a:fillRef>
+          <a:effectRef idx="0">
+            <a:schemeClr val="accent1"/>
+          </a:effectRef>
+          <a:fontRef idx="minor">
+            <a:schemeClr val="lt1"/>
+          </a:fontRef>
+        </p:style>
+        <p:txBody>
+          <a:bodyPr rtlCol="0" anchor="ctr"/>
+          <a:lstStyle/>
+          <a:p>
+            <a:pPr algn="ctr"/>
+            <a:endParaRPr lang="en-GB" dirty="0"/>
+          </a:p>
+        </p:txBody>
+      </p:sp>
+      <p:sp>
+        <p:nvSpPr>
+          <p:cNvPr id="2" name="TextBox 1">
+            <a:extLst>
+              <a:ext uri="{FF2B5EF4-FFF2-40B4-BE49-F238E27FC236}">
+                <a16:creationId xmlns:a16="http://schemas.microsoft.com/office/drawing/2014/main" id="{78E9BE3F-A99C-B7D1-3797-857235E8A3FD}"/>
+              </a:ext>
+            </a:extLst>
+          </p:cNvPr>
+          <p:cNvSpPr txBox="1"/>
+          <p:nvPr/>
+        </p:nvSpPr>
+        <p:spPr>
+          <a:xfrm>
+            <a:off x="72232" y="-629879"/>
+            <a:ext cx="1130507" cy="189924"/>
+          </a:xfrm>
+          <a:prstGeom prst="rect">
+            <a:avLst/>
+          </a:prstGeom>
+          <a:noFill/>
+          <a:ln w="38100">
+            <a:solidFill>
+              <a:srgbClr val="FFC000"/>
+            </a:solidFill>
+          </a:ln>
+        </p:spPr>
+        <p:txBody>
+          <a:bodyPr wrap="square" rtlCol="0">
+            <a:spAutoFit/>
+          </a:bodyPr>
+          <a:lstStyle/>
+          <a:p>
+            <a:r>
+              <a:rPr lang="en-GB" sz="634" dirty="0">
+                <a:solidFill>
+                  <a:schemeClr val="bg1"/>
+                </a:solidFill>
+              </a:rPr>
+              <a:t>Personal Projects</a:t>
+            </a:r>
+          </a:p>
+        </p:txBody>
+      </p:sp>
+      <p:sp>
+        <p:nvSpPr>
+          <p:cNvPr id="19" name="Rectangle: Rounded Corners 18">
+            <a:extLst>
+              <a:ext uri="{FF2B5EF4-FFF2-40B4-BE49-F238E27FC236}">
+                <a16:creationId xmlns:a16="http://schemas.microsoft.com/office/drawing/2014/main" id="{0F65DFDC-4455-562C-29E8-0939FF0FDF32}"/>
+              </a:ext>
+            </a:extLst>
+          </p:cNvPr>
+          <p:cNvSpPr/>
+          <p:nvPr/>
+        </p:nvSpPr>
+        <p:spPr>
+          <a:xfrm>
+            <a:off x="1691966" y="681729"/>
+            <a:ext cx="5760063" cy="2159517"/>
+          </a:xfrm>
+          <a:prstGeom prst="roundRect">
+            <a:avLst>
+              <a:gd name="adj" fmla="val 7003"/>
+            </a:avLst>
+          </a:prstGeom>
+          <a:noFill/>
+          <a:ln w="9525">
+            <a:solidFill>
+              <a:srgbClr val="E3E9ED"/>
+            </a:solidFill>
+          </a:ln>
+        </p:spPr>
+        <p:style>
+          <a:lnRef idx="2">
+            <a:schemeClr val="accent1">
+              <a:shade val="15000"/>
+            </a:schemeClr>
+          </a:lnRef>
+          <a:fillRef idx="1">
+            <a:schemeClr val="accent1"/>
+          </a:fillRef>
+          <a:effectRef idx="0">
+            <a:schemeClr val="accent1"/>
+          </a:effectRef>
+          <a:fontRef idx="minor">
+            <a:schemeClr val="lt1"/>
+          </a:fontRef>
+        </p:style>
+        <p:txBody>
+          <a:bodyPr rtlCol="0" anchor="t"/>
+          <a:lstStyle/>
+          <a:p>
+            <a:pPr algn="r"/>
+            <a:r>
+              <a:rPr lang="en-GB" sz="1600" dirty="0">
+                <a:solidFill>
+                  <a:srgbClr val="E3E9ED"/>
+                </a:solidFill>
+                <a:latin typeface="Aptos Mono" panose="020B0009020202020204" pitchFamily="49" charset="0"/>
+              </a:rPr>
+              <a:t>html + css </a:t>
+            </a:r>
+          </a:p>
+          <a:p>
+            <a:endParaRPr lang="en-GB" sz="1000" dirty="0">
+              <a:solidFill>
+                <a:srgbClr val="E3E9ED"/>
+              </a:solidFill>
+              <a:latin typeface="Aptos Mono" panose="020B0009020202020204" pitchFamily="49" charset="0"/>
+            </a:endParaRPr>
+          </a:p>
+          <a:p>
+            <a:pPr algn="r"/>
+            <a:r>
+              <a:rPr lang="en-GB" sz="1000" dirty="0">
+                <a:solidFill>
+                  <a:srgbClr val="E3E9ED"/>
+                </a:solidFill>
+                <a:latin typeface="Aptos Mono" panose="020B0009020202020204" pitchFamily="49" charset="0"/>
+              </a:rPr>
+              <a:t>full-stack developer course</a:t>
+            </a:r>
+          </a:p>
+          <a:p>
+            <a:pPr algn="r"/>
+            <a:r>
+              <a:rPr lang="en-GB" sz="1000" dirty="0">
+                <a:solidFill>
+                  <a:srgbClr val="E3E9ED"/>
+                </a:solidFill>
+                <a:latin typeface="Aptos Mono" panose="020B0009020202020204" pitchFamily="49" charset="0"/>
+              </a:rPr>
+              <a:t>codecademy</a:t>
+            </a:r>
+          </a:p>
+          <a:p>
+            <a:pPr algn="r"/>
+            <a:endParaRPr lang="en-GB" sz="1000" dirty="0">
+              <a:solidFill>
+                <a:srgbClr val="E3E9ED"/>
+              </a:solidFill>
+              <a:latin typeface="Aptos Mono" panose="020B0009020202020204" pitchFamily="49" charset="0"/>
+            </a:endParaRPr>
+          </a:p>
+        </p:txBody>
+      </p:sp>
+      <p:sp>
+        <p:nvSpPr>
+          <p:cNvPr id="20" name="Rectangle: Rounded Corners 19">
+            <a:extLst>
+              <a:ext uri="{FF2B5EF4-FFF2-40B4-BE49-F238E27FC236}">
+                <a16:creationId xmlns:a16="http://schemas.microsoft.com/office/drawing/2014/main" id="{9BC47CE2-76C1-7597-DAD7-EBD79A0E34FA}"/>
+              </a:ext>
+            </a:extLst>
+          </p:cNvPr>
+          <p:cNvSpPr/>
+          <p:nvPr/>
+        </p:nvSpPr>
+        <p:spPr>
+          <a:xfrm>
+            <a:off x="1691966" y="2897574"/>
+            <a:ext cx="5760063" cy="2159517"/>
+          </a:xfrm>
+          <a:prstGeom prst="roundRect">
+            <a:avLst>
+              <a:gd name="adj" fmla="val 7003"/>
+            </a:avLst>
+          </a:prstGeom>
+          <a:noFill/>
+          <a:ln w="9525">
+            <a:solidFill>
+              <a:srgbClr val="E3E9ED"/>
+            </a:solidFill>
+          </a:ln>
+        </p:spPr>
+        <p:style>
+          <a:lnRef idx="2">
+            <a:schemeClr val="accent1">
+              <a:shade val="15000"/>
+            </a:schemeClr>
+          </a:lnRef>
+          <a:fillRef idx="1">
+            <a:schemeClr val="accent1"/>
+          </a:fillRef>
+          <a:effectRef idx="0">
+            <a:schemeClr val="accent1"/>
+          </a:effectRef>
+          <a:fontRef idx="minor">
+            <a:schemeClr val="lt1"/>
+          </a:fontRef>
+        </p:style>
+        <p:txBody>
+          <a:bodyPr rtlCol="0" anchor="t"/>
+          <a:lstStyle/>
+          <a:p>
+            <a:pPr algn="r"/>
+            <a:r>
+              <a:rPr lang="en-GB" sz="1600" dirty="0" err="1">
+                <a:solidFill>
+                  <a:srgbClr val="E3E9ED"/>
+                </a:solidFill>
+                <a:latin typeface="Aptos Mono" panose="020B0009020202020204" pitchFamily="49" charset="0"/>
+              </a:rPr>
+              <a:t>javascript</a:t>
+            </a:r>
+            <a:endParaRPr lang="en-GB" sz="1600" dirty="0">
+              <a:solidFill>
+                <a:srgbClr val="E3E9ED"/>
+              </a:solidFill>
+              <a:latin typeface="Aptos Mono" panose="020B0009020202020204" pitchFamily="49" charset="0"/>
+            </a:endParaRPr>
+          </a:p>
+          <a:p>
+            <a:pPr algn="r"/>
+            <a:endParaRPr lang="en-GB" sz="1000" dirty="0">
+              <a:solidFill>
+                <a:srgbClr val="E3E9ED"/>
+              </a:solidFill>
+              <a:latin typeface="Aptos Mono" panose="020B0009020202020204" pitchFamily="49" charset="0"/>
+            </a:endParaRPr>
+          </a:p>
+          <a:p>
+            <a:pPr algn="r"/>
+            <a:r>
+              <a:rPr lang="en-GB" sz="1000" dirty="0">
+                <a:solidFill>
+                  <a:srgbClr val="E3E9ED"/>
+                </a:solidFill>
+                <a:latin typeface="Aptos Mono" panose="020B0009020202020204" pitchFamily="49" charset="0"/>
+              </a:rPr>
+              <a:t>full-stack developer course</a:t>
+            </a:r>
+          </a:p>
+          <a:p>
+            <a:pPr algn="r"/>
+            <a:r>
+              <a:rPr lang="en-GB" sz="1000" dirty="0">
+                <a:solidFill>
+                  <a:srgbClr val="E3E9ED"/>
+                </a:solidFill>
+                <a:latin typeface="Aptos Mono" panose="020B0009020202020204" pitchFamily="49" charset="0"/>
+              </a:rPr>
+              <a:t>codecademy</a:t>
+            </a:r>
+          </a:p>
+        </p:txBody>
+      </p:sp>
+    </p:spTree>
+    <p:extLst>
+      <p:ext uri="{BB962C8B-B14F-4D97-AF65-F5344CB8AC3E}">
+        <p14:creationId xmlns:p14="http://schemas.microsoft.com/office/powerpoint/2010/main" val="2279441419"/>
+      </p:ext>
+    </p:extLst>
+  </p:cSld>
+  <p:clrMapOvr>
+    <a:masterClrMapping/>
+  </p:clrMapOvr>
+</p:sld>
+</file>
+
+<file path=ppt/slides/slide8.xml><?xml version="1.0" encoding="utf-8"?>
+<p:sld xmlns:a="http://schemas.openxmlformats.org/drawingml/2006/main" xmlns:r="http://schemas.openxmlformats.org/officeDocument/2006/relationships" xmlns:p="http://schemas.openxmlformats.org/presentationml/2006/main">
+  <p:cSld>
+    <p:spTree>
+      <p:nvGrpSpPr>
+        <p:cNvPr id="1" name=""/>
+        <p:cNvGrpSpPr/>
+        <p:nvPr/>
+      </p:nvGrpSpPr>
+      <p:grpSpPr>
+        <a:xfrm>
+          <a:off x="0" y="0"/>
+          <a:ext cx="0" cy="0"/>
+          <a:chOff x="0" y="0"/>
+          <a:chExt cx="0" cy="0"/>
+        </a:xfrm>
+      </p:grpSpPr>
+      <p:pic>
+        <p:nvPicPr>
+          <p:cNvPr id="17" name="Picture 16" descr="A aerial view of a football field&#10;&#10;Description automatically generated">
+            <a:extLst>
+              <a:ext uri="{FF2B5EF4-FFF2-40B4-BE49-F238E27FC236}">
+                <a16:creationId xmlns:a16="http://schemas.microsoft.com/office/drawing/2014/main" id="{E765C726-91B9-C2F7-7776-BD13DEC6FB65}"/>
+              </a:ext>
+            </a:extLst>
+          </p:cNvPr>
+          <p:cNvPicPr>
+            <a:picLocks noChangeAspect="1"/>
+          </p:cNvPicPr>
+          <p:nvPr/>
+        </p:nvPicPr>
+        <p:blipFill rotWithShape="1">
+          <a:blip r:embed="rId3">
+            <a:extLst>
+              <a:ext uri="{28A0092B-C50C-407E-A947-70E740481C1C}">
+                <a14:useLocalDpi xmlns:a14="http://schemas.microsoft.com/office/drawing/2010/main" val="0"/>
+              </a:ext>
+            </a:extLst>
+          </a:blip>
+          <a:srcRect l="-30" t="34181" r="30" b="34181"/>
+          <a:stretch/>
+        </p:blipFill>
+        <p:spPr>
+          <a:xfrm>
+            <a:off x="0" y="0"/>
+            <a:ext cx="9156100" cy="5143500"/>
+          </a:xfrm>
+          <a:prstGeom prst="rect">
+            <a:avLst/>
+          </a:prstGeom>
+        </p:spPr>
+      </p:pic>
+      <p:sp>
+        <p:nvSpPr>
+          <p:cNvPr id="12" name="Rectangle 11">
+            <a:extLst>
+              <a:ext uri="{FF2B5EF4-FFF2-40B4-BE49-F238E27FC236}">
+                <a16:creationId xmlns:a16="http://schemas.microsoft.com/office/drawing/2014/main" id="{BAD760F3-3A96-2311-362E-D76774272972}"/>
+              </a:ext>
+            </a:extLst>
+          </p:cNvPr>
+          <p:cNvSpPr>
+            <a:spLocks noGrp="1" noRot="1" noMove="1" noResize="1" noEditPoints="1" noAdjustHandles="1" noChangeArrowheads="1" noChangeShapeType="1"/>
+          </p:cNvSpPr>
+          <p:nvPr/>
+        </p:nvSpPr>
+        <p:spPr>
+          <a:xfrm>
+            <a:off x="0" y="-24601"/>
+            <a:ext cx="9156101" cy="5167487"/>
+          </a:xfrm>
+          <a:prstGeom prst="rect">
+            <a:avLst/>
+          </a:prstGeom>
+          <a:gradFill flip="none" rotWithShape="1">
+            <a:gsLst>
+              <a:gs pos="0">
+                <a:srgbClr val="171D41">
+                  <a:alpha val="80000"/>
+                </a:srgbClr>
+              </a:gs>
+              <a:gs pos="100000">
+                <a:srgbClr val="171D41">
+                  <a:alpha val="80000"/>
+                </a:srgbClr>
+              </a:gs>
+            </a:gsLst>
+            <a:lin ang="16200000" scaled="1"/>
+            <a:tileRect/>
+          </a:gradFill>
+          <a:ln>
+            <a:noFill/>
+          </a:ln>
+        </p:spPr>
+        <p:style>
+          <a:lnRef idx="2">
+            <a:schemeClr val="accent1">
+              <a:shade val="15000"/>
+            </a:schemeClr>
+          </a:lnRef>
+          <a:fillRef idx="1">
+            <a:schemeClr val="accent1"/>
+          </a:fillRef>
+          <a:effectRef idx="0">
+            <a:schemeClr val="accent1"/>
+          </a:effectRef>
+          <a:fontRef idx="minor">
+            <a:schemeClr val="lt1"/>
+          </a:fontRef>
+        </p:style>
+        <p:txBody>
+          <a:bodyPr rtlCol="0" anchor="ctr"/>
+          <a:lstStyle/>
+          <a:p>
+            <a:pPr algn="r"/>
+            <a:endParaRPr lang="en-GB" dirty="0"/>
+          </a:p>
+        </p:txBody>
+      </p:sp>
+      <p:sp>
+        <p:nvSpPr>
+          <p:cNvPr id="11" name="Rectangle: Rounded Corners 10">
+            <a:extLst>
+              <a:ext uri="{FF2B5EF4-FFF2-40B4-BE49-F238E27FC236}">
+                <a16:creationId xmlns:a16="http://schemas.microsoft.com/office/drawing/2014/main" id="{B0354E3A-B5B8-B2CD-9561-457CC7AF49DA}"/>
+              </a:ext>
+            </a:extLst>
+          </p:cNvPr>
+          <p:cNvSpPr/>
+          <p:nvPr/>
+        </p:nvSpPr>
+        <p:spPr>
+          <a:xfrm>
+            <a:off x="4076993" y="141723"/>
+            <a:ext cx="990012" cy="400110"/>
+          </a:xfrm>
+          <a:prstGeom prst="roundRect">
+            <a:avLst/>
+          </a:prstGeom>
+          <a:noFill/>
+          <a:ln w="9525">
+            <a:solidFill>
+              <a:srgbClr val="E3E9ED"/>
+            </a:solidFill>
+          </a:ln>
+        </p:spPr>
+        <p:style>
+          <a:lnRef idx="2">
+            <a:schemeClr val="accent1">
+              <a:shade val="15000"/>
+            </a:schemeClr>
+          </a:lnRef>
+          <a:fillRef idx="1">
+            <a:schemeClr val="accent1"/>
+          </a:fillRef>
+          <a:effectRef idx="0">
+            <a:schemeClr val="accent1"/>
+          </a:effectRef>
+          <a:fontRef idx="minor">
+            <a:schemeClr val="lt1"/>
+          </a:fontRef>
+        </p:style>
+        <p:txBody>
+          <a:bodyPr rtlCol="0" anchor="ctr"/>
+          <a:lstStyle/>
+          <a:p>
+            <a:pPr algn="ctr"/>
+            <a:r>
+              <a:rPr lang="en-GB" sz="1600" dirty="0">
+                <a:latin typeface="Aptos Mono" panose="020B0009020202020204" pitchFamily="49" charset="0"/>
+              </a:rPr>
+              <a:t>home</a:t>
+            </a:r>
+          </a:p>
+        </p:txBody>
+      </p:sp>
+      <p:sp>
+        <p:nvSpPr>
+          <p:cNvPr id="29" name="TextBox 28">
+            <a:extLst>
+              <a:ext uri="{FF2B5EF4-FFF2-40B4-BE49-F238E27FC236}">
+                <a16:creationId xmlns:a16="http://schemas.microsoft.com/office/drawing/2014/main" id="{5CD68176-74AD-C22F-3695-0D55AE085A2E}"/>
+              </a:ext>
+            </a:extLst>
+          </p:cNvPr>
+          <p:cNvSpPr txBox="1"/>
+          <p:nvPr/>
+        </p:nvSpPr>
+        <p:spPr>
+          <a:xfrm>
+            <a:off x="1691968" y="1131734"/>
+            <a:ext cx="5760063" cy="646331"/>
+          </a:xfrm>
+          <a:prstGeom prst="rect">
+            <a:avLst/>
+          </a:prstGeom>
+          <a:noFill/>
+          <a:ln cap="flat">
+            <a:solidFill>
+              <a:srgbClr val="E3E9ED"/>
+            </a:solidFill>
+            <a:round/>
+          </a:ln>
+        </p:spPr>
+        <p:txBody>
+          <a:bodyPr wrap="square" rtlCol="0">
+            <a:spAutoFit/>
+          </a:bodyPr>
+          <a:lstStyle/>
+          <a:p>
+            <a:pPr algn="ctr"/>
+            <a:r>
+              <a:rPr lang="en-GB" sz="3600" dirty="0">
+                <a:solidFill>
+                  <a:srgbClr val="E3E9ED"/>
+                </a:solidFill>
+                <a:latin typeface="Aptos Mono" panose="020F0502020204030204" pitchFamily="49" charset="0"/>
+              </a:rPr>
+              <a:t>academic projects</a:t>
+            </a:r>
+          </a:p>
+        </p:txBody>
+      </p:sp>
+      <p:sp>
+        <p:nvSpPr>
+          <p:cNvPr id="49" name="Rectangle 48">
+            <a:extLst>
+              <a:ext uri="{FF2B5EF4-FFF2-40B4-BE49-F238E27FC236}">
+                <a16:creationId xmlns:a16="http://schemas.microsoft.com/office/drawing/2014/main" id="{B32ADD89-4C72-3752-4392-1D2734DAF995}"/>
+              </a:ext>
+            </a:extLst>
+          </p:cNvPr>
+          <p:cNvSpPr/>
+          <p:nvPr/>
+        </p:nvSpPr>
+        <p:spPr>
+          <a:xfrm>
+            <a:off x="8982049" y="51722"/>
+            <a:ext cx="90001" cy="1440016"/>
+          </a:xfrm>
+          <a:prstGeom prst="rect">
+            <a:avLst/>
+          </a:prstGeom>
+          <a:solidFill>
+            <a:srgbClr val="E3E9ED"/>
+          </a:solidFill>
+        </p:spPr>
+        <p:style>
+          <a:lnRef idx="2">
+            <a:schemeClr val="accent1">
+              <a:shade val="15000"/>
+            </a:schemeClr>
+          </a:lnRef>
+          <a:fillRef idx="1">
+            <a:schemeClr val="accent1"/>
+          </a:fillRef>
+          <a:effectRef idx="0">
+            <a:schemeClr val="accent1"/>
+          </a:effectRef>
+          <a:fontRef idx="minor">
+            <a:schemeClr val="lt1"/>
+          </a:fontRef>
+        </p:style>
+        <p:txBody>
+          <a:bodyPr rtlCol="0" anchor="ctr"/>
+          <a:lstStyle/>
+          <a:p>
+            <a:pPr algn="ctr"/>
+            <a:endParaRPr lang="en-GB" dirty="0"/>
+          </a:p>
+        </p:txBody>
+      </p:sp>
+      <p:sp>
+        <p:nvSpPr>
+          <p:cNvPr id="2" name="TextBox 1">
+            <a:extLst>
+              <a:ext uri="{FF2B5EF4-FFF2-40B4-BE49-F238E27FC236}">
+                <a16:creationId xmlns:a16="http://schemas.microsoft.com/office/drawing/2014/main" id="{78E9BE3F-A99C-B7D1-3797-857235E8A3FD}"/>
+              </a:ext>
+            </a:extLst>
+          </p:cNvPr>
+          <p:cNvSpPr txBox="1"/>
+          <p:nvPr/>
+        </p:nvSpPr>
+        <p:spPr>
+          <a:xfrm>
+            <a:off x="72232" y="-629879"/>
+            <a:ext cx="1130507" cy="189924"/>
+          </a:xfrm>
+          <a:prstGeom prst="rect">
+            <a:avLst/>
+          </a:prstGeom>
+          <a:noFill/>
+          <a:ln w="38100">
+            <a:solidFill>
+              <a:srgbClr val="FFC000"/>
+            </a:solidFill>
+          </a:ln>
+        </p:spPr>
+        <p:txBody>
+          <a:bodyPr wrap="square" rtlCol="0">
+            <a:spAutoFit/>
+          </a:bodyPr>
+          <a:lstStyle/>
+          <a:p>
+            <a:r>
+              <a:rPr lang="en-GB" sz="634" dirty="0">
+                <a:solidFill>
+                  <a:schemeClr val="bg1"/>
+                </a:solidFill>
+              </a:rPr>
+              <a:t>academic Projects</a:t>
+            </a:r>
+          </a:p>
+        </p:txBody>
+      </p:sp>
+      <p:sp>
+        <p:nvSpPr>
+          <p:cNvPr id="7" name="Rectangle: Rounded Corners 6">
+            <a:extLst>
+              <a:ext uri="{FF2B5EF4-FFF2-40B4-BE49-F238E27FC236}">
+                <a16:creationId xmlns:a16="http://schemas.microsoft.com/office/drawing/2014/main" id="{9718EAAE-CE18-8885-2C05-DF9ED1697D14}"/>
+              </a:ext>
+            </a:extLst>
+          </p:cNvPr>
+          <p:cNvSpPr/>
+          <p:nvPr/>
+        </p:nvSpPr>
+        <p:spPr>
+          <a:xfrm>
+            <a:off x="1691966" y="2094463"/>
+            <a:ext cx="5760063" cy="2159517"/>
+          </a:xfrm>
+          <a:prstGeom prst="roundRect">
+            <a:avLst>
+              <a:gd name="adj" fmla="val 7003"/>
+            </a:avLst>
+          </a:prstGeom>
+          <a:noFill/>
+          <a:ln w="9525">
+            <a:solidFill>
+              <a:srgbClr val="E3E9ED"/>
+            </a:solidFill>
+          </a:ln>
+        </p:spPr>
+        <p:style>
+          <a:lnRef idx="2">
+            <a:schemeClr val="accent1">
+              <a:shade val="15000"/>
+            </a:schemeClr>
+          </a:lnRef>
+          <a:fillRef idx="1">
+            <a:schemeClr val="accent1"/>
+          </a:fillRef>
+          <a:effectRef idx="0">
+            <a:schemeClr val="accent1"/>
+          </a:effectRef>
+          <a:fontRef idx="minor">
+            <a:schemeClr val="lt1"/>
+          </a:fontRef>
+        </p:style>
+        <p:txBody>
+          <a:bodyPr rtlCol="0" anchor="t"/>
+          <a:lstStyle/>
+          <a:p>
+            <a:pPr algn="r"/>
+            <a:r>
+              <a:rPr lang="en-GB" sz="1600" dirty="0">
+                <a:solidFill>
+                  <a:srgbClr val="E3E9ED"/>
+                </a:solidFill>
+                <a:latin typeface="Aptos Mono" panose="020B0009020202020204" pitchFamily="49" charset="0"/>
+              </a:rPr>
+              <a:t>stealth game prototype</a:t>
+            </a:r>
+          </a:p>
+          <a:p>
+            <a:endParaRPr lang="en-GB" sz="1000" dirty="0">
+              <a:solidFill>
+                <a:srgbClr val="E3E9ED"/>
+              </a:solidFill>
+              <a:latin typeface="Aptos Mono" panose="020B0009020202020204" pitchFamily="49" charset="0"/>
+            </a:endParaRPr>
+          </a:p>
+          <a:p>
+            <a:pPr algn="r"/>
+            <a:r>
+              <a:rPr lang="en-GB" sz="1000" dirty="0">
+                <a:solidFill>
+                  <a:srgbClr val="E3E9ED"/>
+                </a:solidFill>
+                <a:latin typeface="Aptos Mono" panose="020B0009020202020204" pitchFamily="49" charset="0"/>
+              </a:rPr>
+              <a:t>final year project</a:t>
+            </a:r>
+          </a:p>
+          <a:p>
+            <a:pPr algn="r"/>
+            <a:endParaRPr lang="en-GB" sz="1000" dirty="0">
+              <a:solidFill>
+                <a:srgbClr val="E3E9ED"/>
+              </a:solidFill>
+              <a:latin typeface="Aptos Mono" panose="020B0009020202020204" pitchFamily="49" charset="0"/>
+            </a:endParaRPr>
+          </a:p>
+          <a:p>
+            <a:pPr algn="r"/>
+            <a:endParaRPr lang="en-GB" sz="1000" dirty="0">
+              <a:solidFill>
+                <a:srgbClr val="E3E9ED"/>
+              </a:solidFill>
+              <a:latin typeface="Aptos Mono" panose="020B0009020202020204" pitchFamily="49" charset="0"/>
+            </a:endParaRPr>
+          </a:p>
+        </p:txBody>
+      </p:sp>
+      <p:sp>
+        <p:nvSpPr>
+          <p:cNvPr id="18" name="Rectangle: Rounded Corners 17">
+            <a:extLst>
+              <a:ext uri="{FF2B5EF4-FFF2-40B4-BE49-F238E27FC236}">
+                <a16:creationId xmlns:a16="http://schemas.microsoft.com/office/drawing/2014/main" id="{5DF8A7D4-6663-93D3-517F-9B529F0BBEBC}"/>
+              </a:ext>
+            </a:extLst>
+          </p:cNvPr>
+          <p:cNvSpPr/>
+          <p:nvPr/>
+        </p:nvSpPr>
+        <p:spPr>
+          <a:xfrm>
+            <a:off x="1691966" y="4371771"/>
+            <a:ext cx="5760063" cy="771116"/>
+          </a:xfrm>
+          <a:prstGeom prst="roundRect">
+            <a:avLst>
+              <a:gd name="adj" fmla="val 18221"/>
+            </a:avLst>
+          </a:prstGeom>
+          <a:noFill/>
+          <a:ln w="9525">
+            <a:solidFill>
+              <a:srgbClr val="E3E9ED"/>
+            </a:solidFill>
+          </a:ln>
+        </p:spPr>
+        <p:style>
+          <a:lnRef idx="2">
+            <a:schemeClr val="accent1">
+              <a:shade val="15000"/>
+            </a:schemeClr>
+          </a:lnRef>
+          <a:fillRef idx="1">
+            <a:schemeClr val="accent1"/>
+          </a:fillRef>
+          <a:effectRef idx="0">
+            <a:schemeClr val="accent1"/>
+          </a:effectRef>
+          <a:fontRef idx="minor">
+            <a:schemeClr val="lt1"/>
+          </a:fontRef>
+        </p:style>
+        <p:txBody>
+          <a:bodyPr rtlCol="0" anchor="t"/>
+          <a:lstStyle/>
+          <a:p>
+            <a:pPr algn="r"/>
+            <a:endParaRPr lang="en-GB" sz="1000" dirty="0">
+              <a:solidFill>
+                <a:srgbClr val="E3E9ED"/>
+              </a:solidFill>
+            </a:endParaRPr>
+          </a:p>
+        </p:txBody>
+      </p:sp>
+      <p:cxnSp>
+        <p:nvCxnSpPr>
+          <p:cNvPr id="23" name="Connector: Elbow 22">
+            <a:extLst>
+              <a:ext uri="{FF2B5EF4-FFF2-40B4-BE49-F238E27FC236}">
+                <a16:creationId xmlns:a16="http://schemas.microsoft.com/office/drawing/2014/main" id="{BC64D4EF-D486-8F35-E710-AA8E2EFE81B2}"/>
+              </a:ext>
+            </a:extLst>
+          </p:cNvPr>
+          <p:cNvCxnSpPr>
+            <a:cxnSpLocks/>
+            <a:stCxn id="18" idx="3"/>
+            <a:endCxn id="26" idx="0"/>
+          </p:cNvCxnSpPr>
+          <p:nvPr/>
+        </p:nvCxnSpPr>
+        <p:spPr>
+          <a:xfrm>
+            <a:off x="7452029" y="4757329"/>
+            <a:ext cx="405008" cy="1152500"/>
+          </a:xfrm>
+          <a:prstGeom prst="bentConnector2">
+            <a:avLst/>
+          </a:prstGeom>
+          <a:ln w="25400">
+            <a:solidFill>
+              <a:srgbClr val="FFC000"/>
+            </a:solidFill>
+            <a:tailEnd type="triangle"/>
+          </a:ln>
+        </p:spPr>
+        <p:style>
+          <a:lnRef idx="2">
+            <a:schemeClr val="accent1"/>
+          </a:lnRef>
+          <a:fillRef idx="0">
+            <a:schemeClr val="accent1"/>
+          </a:fillRef>
+          <a:effectRef idx="1">
+            <a:schemeClr val="accent1"/>
+          </a:effectRef>
+          <a:fontRef idx="minor">
+            <a:schemeClr val="tx1"/>
+          </a:fontRef>
+        </p:style>
+      </p:cxnSp>
+      <p:sp>
+        <p:nvSpPr>
+          <p:cNvPr id="26" name="TextBox 25">
+            <a:extLst>
+              <a:ext uri="{FF2B5EF4-FFF2-40B4-BE49-F238E27FC236}">
+                <a16:creationId xmlns:a16="http://schemas.microsoft.com/office/drawing/2014/main" id="{5E316AA8-5E6F-3DFE-1372-923F2E6C34F0}"/>
+              </a:ext>
+            </a:extLst>
+          </p:cNvPr>
+          <p:cNvSpPr txBox="1"/>
+          <p:nvPr/>
+        </p:nvSpPr>
+        <p:spPr>
+          <a:xfrm>
+            <a:off x="7002027" y="5909829"/>
+            <a:ext cx="1710019" cy="287515"/>
+          </a:xfrm>
+          <a:prstGeom prst="rect">
+            <a:avLst/>
+          </a:prstGeom>
+          <a:noFill/>
+          <a:ln w="38100">
+            <a:solidFill>
+              <a:srgbClr val="FFC000"/>
+            </a:solidFill>
+          </a:ln>
+        </p:spPr>
+        <p:txBody>
+          <a:bodyPr wrap="square" rtlCol="0">
+            <a:spAutoFit/>
+          </a:bodyPr>
+          <a:lstStyle/>
+          <a:p>
+            <a:r>
+              <a:rPr lang="en-GB" sz="634" dirty="0">
+                <a:solidFill>
+                  <a:schemeClr val="bg1"/>
+                </a:solidFill>
+              </a:rPr>
+              <a:t>Template for next section.</a:t>
+            </a:r>
+          </a:p>
+          <a:p>
+            <a:r>
+              <a:rPr lang="en-GB" sz="634" dirty="0">
+                <a:solidFill>
+                  <a:schemeClr val="bg1"/>
+                </a:solidFill>
+              </a:rPr>
+              <a:t>Scroll to next slide to see detail. </a:t>
+            </a:r>
+          </a:p>
+        </p:txBody>
+      </p:sp>
+    </p:spTree>
+    <p:extLst>
+      <p:ext uri="{BB962C8B-B14F-4D97-AF65-F5344CB8AC3E}">
+        <p14:creationId xmlns:p14="http://schemas.microsoft.com/office/powerpoint/2010/main" val="2445633096"/>
+      </p:ext>
+    </p:extLst>
+  </p:cSld>
+  <p:clrMapOvr>
+    <a:masterClrMapping/>
+  </p:clrMapOvr>
+</p:sld>
+</file>
+
+<file path=ppt/slides/slide9.xml><?xml version="1.0" encoding="utf-8"?>
+<p:sld xmlns:a="http://schemas.openxmlformats.org/drawingml/2006/main" xmlns:r="http://schemas.openxmlformats.org/officeDocument/2006/relationships" xmlns:p="http://schemas.openxmlformats.org/presentationml/2006/main">
+  <p:cSld>
+    <p:spTree>
+      <p:nvGrpSpPr>
+        <p:cNvPr id="1" name=""/>
+        <p:cNvGrpSpPr/>
+        <p:nvPr/>
+      </p:nvGrpSpPr>
+      <p:grpSpPr>
+        <a:xfrm>
+          <a:off x="0" y="0"/>
+          <a:ext cx="0" cy="0"/>
+          <a:chOff x="0" y="0"/>
+          <a:chExt cx="0" cy="0"/>
+        </a:xfrm>
+      </p:grpSpPr>
+      <p:pic>
+        <p:nvPicPr>
+          <p:cNvPr id="17" name="Picture 16" descr="A aerial view of a football field&#10;&#10;Description automatically generated">
+            <a:extLst>
+              <a:ext uri="{FF2B5EF4-FFF2-40B4-BE49-F238E27FC236}">
+                <a16:creationId xmlns:a16="http://schemas.microsoft.com/office/drawing/2014/main" id="{E765C726-91B9-C2F7-7776-BD13DEC6FB65}"/>
+              </a:ext>
+            </a:extLst>
+          </p:cNvPr>
+          <p:cNvPicPr>
+            <a:picLocks noChangeAspect="1"/>
+          </p:cNvPicPr>
+          <p:nvPr/>
+        </p:nvPicPr>
+        <p:blipFill rotWithShape="1">
+          <a:blip r:embed="rId3">
+            <a:extLst>
+              <a:ext uri="{28A0092B-C50C-407E-A947-70E740481C1C}">
+                <a14:useLocalDpi xmlns:a14="http://schemas.microsoft.com/office/drawing/2010/main" val="0"/>
+              </a:ext>
+            </a:extLst>
+          </a:blip>
+          <a:srcRect l="-30" t="34181" r="30" b="34181"/>
+          <a:stretch/>
+        </p:blipFill>
+        <p:spPr>
+          <a:xfrm>
+            <a:off x="0" y="0"/>
+            <a:ext cx="9156100" cy="5143500"/>
+          </a:xfrm>
+          <a:prstGeom prst="rect">
+            <a:avLst/>
+          </a:prstGeom>
+        </p:spPr>
+      </p:pic>
+      <p:sp>
+        <p:nvSpPr>
+          <p:cNvPr id="12" name="Rectangle 11">
+            <a:extLst>
+              <a:ext uri="{FF2B5EF4-FFF2-40B4-BE49-F238E27FC236}">
+                <a16:creationId xmlns:a16="http://schemas.microsoft.com/office/drawing/2014/main" id="{BAD760F3-3A96-2311-362E-D76774272972}"/>
+              </a:ext>
+            </a:extLst>
+          </p:cNvPr>
+          <p:cNvSpPr>
+            <a:spLocks noGrp="1" noRot="1" noMove="1" noResize="1" noEditPoints="1" noAdjustHandles="1" noChangeArrowheads="1" noChangeShapeType="1"/>
+          </p:cNvSpPr>
+          <p:nvPr/>
+        </p:nvSpPr>
+        <p:spPr>
+          <a:xfrm>
+            <a:off x="0" y="-24601"/>
+            <a:ext cx="9156101" cy="5167487"/>
+          </a:xfrm>
+          <a:prstGeom prst="rect">
+            <a:avLst/>
+          </a:prstGeom>
+          <a:gradFill flip="none" rotWithShape="1">
+            <a:gsLst>
+              <a:gs pos="0">
+                <a:srgbClr val="171D41">
+                  <a:alpha val="80000"/>
+                </a:srgbClr>
+              </a:gs>
+              <a:gs pos="100000">
+                <a:srgbClr val="171D41">
+                  <a:alpha val="80000"/>
+                </a:srgbClr>
+              </a:gs>
+            </a:gsLst>
+            <a:lin ang="16200000" scaled="1"/>
+            <a:tileRect/>
+          </a:gradFill>
+          <a:ln>
+            <a:noFill/>
+          </a:ln>
+        </p:spPr>
+        <p:style>
+          <a:lnRef idx="2">
+            <a:schemeClr val="accent1">
+              <a:shade val="15000"/>
+            </a:schemeClr>
+          </a:lnRef>
+          <a:fillRef idx="1">
+            <a:schemeClr val="accent1"/>
+          </a:fillRef>
+          <a:effectRef idx="0">
+            <a:schemeClr val="accent1"/>
+          </a:effectRef>
+          <a:fontRef idx="minor">
+            <a:schemeClr val="lt1"/>
+          </a:fontRef>
+        </p:style>
+        <p:txBody>
+          <a:bodyPr rtlCol="0" anchor="ctr"/>
+          <a:lstStyle/>
+          <a:p>
+            <a:pPr algn="ctr"/>
+            <a:endParaRPr lang="en-GB" dirty="0"/>
+          </a:p>
+        </p:txBody>
+      </p:sp>
+      <p:sp>
+        <p:nvSpPr>
+          <p:cNvPr id="11" name="Rectangle: Rounded Corners 10">
+            <a:extLst>
+              <a:ext uri="{FF2B5EF4-FFF2-40B4-BE49-F238E27FC236}">
+                <a16:creationId xmlns:a16="http://schemas.microsoft.com/office/drawing/2014/main" id="{B0354E3A-B5B8-B2CD-9561-457CC7AF49DA}"/>
+              </a:ext>
+            </a:extLst>
+          </p:cNvPr>
+          <p:cNvSpPr/>
+          <p:nvPr/>
+        </p:nvSpPr>
+        <p:spPr>
+          <a:xfrm>
+            <a:off x="4076993" y="141723"/>
+            <a:ext cx="990012" cy="400110"/>
+          </a:xfrm>
+          <a:prstGeom prst="roundRect">
+            <a:avLst/>
+          </a:prstGeom>
+          <a:noFill/>
+          <a:ln w="9525">
+            <a:solidFill>
+              <a:srgbClr val="E3E9ED"/>
+            </a:solidFill>
+          </a:ln>
+        </p:spPr>
+        <p:style>
+          <a:lnRef idx="2">
+            <a:schemeClr val="accent1">
+              <a:shade val="15000"/>
+            </a:schemeClr>
+          </a:lnRef>
+          <a:fillRef idx="1">
+            <a:schemeClr val="accent1"/>
+          </a:fillRef>
+          <a:effectRef idx="0">
+            <a:schemeClr val="accent1"/>
+          </a:effectRef>
+          <a:fontRef idx="minor">
+            <a:schemeClr val="lt1"/>
+          </a:fontRef>
+        </p:style>
+        <p:txBody>
+          <a:bodyPr rtlCol="0" anchor="ctr"/>
+          <a:lstStyle/>
+          <a:p>
+            <a:pPr algn="ctr"/>
+            <a:r>
+              <a:rPr lang="en-GB" sz="1600" dirty="0">
+                <a:latin typeface="Aptos Mono" panose="020B0009020202020204" pitchFamily="49" charset="0"/>
+              </a:rPr>
+              <a:t>home</a:t>
+            </a:r>
+          </a:p>
+        </p:txBody>
+      </p:sp>
+      <p:sp>
+        <p:nvSpPr>
+          <p:cNvPr id="49" name="Rectangle 48">
+            <a:extLst>
+              <a:ext uri="{FF2B5EF4-FFF2-40B4-BE49-F238E27FC236}">
+                <a16:creationId xmlns:a16="http://schemas.microsoft.com/office/drawing/2014/main" id="{B32ADD89-4C72-3752-4392-1D2734DAF995}"/>
+              </a:ext>
+            </a:extLst>
+          </p:cNvPr>
+          <p:cNvSpPr/>
+          <p:nvPr/>
+        </p:nvSpPr>
+        <p:spPr>
+          <a:xfrm>
+            <a:off x="8982049" y="51722"/>
+            <a:ext cx="90001" cy="1440016"/>
+          </a:xfrm>
+          <a:prstGeom prst="rect">
+            <a:avLst/>
+          </a:prstGeom>
+          <a:solidFill>
+            <a:srgbClr val="E3E9ED"/>
+          </a:solidFill>
+        </p:spPr>
+        <p:style>
+          <a:lnRef idx="2">
+            <a:schemeClr val="accent1">
+              <a:shade val="15000"/>
+            </a:schemeClr>
+          </a:lnRef>
+          <a:fillRef idx="1">
+            <a:schemeClr val="accent1"/>
+          </a:fillRef>
+          <a:effectRef idx="0">
+            <a:schemeClr val="accent1"/>
+          </a:effectRef>
+          <a:fontRef idx="minor">
+            <a:schemeClr val="lt1"/>
+          </a:fontRef>
+        </p:style>
+        <p:txBody>
+          <a:bodyPr rtlCol="0" anchor="ctr"/>
+          <a:lstStyle/>
+          <a:p>
+            <a:pPr algn="ctr"/>
+            <a:endParaRPr lang="en-GB" dirty="0"/>
+          </a:p>
+        </p:txBody>
+      </p:sp>
+      <p:sp>
+        <p:nvSpPr>
+          <p:cNvPr id="2" name="TextBox 1">
+            <a:extLst>
+              <a:ext uri="{FF2B5EF4-FFF2-40B4-BE49-F238E27FC236}">
+                <a16:creationId xmlns:a16="http://schemas.microsoft.com/office/drawing/2014/main" id="{78E9BE3F-A99C-B7D1-3797-857235E8A3FD}"/>
+              </a:ext>
+            </a:extLst>
+          </p:cNvPr>
+          <p:cNvSpPr txBox="1"/>
+          <p:nvPr/>
+        </p:nvSpPr>
+        <p:spPr>
+          <a:xfrm>
+            <a:off x="72232" y="-629879"/>
+            <a:ext cx="1130507" cy="189924"/>
+          </a:xfrm>
+          <a:prstGeom prst="rect">
+            <a:avLst/>
+          </a:prstGeom>
+          <a:noFill/>
+          <a:ln w="38100">
+            <a:solidFill>
+              <a:srgbClr val="FFC000"/>
+            </a:solidFill>
+          </a:ln>
+        </p:spPr>
+        <p:txBody>
+          <a:bodyPr wrap="square" rtlCol="0">
+            <a:spAutoFit/>
+          </a:bodyPr>
+          <a:lstStyle/>
+          <a:p>
+            <a:r>
+              <a:rPr lang="en-GB" sz="634" dirty="0">
+                <a:solidFill>
+                  <a:schemeClr val="bg1"/>
+                </a:solidFill>
+              </a:rPr>
+              <a:t>academic Projects</a:t>
+            </a:r>
+          </a:p>
+        </p:txBody>
+      </p:sp>
+      <p:sp>
+        <p:nvSpPr>
+          <p:cNvPr id="19" name="Rectangle: Rounded Corners 18">
+            <a:extLst>
+              <a:ext uri="{FF2B5EF4-FFF2-40B4-BE49-F238E27FC236}">
+                <a16:creationId xmlns:a16="http://schemas.microsoft.com/office/drawing/2014/main" id="{0F65DFDC-4455-562C-29E8-0939FF0FDF32}"/>
+              </a:ext>
+            </a:extLst>
+          </p:cNvPr>
+          <p:cNvSpPr/>
+          <p:nvPr/>
+        </p:nvSpPr>
+        <p:spPr>
+          <a:xfrm>
+            <a:off x="1691966" y="681729"/>
+            <a:ext cx="5760063" cy="2159517"/>
+          </a:xfrm>
+          <a:prstGeom prst="roundRect">
+            <a:avLst>
+              <a:gd name="adj" fmla="val 7003"/>
+            </a:avLst>
+          </a:prstGeom>
+          <a:noFill/>
+          <a:ln w="9525">
+            <a:solidFill>
+              <a:srgbClr val="E3E9ED"/>
+            </a:solidFill>
+          </a:ln>
+        </p:spPr>
+        <p:style>
+          <a:lnRef idx="2">
+            <a:schemeClr val="accent1">
+              <a:shade val="15000"/>
+            </a:schemeClr>
+          </a:lnRef>
+          <a:fillRef idx="1">
+            <a:schemeClr val="accent1"/>
+          </a:fillRef>
+          <a:effectRef idx="0">
+            <a:schemeClr val="accent1"/>
+          </a:effectRef>
+          <a:fontRef idx="minor">
+            <a:schemeClr val="lt1"/>
+          </a:fontRef>
+        </p:style>
+        <p:txBody>
+          <a:bodyPr rtlCol="0" anchor="t"/>
+          <a:lstStyle/>
+          <a:p>
+            <a:pPr algn="r"/>
+            <a:r>
+              <a:rPr lang="en-GB" sz="1600" dirty="0">
+                <a:solidFill>
+                  <a:srgbClr val="E3E9ED"/>
+                </a:solidFill>
+                <a:latin typeface="Aptos Mono" panose="020B0009020202020204" pitchFamily="49" charset="0"/>
+              </a:rPr>
+              <a:t>3d platformer</a:t>
+            </a:r>
+          </a:p>
+          <a:p>
+            <a:pPr algn="r"/>
+            <a:endParaRPr lang="en-GB" sz="1000" dirty="0">
+              <a:solidFill>
+                <a:srgbClr val="E3E9ED"/>
+              </a:solidFill>
+              <a:latin typeface="Aptos Mono" panose="020B0009020202020204" pitchFamily="49" charset="0"/>
+            </a:endParaRPr>
+          </a:p>
+          <a:p>
+            <a:pPr algn="r"/>
+            <a:r>
+              <a:rPr lang="en-GB" sz="1000" dirty="0">
+                <a:solidFill>
+                  <a:srgbClr val="E3E9ED"/>
+                </a:solidFill>
+                <a:latin typeface="Aptos Mono" panose="020B0009020202020204" pitchFamily="49" charset="0"/>
+              </a:rPr>
+              <a:t>advanced games technology</a:t>
+            </a:r>
+          </a:p>
+        </p:txBody>
+      </p:sp>
+      <p:sp>
+        <p:nvSpPr>
+          <p:cNvPr id="20" name="Rectangle: Rounded Corners 19">
+            <a:extLst>
+              <a:ext uri="{FF2B5EF4-FFF2-40B4-BE49-F238E27FC236}">
+                <a16:creationId xmlns:a16="http://schemas.microsoft.com/office/drawing/2014/main" id="{9BC47CE2-76C1-7597-DAD7-EBD79A0E34FA}"/>
+              </a:ext>
+            </a:extLst>
+          </p:cNvPr>
+          <p:cNvSpPr/>
+          <p:nvPr/>
+        </p:nvSpPr>
+        <p:spPr>
+          <a:xfrm>
+            <a:off x="1691966" y="2897574"/>
+            <a:ext cx="5760063" cy="2159517"/>
+          </a:xfrm>
+          <a:prstGeom prst="roundRect">
+            <a:avLst>
+              <a:gd name="adj" fmla="val 7003"/>
+            </a:avLst>
+          </a:prstGeom>
+          <a:noFill/>
+          <a:ln w="9525">
+            <a:solidFill>
+              <a:srgbClr val="E3E9ED"/>
+            </a:solidFill>
+          </a:ln>
+        </p:spPr>
+        <p:style>
+          <a:lnRef idx="2">
+            <a:schemeClr val="accent1">
+              <a:shade val="15000"/>
+            </a:schemeClr>
+          </a:lnRef>
+          <a:fillRef idx="1">
+            <a:schemeClr val="accent1"/>
+          </a:fillRef>
+          <a:effectRef idx="0">
+            <a:schemeClr val="accent1"/>
+          </a:effectRef>
+          <a:fontRef idx="minor">
+            <a:schemeClr val="lt1"/>
+          </a:fontRef>
+        </p:style>
+        <p:txBody>
+          <a:bodyPr rtlCol="0" anchor="t"/>
+          <a:lstStyle/>
+          <a:p>
+            <a:pPr algn="r"/>
+            <a:r>
+              <a:rPr lang="en-GB" sz="1600" dirty="0">
+                <a:solidFill>
+                  <a:srgbClr val="E3E9ED"/>
+                </a:solidFill>
+                <a:latin typeface="Aptos Mono" panose="020B0009020202020204" pitchFamily="49" charset="0"/>
+              </a:rPr>
+              <a:t>car racing game</a:t>
+            </a:r>
+          </a:p>
+          <a:p>
+            <a:pPr algn="r"/>
+            <a:endParaRPr lang="en-GB" sz="1000" dirty="0">
+              <a:solidFill>
+                <a:srgbClr val="E3E9ED"/>
+              </a:solidFill>
+              <a:latin typeface="Aptos Mono" panose="020B0009020202020204" pitchFamily="49" charset="0"/>
+            </a:endParaRPr>
+          </a:p>
+          <a:p>
+            <a:pPr algn="r"/>
+            <a:r>
+              <a:rPr lang="en-GB" sz="1000" dirty="0">
+                <a:solidFill>
+                  <a:srgbClr val="E3E9ED"/>
+                </a:solidFill>
+                <a:latin typeface="Aptos Mono" panose="020B0009020202020204" pitchFamily="49" charset="0"/>
+              </a:rPr>
+              <a:t>computer graphics</a:t>
+            </a:r>
+          </a:p>
+        </p:txBody>
+      </p:sp>
+    </p:spTree>
+    <p:extLst>
+      <p:ext uri="{BB962C8B-B14F-4D97-AF65-F5344CB8AC3E}">
+        <p14:creationId xmlns:p14="http://schemas.microsoft.com/office/powerpoint/2010/main" val="832763398"/>
       </p:ext>
     </p:extLst>
   </p:cSld>

</xml_diff>

<commit_message>
90% done with home screen on mobile. need to finish adding transitions.
</commit_message>
<xml_diff>
--- a/Portfolio-Project-Personal-Portfolio-Website/Wireframes.pptx
+++ b/Portfolio-Project-Personal-Portfolio-Website/Wireframes.pptx
@@ -206,7 +206,7 @@
           <a:p>
             <a:fld id="{A273ECB5-27FA-4334-B172-E40162A074CC}" type="datetimeFigureOut">
               <a:rPr lang="en-GB" smtClean="0"/>
-              <a:t>20/08/2024</a:t>
+              <a:t>22/08/2024</a:t>
             </a:fld>
             <a:endParaRPr lang="en-GB" dirty="0"/>
           </a:p>
@@ -1361,7 +1361,7 @@
           <a:p>
             <a:fld id="{BB19518F-CAD7-4222-B826-8CD348F393C6}" type="datetimeFigureOut">
               <a:rPr lang="en-GB" smtClean="0"/>
-              <a:t>20/08/2024</a:t>
+              <a:t>22/08/2024</a:t>
             </a:fld>
             <a:endParaRPr lang="en-GB" dirty="0"/>
           </a:p>
@@ -1531,7 +1531,7 @@
           <a:p>
             <a:fld id="{BB19518F-CAD7-4222-B826-8CD348F393C6}" type="datetimeFigureOut">
               <a:rPr lang="en-GB" smtClean="0"/>
-              <a:t>20/08/2024</a:t>
+              <a:t>22/08/2024</a:t>
             </a:fld>
             <a:endParaRPr lang="en-GB" dirty="0"/>
           </a:p>
@@ -1711,7 +1711,7 @@
           <a:p>
             <a:fld id="{BB19518F-CAD7-4222-B826-8CD348F393C6}" type="datetimeFigureOut">
               <a:rPr lang="en-GB" smtClean="0"/>
-              <a:t>20/08/2024</a:t>
+              <a:t>22/08/2024</a:t>
             </a:fld>
             <a:endParaRPr lang="en-GB" dirty="0"/>
           </a:p>
@@ -1881,7 +1881,7 @@
           <a:p>
             <a:fld id="{BB19518F-CAD7-4222-B826-8CD348F393C6}" type="datetimeFigureOut">
               <a:rPr lang="en-GB" smtClean="0"/>
-              <a:t>20/08/2024</a:t>
+              <a:t>22/08/2024</a:t>
             </a:fld>
             <a:endParaRPr lang="en-GB" dirty="0"/>
           </a:p>
@@ -2127,7 +2127,7 @@
           <a:p>
             <a:fld id="{BB19518F-CAD7-4222-B826-8CD348F393C6}" type="datetimeFigureOut">
               <a:rPr lang="en-GB" smtClean="0"/>
-              <a:t>20/08/2024</a:t>
+              <a:t>22/08/2024</a:t>
             </a:fld>
             <a:endParaRPr lang="en-GB" dirty="0"/>
           </a:p>
@@ -2359,7 +2359,7 @@
           <a:p>
             <a:fld id="{BB19518F-CAD7-4222-B826-8CD348F393C6}" type="datetimeFigureOut">
               <a:rPr lang="en-GB" smtClean="0"/>
-              <a:t>20/08/2024</a:t>
+              <a:t>22/08/2024</a:t>
             </a:fld>
             <a:endParaRPr lang="en-GB" dirty="0"/>
           </a:p>
@@ -2726,7 +2726,7 @@
           <a:p>
             <a:fld id="{BB19518F-CAD7-4222-B826-8CD348F393C6}" type="datetimeFigureOut">
               <a:rPr lang="en-GB" smtClean="0"/>
-              <a:t>20/08/2024</a:t>
+              <a:t>22/08/2024</a:t>
             </a:fld>
             <a:endParaRPr lang="en-GB" dirty="0"/>
           </a:p>
@@ -2844,7 +2844,7 @@
           <a:p>
             <a:fld id="{BB19518F-CAD7-4222-B826-8CD348F393C6}" type="datetimeFigureOut">
               <a:rPr lang="en-GB" smtClean="0"/>
-              <a:t>20/08/2024</a:t>
+              <a:t>22/08/2024</a:t>
             </a:fld>
             <a:endParaRPr lang="en-GB" dirty="0"/>
           </a:p>
@@ -2939,7 +2939,7 @@
           <a:p>
             <a:fld id="{BB19518F-CAD7-4222-B826-8CD348F393C6}" type="datetimeFigureOut">
               <a:rPr lang="en-GB" smtClean="0"/>
-              <a:t>20/08/2024</a:t>
+              <a:t>22/08/2024</a:t>
             </a:fld>
             <a:endParaRPr lang="en-GB" dirty="0"/>
           </a:p>
@@ -3216,7 +3216,7 @@
           <a:p>
             <a:fld id="{BB19518F-CAD7-4222-B826-8CD348F393C6}" type="datetimeFigureOut">
               <a:rPr lang="en-GB" smtClean="0"/>
-              <a:t>20/08/2024</a:t>
+              <a:t>22/08/2024</a:t>
             </a:fld>
             <a:endParaRPr lang="en-GB" dirty="0"/>
           </a:p>
@@ -3472,7 +3472,7 @@
           <a:p>
             <a:fld id="{BB19518F-CAD7-4222-B826-8CD348F393C6}" type="datetimeFigureOut">
               <a:rPr lang="en-GB" smtClean="0"/>
-              <a:t>20/08/2024</a:t>
+              <a:t>22/08/2024</a:t>
             </a:fld>
             <a:endParaRPr lang="en-GB" dirty="0"/>
           </a:p>
@@ -3685,7 +3685,7 @@
           <a:p>
             <a:fld id="{BB19518F-CAD7-4222-B826-8CD348F393C6}" type="datetimeFigureOut">
               <a:rPr lang="en-GB" smtClean="0"/>
-              <a:t>20/08/2024</a:t>
+              <a:t>22/08/2024</a:t>
             </a:fld>
             <a:endParaRPr lang="en-GB" dirty="0"/>
           </a:p>
@@ -4991,6 +4991,284 @@
           </a:p>
         </p:txBody>
       </p:sp>
+      <p:sp>
+        <p:nvSpPr>
+          <p:cNvPr id="2" name="Rectangle 1">
+            <a:extLst>
+              <a:ext uri="{FF2B5EF4-FFF2-40B4-BE49-F238E27FC236}">
+                <a16:creationId xmlns:a16="http://schemas.microsoft.com/office/drawing/2014/main" id="{83D93B12-E6AE-A541-F52D-6D7880C5249A}"/>
+              </a:ext>
+            </a:extLst>
+          </p:cNvPr>
+          <p:cNvSpPr>
+            <a:spLocks noChangeArrowheads="1"/>
+          </p:cNvSpPr>
+          <p:nvPr/>
+        </p:nvSpPr>
+        <p:spPr bwMode="auto">
+          <a:xfrm>
+            <a:off x="72232" y="-2108302"/>
+            <a:ext cx="4499768" cy="369332"/>
+          </a:xfrm>
+          <a:prstGeom prst="rect">
+            <a:avLst/>
+          </a:prstGeom>
+          <a:noFill/>
+          <a:ln>
+            <a:noFill/>
+          </a:ln>
+          <a:effectLst/>
+          <a:extLst>
+            <a:ext uri="{909E8E84-426E-40DD-AFC4-6F175D3DCCD1}">
+              <a14:hiddenFill xmlns:a14="http://schemas.microsoft.com/office/drawing/2010/main">
+                <a:solidFill>
+                  <a:schemeClr val="accent1"/>
+                </a:solidFill>
+              </a14:hiddenFill>
+            </a:ext>
+            <a:ext uri="{91240B29-F687-4F45-9708-019B960494DF}">
+              <a14:hiddenLine xmlns:a14="http://schemas.microsoft.com/office/drawing/2010/main" w="9525">
+                <a:solidFill>
+                  <a:schemeClr val="tx1"/>
+                </a:solidFill>
+                <a:miter lim="800000"/>
+                <a:headEnd/>
+                <a:tailEnd/>
+              </a14:hiddenLine>
+            </a:ext>
+            <a:ext uri="{AF507438-7753-43E0-B8FC-AC1667EBCBE1}">
+              <a14:hiddenEffects xmlns:a14="http://schemas.microsoft.com/office/drawing/2010/main">
+                <a:effectLst>
+                  <a:outerShdw dist="35921" dir="2700000" algn="ctr" rotWithShape="0">
+                    <a:schemeClr val="bg2"/>
+                  </a:outerShdw>
+                </a:effectLst>
+              </a14:hiddenEffects>
+            </a:ext>
+          </a:extLst>
+        </p:spPr>
+        <p:txBody>
+          <a:bodyPr vert="horz" wrap="square" lIns="91440" tIns="45720" rIns="91440" bIns="45720" numCol="1" anchor="ctr" anchorCtr="0" compatLnSpc="1">
+            <a:prstTxWarp prst="textNoShape">
+              <a:avLst/>
+            </a:prstTxWarp>
+            <a:spAutoFit/>
+          </a:bodyPr>
+          <a:lstStyle/>
+          <a:p>
+            <a:pPr marL="0" marR="0" lvl="0" indent="0" algn="l" defTabSz="914400" rtl="0" eaLnBrk="0" fontAlgn="base" latinLnBrk="0" hangingPunct="0">
+              <a:lnSpc>
+                <a:spcPct val="100000"/>
+              </a:lnSpc>
+              <a:spcBef>
+                <a:spcPct val="0"/>
+              </a:spcBef>
+              <a:spcAft>
+                <a:spcPct val="0"/>
+              </a:spcAft>
+              <a:buClrTx/>
+              <a:buSzTx/>
+              <a:buFontTx/>
+              <a:buNone/>
+              <a:tabLst/>
+            </a:pPr>
+            <a:r>
+              <a:rPr kumimoji="0" lang="en-US" altLang="en-US" sz="1800" b="0" i="0" u="none" strike="noStrike" cap="none" normalizeH="0" baseline="0" dirty="0">
+                <a:ln>
+                  <a:noFill/>
+                </a:ln>
+                <a:solidFill>
+                  <a:schemeClr val="tx1"/>
+                </a:solidFill>
+                <a:effectLst/>
+                <a:latin typeface="Arial" panose="020B0604020202020204" pitchFamily="34" charset="0"/>
+              </a:rPr>
+              <a:t>Photo by </a:t>
+            </a:r>
+            <a:r>
+              <a:rPr kumimoji="0" lang="en-US" altLang="en-US" sz="1800" b="0" i="0" u="none" strike="noStrike" cap="none" normalizeH="0" baseline="0" dirty="0">
+                <a:ln>
+                  <a:noFill/>
+                </a:ln>
+                <a:solidFill>
+                  <a:schemeClr val="tx1"/>
+                </a:solidFill>
+                <a:effectLst/>
+                <a:latin typeface="Arial" panose="020B0604020202020204" pitchFamily="34" charset="0"/>
+                <a:hlinkClick r:id="rId3"/>
+              </a:rPr>
+              <a:t>Andrej </a:t>
+            </a:r>
+            <a:r>
+              <a:rPr kumimoji="0" lang="en-US" altLang="en-US" sz="1800" b="0" i="0" u="none" strike="noStrike" cap="none" normalizeH="0" baseline="0" dirty="0" err="1">
+                <a:ln>
+                  <a:noFill/>
+                </a:ln>
+                <a:solidFill>
+                  <a:schemeClr val="tx1"/>
+                </a:solidFill>
+                <a:effectLst/>
+                <a:latin typeface="Arial" panose="020B0604020202020204" pitchFamily="34" charset="0"/>
+                <a:hlinkClick r:id="rId3"/>
+              </a:rPr>
+              <a:t>Lišakov</a:t>
+            </a:r>
+            <a:r>
+              <a:rPr kumimoji="0" lang="en-US" altLang="en-US" sz="1800" b="0" i="0" u="none" strike="noStrike" cap="none" normalizeH="0" baseline="0" dirty="0">
+                <a:ln>
+                  <a:noFill/>
+                </a:ln>
+                <a:solidFill>
+                  <a:schemeClr val="tx1"/>
+                </a:solidFill>
+                <a:effectLst/>
+                <a:latin typeface="Arial" panose="020B0604020202020204" pitchFamily="34" charset="0"/>
+              </a:rPr>
+              <a:t> on </a:t>
+            </a:r>
+            <a:r>
+              <a:rPr kumimoji="0" lang="en-US" altLang="en-US" sz="1800" b="0" i="0" u="none" strike="noStrike" cap="none" normalizeH="0" baseline="0" dirty="0" err="1">
+                <a:ln>
+                  <a:noFill/>
+                </a:ln>
+                <a:solidFill>
+                  <a:schemeClr val="tx1"/>
+                </a:solidFill>
+                <a:effectLst/>
+                <a:latin typeface="Arial" panose="020B0604020202020204" pitchFamily="34" charset="0"/>
+                <a:hlinkClick r:id="rId4"/>
+              </a:rPr>
+              <a:t>Unsplash</a:t>
+            </a:r>
+            <a:r>
+              <a:rPr kumimoji="0" lang="en-US" altLang="en-US" sz="1800" b="0" i="0" u="none" strike="noStrike" cap="none" normalizeH="0" baseline="0" dirty="0">
+                <a:ln>
+                  <a:noFill/>
+                </a:ln>
+                <a:solidFill>
+                  <a:schemeClr val="tx1"/>
+                </a:solidFill>
+                <a:effectLst/>
+                <a:latin typeface="Arial" panose="020B0604020202020204" pitchFamily="34" charset="0"/>
+              </a:rPr>
+              <a:t> </a:t>
+            </a:r>
+          </a:p>
+        </p:txBody>
+      </p:sp>
+      <p:pic>
+        <p:nvPicPr>
+          <p:cNvPr id="5" name="Picture 4" descr="A logo of a cat&#10;&#10;Description automatically generated">
+            <a:extLst>
+              <a:ext uri="{FF2B5EF4-FFF2-40B4-BE49-F238E27FC236}">
+                <a16:creationId xmlns:a16="http://schemas.microsoft.com/office/drawing/2014/main" id="{5BCCC5D4-27E9-84E5-CD4C-35E4B5490FCB}"/>
+              </a:ext>
+            </a:extLst>
+          </p:cNvPr>
+          <p:cNvPicPr>
+            <a:picLocks noChangeAspect="1"/>
+          </p:cNvPicPr>
+          <p:nvPr/>
+        </p:nvPicPr>
+        <p:blipFill>
+          <a:blip r:embed="rId5">
+            <a:extLst>
+              <a:ext uri="{28A0092B-C50C-407E-A947-70E740481C1C}">
+                <a14:useLocalDpi xmlns:a14="http://schemas.microsoft.com/office/drawing/2010/main" val="0"/>
+              </a:ext>
+            </a:extLst>
+          </a:blip>
+          <a:stretch>
+            <a:fillRect/>
+          </a:stretch>
+        </p:blipFill>
+        <p:spPr>
+          <a:xfrm>
+            <a:off x="4883980" y="2211745"/>
+            <a:ext cx="1798913" cy="1798913"/>
+          </a:xfrm>
+          <a:prstGeom prst="rect">
+            <a:avLst/>
+          </a:prstGeom>
+          <a:ln>
+            <a:noFill/>
+          </a:ln>
+        </p:spPr>
+      </p:pic>
+      <p:pic>
+        <p:nvPicPr>
+          <p:cNvPr id="7" name="Picture 6" descr="A black and white envelope&#10;&#10;Description automatically generated">
+            <a:extLst>
+              <a:ext uri="{FF2B5EF4-FFF2-40B4-BE49-F238E27FC236}">
+                <a16:creationId xmlns:a16="http://schemas.microsoft.com/office/drawing/2014/main" id="{7D50EF03-390F-C67D-4185-DAF2C9D7E37D}"/>
+              </a:ext>
+            </a:extLst>
+          </p:cNvPr>
+          <p:cNvPicPr>
+            <a:picLocks noChangeAspect="1"/>
+          </p:cNvPicPr>
+          <p:nvPr/>
+        </p:nvPicPr>
+        <p:blipFill>
+          <a:blip r:embed="rId6">
+            <a:extLst>
+              <a:ext uri="{28A0092B-C50C-407E-A947-70E740481C1C}">
+                <a14:useLocalDpi xmlns:a14="http://schemas.microsoft.com/office/drawing/2010/main" val="0"/>
+              </a:ext>
+            </a:extLst>
+          </a:blip>
+          <a:stretch>
+            <a:fillRect/>
+          </a:stretch>
+        </p:blipFill>
+        <p:spPr>
+          <a:xfrm>
+            <a:off x="2904289" y="2211746"/>
+            <a:ext cx="1798913" cy="1798913"/>
+          </a:xfrm>
+          <a:prstGeom prst="rect">
+            <a:avLst/>
+          </a:prstGeom>
+          <a:ln>
+            <a:noFill/>
+          </a:ln>
+        </p:spPr>
+      </p:pic>
+      <p:pic>
+        <p:nvPicPr>
+          <p:cNvPr id="23" name="Picture 22" descr="A black and white logo&#10;&#10;Description automatically generated">
+            <a:extLst>
+              <a:ext uri="{FF2B5EF4-FFF2-40B4-BE49-F238E27FC236}">
+                <a16:creationId xmlns:a16="http://schemas.microsoft.com/office/drawing/2014/main" id="{AA1602F0-EAF3-16F7-555E-D7287D173BC8}"/>
+              </a:ext>
+            </a:extLst>
+          </p:cNvPr>
+          <p:cNvPicPr>
+            <a:picLocks noChangeAspect="1"/>
+          </p:cNvPicPr>
+          <p:nvPr/>
+        </p:nvPicPr>
+        <p:blipFill rotWithShape="1">
+          <a:blip r:embed="rId7">
+            <a:extLst>
+              <a:ext uri="{28A0092B-C50C-407E-A947-70E740481C1C}">
+                <a14:useLocalDpi xmlns:a14="http://schemas.microsoft.com/office/drawing/2010/main" val="0"/>
+              </a:ext>
+            </a:extLst>
+          </a:blip>
+          <a:srcRect l="12572" t="12374" r="12419" b="12616"/>
+          <a:stretch/>
+        </p:blipFill>
+        <p:spPr>
+          <a:xfrm>
+            <a:off x="989961" y="2211746"/>
+            <a:ext cx="1798913" cy="1798913"/>
+          </a:xfrm>
+          <a:prstGeom prst="rect">
+            <a:avLst/>
+          </a:prstGeom>
+        </p:spPr>
+      </p:pic>
     </p:spTree>
     <p:extLst>
       <p:ext uri="{BB962C8B-B14F-4D97-AF65-F5344CB8AC3E}">

</xml_diff>